<commit_message>
docs/DeveloperGuide: update to reflect current impelemtation
</commit_message>
<xml_diff>
--- a/docs/diagrams/StorageComponentClassDiagram.pptx
+++ b/docs/diagrams/StorageComponentClassDiagram.pptx
@@ -208,7 +208,7 @@
           <a:p>
             <a:fld id="{F5CC4B3F-88C1-4FFA-B1B6-F41C21DC6924}" type="datetimeFigureOut">
               <a:rPr lang="en-US" smtClean="0"/>
-              <a:t>4/1/2019</a:t>
+              <a:t>4/14/2019</a:t>
             </a:fld>
             <a:endParaRPr lang="en-US"/>
           </a:p>
@@ -654,7 +654,7 @@
           <a:p>
             <a:fld id="{78C97017-6FC3-485B-9764-EAC9E56C1D49}" type="datetimeFigureOut">
               <a:rPr lang="en-US" smtClean="0"/>
-              <a:t>4/1/2019</a:t>
+              <a:t>4/14/2019</a:t>
             </a:fld>
             <a:endParaRPr lang="en-US"/>
           </a:p>
@@ -822,7 +822,7 @@
           <a:p>
             <a:fld id="{78C97017-6FC3-485B-9764-EAC9E56C1D49}" type="datetimeFigureOut">
               <a:rPr lang="en-US" smtClean="0"/>
-              <a:t>4/1/2019</a:t>
+              <a:t>4/14/2019</a:t>
             </a:fld>
             <a:endParaRPr lang="en-US"/>
           </a:p>
@@ -1000,7 +1000,7 @@
           <a:p>
             <a:fld id="{78C97017-6FC3-485B-9764-EAC9E56C1D49}" type="datetimeFigureOut">
               <a:rPr lang="en-US" smtClean="0"/>
-              <a:t>4/1/2019</a:t>
+              <a:t>4/14/2019</a:t>
             </a:fld>
             <a:endParaRPr lang="en-US"/>
           </a:p>
@@ -1168,7 +1168,7 @@
           <a:p>
             <a:fld id="{78C97017-6FC3-485B-9764-EAC9E56C1D49}" type="datetimeFigureOut">
               <a:rPr lang="en-US" smtClean="0"/>
-              <a:t>4/1/2019</a:t>
+              <a:t>4/14/2019</a:t>
             </a:fld>
             <a:endParaRPr lang="en-US"/>
           </a:p>
@@ -1413,7 +1413,7 @@
           <a:p>
             <a:fld id="{78C97017-6FC3-485B-9764-EAC9E56C1D49}" type="datetimeFigureOut">
               <a:rPr lang="en-US" smtClean="0"/>
-              <a:t>4/1/2019</a:t>
+              <a:t>4/14/2019</a:t>
             </a:fld>
             <a:endParaRPr lang="en-US"/>
           </a:p>
@@ -1698,7 +1698,7 @@
           <a:p>
             <a:fld id="{78C97017-6FC3-485B-9764-EAC9E56C1D49}" type="datetimeFigureOut">
               <a:rPr lang="en-US" smtClean="0"/>
-              <a:t>4/1/2019</a:t>
+              <a:t>4/14/2019</a:t>
             </a:fld>
             <a:endParaRPr lang="en-US"/>
           </a:p>
@@ -2117,7 +2117,7 @@
           <a:p>
             <a:fld id="{78C97017-6FC3-485B-9764-EAC9E56C1D49}" type="datetimeFigureOut">
               <a:rPr lang="en-US" smtClean="0"/>
-              <a:t>4/1/2019</a:t>
+              <a:t>4/14/2019</a:t>
             </a:fld>
             <a:endParaRPr lang="en-US"/>
           </a:p>
@@ -2234,7 +2234,7 @@
           <a:p>
             <a:fld id="{78C97017-6FC3-485B-9764-EAC9E56C1D49}" type="datetimeFigureOut">
               <a:rPr lang="en-US" smtClean="0"/>
-              <a:t>4/1/2019</a:t>
+              <a:t>4/14/2019</a:t>
             </a:fld>
             <a:endParaRPr lang="en-US"/>
           </a:p>
@@ -2329,7 +2329,7 @@
           <a:p>
             <a:fld id="{78C97017-6FC3-485B-9764-EAC9E56C1D49}" type="datetimeFigureOut">
               <a:rPr lang="en-US" smtClean="0"/>
-              <a:t>4/1/2019</a:t>
+              <a:t>4/14/2019</a:t>
             </a:fld>
             <a:endParaRPr lang="en-US"/>
           </a:p>
@@ -2604,7 +2604,7 @@
           <a:p>
             <a:fld id="{78C97017-6FC3-485B-9764-EAC9E56C1D49}" type="datetimeFigureOut">
               <a:rPr lang="en-US" smtClean="0"/>
-              <a:t>4/1/2019</a:t>
+              <a:t>4/14/2019</a:t>
             </a:fld>
             <a:endParaRPr lang="en-US"/>
           </a:p>
@@ -2856,7 +2856,7 @@
           <a:p>
             <a:fld id="{78C97017-6FC3-485B-9764-EAC9E56C1D49}" type="datetimeFigureOut">
               <a:rPr lang="en-US" smtClean="0"/>
-              <a:t>4/1/2019</a:t>
+              <a:t>4/14/2019</a:t>
             </a:fld>
             <a:endParaRPr lang="en-US"/>
           </a:p>
@@ -3067,7 +3067,7 @@
           <a:p>
             <a:fld id="{78C97017-6FC3-485B-9764-EAC9E56C1D49}" type="datetimeFigureOut">
               <a:rPr lang="en-US" smtClean="0"/>
-              <a:t>4/1/2019</a:t>
+              <a:t>4/14/2019</a:t>
             </a:fld>
             <a:endParaRPr lang="en-US"/>
           </a:p>
@@ -3444,10 +3444,10 @@
       </p:grpSpPr>
       <p:grpSp>
         <p:nvGrpSpPr>
-          <p:cNvPr id="89" name="Group 88">
+          <p:cNvPr id="202" name="Group 201">
             <a:extLst>
               <a:ext uri="{FF2B5EF4-FFF2-40B4-BE49-F238E27FC236}">
-                <a16:creationId xmlns:a16="http://schemas.microsoft.com/office/drawing/2014/main" id="{D0390CE2-E95C-4CD7-9EBF-FB624841AB3A}"/>
+                <a16:creationId xmlns:a16="http://schemas.microsoft.com/office/drawing/2014/main" id="{6C19133A-6AAB-48C4-A37C-46095432C7C2}"/>
               </a:ext>
             </a:extLst>
           </p:cNvPr>
@@ -3456,1185 +3456,2329 @@
         </p:nvGrpSpPr>
         <p:grpSpPr>
           <a:xfrm>
-            <a:off x="2387963" y="2086382"/>
-            <a:ext cx="5155838" cy="3930558"/>
-            <a:chOff x="2387963" y="2086382"/>
-            <a:chExt cx="5155838" cy="3930558"/>
+            <a:off x="2057400" y="729094"/>
+            <a:ext cx="6540332" cy="5399812"/>
+            <a:chOff x="1545124" y="212233"/>
+            <a:chExt cx="6540332" cy="5399812"/>
           </a:xfrm>
         </p:grpSpPr>
+        <p:grpSp>
+          <p:nvGrpSpPr>
+            <p:cNvPr id="89" name="Group 88">
+              <a:extLst>
+                <a:ext uri="{FF2B5EF4-FFF2-40B4-BE49-F238E27FC236}">
+                  <a16:creationId xmlns:a16="http://schemas.microsoft.com/office/drawing/2014/main" id="{D0390CE2-E95C-4CD7-9EBF-FB624841AB3A}"/>
+                </a:ext>
+              </a:extLst>
+            </p:cNvPr>
+            <p:cNvGrpSpPr/>
+            <p:nvPr/>
+          </p:nvGrpSpPr>
+          <p:grpSpPr>
+            <a:xfrm>
+              <a:off x="1545124" y="212233"/>
+              <a:ext cx="6540332" cy="5399812"/>
+              <a:chOff x="2028648" y="2088408"/>
+              <a:chExt cx="6540332" cy="5399812"/>
+            </a:xfrm>
+          </p:grpSpPr>
+          <p:sp>
+            <p:nvSpPr>
+              <p:cNvPr id="118" name="Rectangle 65"/>
+              <p:cNvSpPr/>
+              <p:nvPr/>
+            </p:nvSpPr>
+            <p:spPr>
+              <a:xfrm>
+                <a:off x="2236124" y="2088408"/>
+                <a:ext cx="6332856" cy="5399812"/>
+              </a:xfrm>
+              <a:prstGeom prst="roundRect">
+                <a:avLst>
+                  <a:gd name="adj" fmla="val 3484"/>
+                </a:avLst>
+              </a:prstGeom>
+              <a:solidFill>
+                <a:schemeClr val="accent6">
+                  <a:lumMod val="20000"/>
+                  <a:lumOff val="80000"/>
+                </a:schemeClr>
+              </a:solidFill>
+              <a:ln w="19050">
+                <a:noFill/>
+              </a:ln>
+              <a:effectLst/>
+            </p:spPr>
+            <p:style>
+              <a:lnRef idx="1">
+                <a:schemeClr val="accent2"/>
+              </a:lnRef>
+              <a:fillRef idx="2">
+                <a:schemeClr val="accent2"/>
+              </a:fillRef>
+              <a:effectRef idx="1">
+                <a:schemeClr val="accent2"/>
+              </a:effectRef>
+              <a:fontRef idx="minor">
+                <a:schemeClr val="dk1"/>
+              </a:fontRef>
+            </p:style>
+            <p:txBody>
+              <a:bodyPr rtlCol="0" anchor="t"/>
+              <a:lstStyle/>
+              <a:p>
+                <a:r>
+                  <a:rPr lang="en-US" sz="1200" b="1" dirty="0">
+                    <a:solidFill>
+                      <a:schemeClr val="accent6">
+                        <a:lumMod val="75000"/>
+                      </a:schemeClr>
+                    </a:solidFill>
+                  </a:rPr>
+                  <a:t>Storage</a:t>
+                </a:r>
+                <a:endParaRPr lang="en-SG" sz="1200" b="1" dirty="0">
+                  <a:solidFill>
+                    <a:schemeClr val="accent6">
+                      <a:lumMod val="75000"/>
+                    </a:schemeClr>
+                  </a:solidFill>
+                </a:endParaRPr>
+              </a:p>
+            </p:txBody>
+          </p:sp>
+          <p:sp>
+            <p:nvSpPr>
+              <p:cNvPr id="2" name="Rectangle 8"/>
+              <p:cNvSpPr/>
+              <p:nvPr/>
+            </p:nvSpPr>
+            <p:spPr>
+              <a:xfrm>
+                <a:off x="4355052" y="3105763"/>
+                <a:ext cx="1323049" cy="346760"/>
+              </a:xfrm>
+              <a:prstGeom prst="rect">
+                <a:avLst/>
+              </a:prstGeom>
+              <a:solidFill>
+                <a:schemeClr val="accent6">
+                  <a:lumMod val="75000"/>
+                </a:schemeClr>
+              </a:solidFill>
+              <a:ln w="19050">
+                <a:solidFill>
+                  <a:schemeClr val="accent6">
+                    <a:lumMod val="75000"/>
+                  </a:schemeClr>
+                </a:solidFill>
+              </a:ln>
+              <a:effectLst/>
+            </p:spPr>
+            <p:style>
+              <a:lnRef idx="1">
+                <a:schemeClr val="accent2"/>
+              </a:lnRef>
+              <a:fillRef idx="2">
+                <a:schemeClr val="accent2"/>
+              </a:fillRef>
+              <a:effectRef idx="1">
+                <a:schemeClr val="accent2"/>
+              </a:effectRef>
+              <a:fontRef idx="minor">
+                <a:schemeClr val="dk1"/>
+              </a:fontRef>
+            </p:style>
+            <p:txBody>
+              <a:bodyPr rtlCol="0" anchor="ctr"/>
+              <a:lstStyle/>
+              <a:p>
+                <a:pPr algn="ctr"/>
+                <a:r>
+                  <a:rPr lang="en-US" sz="1050" dirty="0">
+                    <a:solidFill>
+                      <a:schemeClr val="bg1"/>
+                    </a:solidFill>
+                  </a:rPr>
+                  <a:t>&lt;&lt;interface&gt;&gt;</a:t>
+                </a:r>
+                <a:br>
+                  <a:rPr lang="en-US" sz="1050" dirty="0">
+                    <a:solidFill>
+                      <a:schemeClr val="bg1"/>
+                    </a:solidFill>
+                  </a:rPr>
+                </a:br>
+                <a:r>
+                  <a:rPr lang="en-US" sz="1050" dirty="0" err="1">
+                    <a:solidFill>
+                      <a:schemeClr val="bg1"/>
+                    </a:solidFill>
+                  </a:rPr>
+                  <a:t>ApplicationStorage</a:t>
+                </a:r>
+                <a:endParaRPr lang="en-SG" sz="1050" dirty="0">
+                  <a:solidFill>
+                    <a:schemeClr val="bg1"/>
+                  </a:solidFill>
+                </a:endParaRPr>
+              </a:p>
+            </p:txBody>
+          </p:sp>
+          <p:sp>
+            <p:nvSpPr>
+              <p:cNvPr id="9" name="Rectangle 62"/>
+              <p:cNvSpPr/>
+              <p:nvPr/>
+            </p:nvSpPr>
+            <p:spPr>
+              <a:xfrm rot="16200000">
+                <a:off x="3161835" y="2816010"/>
+                <a:ext cx="1093635" cy="346760"/>
+              </a:xfrm>
+              <a:prstGeom prst="rect">
+                <a:avLst/>
+              </a:prstGeom>
+              <a:solidFill>
+                <a:schemeClr val="accent6">
+                  <a:lumMod val="75000"/>
+                </a:schemeClr>
+              </a:solidFill>
+              <a:ln w="19050">
+                <a:solidFill>
+                  <a:schemeClr val="accent6">
+                    <a:lumMod val="75000"/>
+                  </a:schemeClr>
+                </a:solidFill>
+              </a:ln>
+              <a:effectLst/>
+            </p:spPr>
+            <p:style>
+              <a:lnRef idx="1">
+                <a:schemeClr val="accent2"/>
+              </a:lnRef>
+              <a:fillRef idx="2">
+                <a:schemeClr val="accent2"/>
+              </a:fillRef>
+              <a:effectRef idx="1">
+                <a:schemeClr val="accent2"/>
+              </a:effectRef>
+              <a:fontRef idx="minor">
+                <a:schemeClr val="dk1"/>
+              </a:fontRef>
+            </p:style>
+            <p:txBody>
+              <a:bodyPr rtlCol="0" anchor="ctr"/>
+              <a:lstStyle/>
+              <a:p>
+                <a:pPr algn="ctr"/>
+                <a:r>
+                  <a:rPr lang="en-US" sz="1050" dirty="0" err="1">
+                    <a:solidFill>
+                      <a:schemeClr val="bg1"/>
+                    </a:solidFill>
+                  </a:rPr>
+                  <a:t>StorageManager</a:t>
+                </a:r>
+                <a:endParaRPr lang="en-SG" sz="1050" dirty="0">
+                  <a:solidFill>
+                    <a:schemeClr val="bg1"/>
+                  </a:solidFill>
+                </a:endParaRPr>
+              </a:p>
+            </p:txBody>
+          </p:sp>
+          <p:sp>
+            <p:nvSpPr>
+              <p:cNvPr id="119" name="Rectangle 62"/>
+              <p:cNvSpPr/>
+              <p:nvPr/>
+            </p:nvSpPr>
+            <p:spPr>
+              <a:xfrm rot="16200000">
+                <a:off x="2434074" y="2808525"/>
+                <a:ext cx="1093635" cy="346760"/>
+              </a:xfrm>
+              <a:prstGeom prst="rect">
+                <a:avLst/>
+              </a:prstGeom>
+              <a:solidFill>
+                <a:schemeClr val="accent6">
+                  <a:lumMod val="75000"/>
+                </a:schemeClr>
+              </a:solidFill>
+              <a:ln w="19050">
+                <a:solidFill>
+                  <a:schemeClr val="accent6">
+                    <a:lumMod val="75000"/>
+                  </a:schemeClr>
+                </a:solidFill>
+              </a:ln>
+              <a:effectLst/>
+            </p:spPr>
+            <p:style>
+              <a:lnRef idx="1">
+                <a:schemeClr val="accent2"/>
+              </a:lnRef>
+              <a:fillRef idx="2">
+                <a:schemeClr val="accent2"/>
+              </a:fillRef>
+              <a:effectRef idx="1">
+                <a:schemeClr val="accent2"/>
+              </a:effectRef>
+              <a:fontRef idx="minor">
+                <a:schemeClr val="dk1"/>
+              </a:fontRef>
+            </p:style>
+            <p:txBody>
+              <a:bodyPr rtlCol="0" anchor="ctr"/>
+              <a:lstStyle/>
+              <a:p>
+                <a:pPr algn="ctr"/>
+                <a:r>
+                  <a:rPr lang="en-US" sz="1050" dirty="0">
+                    <a:solidFill>
+                      <a:schemeClr val="bg1"/>
+                    </a:solidFill>
+                  </a:rPr>
+                  <a:t>&lt;&lt;interface&gt;&gt;</a:t>
+                </a:r>
+              </a:p>
+              <a:p>
+                <a:pPr algn="ctr"/>
+                <a:r>
+                  <a:rPr lang="en-US" sz="1050" dirty="0">
+                    <a:solidFill>
+                      <a:schemeClr val="bg1"/>
+                    </a:solidFill>
+                  </a:rPr>
+                  <a:t>Storage</a:t>
+                </a:r>
+                <a:endParaRPr lang="en-SG" sz="1050" dirty="0">
+                  <a:solidFill>
+                    <a:schemeClr val="bg1"/>
+                  </a:solidFill>
+                </a:endParaRPr>
+              </a:p>
+            </p:txBody>
+          </p:sp>
+          <p:sp>
+            <p:nvSpPr>
+              <p:cNvPr id="120" name="Isosceles Triangle 102"/>
+              <p:cNvSpPr/>
+              <p:nvPr/>
+            </p:nvSpPr>
+            <p:spPr>
+              <a:xfrm rot="16200000">
+                <a:off x="3104782" y="2899614"/>
+                <a:ext cx="270504" cy="175523"/>
+              </a:xfrm>
+              <a:prstGeom prst="triangle">
+                <a:avLst/>
+              </a:prstGeom>
+              <a:solidFill>
+                <a:schemeClr val="accent6">
+                  <a:lumMod val="75000"/>
+                </a:schemeClr>
+              </a:solidFill>
+              <a:ln w="19050">
+                <a:solidFill>
+                  <a:schemeClr val="accent6">
+                    <a:lumMod val="75000"/>
+                  </a:schemeClr>
+                </a:solidFill>
+              </a:ln>
+              <a:effectLst/>
+            </p:spPr>
+            <p:style>
+              <a:lnRef idx="1">
+                <a:schemeClr val="accent2"/>
+              </a:lnRef>
+              <a:fillRef idx="2">
+                <a:schemeClr val="accent2"/>
+              </a:fillRef>
+              <a:effectRef idx="1">
+                <a:schemeClr val="accent2"/>
+              </a:effectRef>
+              <a:fontRef idx="minor">
+                <a:schemeClr val="dk1"/>
+              </a:fontRef>
+            </p:style>
+            <p:txBody>
+              <a:bodyPr rtlCol="0" anchor="ctr"/>
+              <a:lstStyle/>
+              <a:p>
+                <a:pPr algn="ctr"/>
+                <a:endParaRPr lang="en-SG" sz="1050">
+                  <a:solidFill>
+                    <a:schemeClr val="bg1"/>
+                  </a:solidFill>
+                </a:endParaRPr>
+              </a:p>
+            </p:txBody>
+          </p:sp>
+          <p:cxnSp>
+            <p:nvCxnSpPr>
+              <p:cNvPr id="58" name="Straight Arrow Connector 57"/>
+              <p:cNvCxnSpPr>
+                <a:stCxn id="42" idx="3"/>
+                <a:endCxn id="2" idx="1"/>
+              </p:cNvCxnSpPr>
+              <p:nvPr/>
+            </p:nvCxnSpPr>
+            <p:spPr>
+              <a:xfrm>
+                <a:off x="4134242" y="3273859"/>
+                <a:ext cx="220810" cy="5284"/>
+              </a:xfrm>
+              <a:prstGeom prst="straightConnector1">
+                <a:avLst/>
+              </a:prstGeom>
+              <a:ln w="19050">
+                <a:solidFill>
+                  <a:schemeClr val="accent6">
+                    <a:lumMod val="75000"/>
+                  </a:schemeClr>
+                </a:solidFill>
+                <a:headEnd type="none" w="med" len="med"/>
+                <a:tailEnd type="arrow" w="med" len="med"/>
+              </a:ln>
+              <a:effectLst/>
+            </p:spPr>
+            <p:style>
+              <a:lnRef idx="1">
+                <a:schemeClr val="accent2"/>
+              </a:lnRef>
+              <a:fillRef idx="2">
+                <a:schemeClr val="accent2"/>
+              </a:fillRef>
+              <a:effectRef idx="1">
+                <a:schemeClr val="accent2"/>
+              </a:effectRef>
+              <a:fontRef idx="minor">
+                <a:schemeClr val="dk1"/>
+              </a:fontRef>
+            </p:style>
+          </p:cxnSp>
+          <p:cxnSp>
+            <p:nvCxnSpPr>
+              <p:cNvPr id="75" name="Elbow Connector 122"/>
+              <p:cNvCxnSpPr>
+                <a:cxnSpLocks/>
+              </p:cNvCxnSpPr>
+              <p:nvPr/>
+            </p:nvCxnSpPr>
+            <p:spPr>
+              <a:xfrm>
+                <a:off x="2028648" y="2990236"/>
+                <a:ext cx="778863" cy="12700"/>
+              </a:xfrm>
+              <a:prstGeom prst="bentConnector3">
+                <a:avLst>
+                  <a:gd name="adj1" fmla="val 50000"/>
+                </a:avLst>
+              </a:prstGeom>
+              <a:ln w="19050">
+                <a:solidFill>
+                  <a:schemeClr val="bg1">
+                    <a:lumMod val="75000"/>
+                  </a:schemeClr>
+                </a:solidFill>
+                <a:prstDash val="sysDot"/>
+                <a:headEnd type="none" w="med" len="med"/>
+                <a:tailEnd type="arrow" w="med" len="med"/>
+              </a:ln>
+              <a:effectLst/>
+            </p:spPr>
+            <p:style>
+              <a:lnRef idx="1">
+                <a:schemeClr val="accent2"/>
+              </a:lnRef>
+              <a:fillRef idx="2">
+                <a:schemeClr val="accent2"/>
+              </a:fillRef>
+              <a:effectRef idx="1">
+                <a:schemeClr val="accent2"/>
+              </a:effectRef>
+              <a:fontRef idx="minor">
+                <a:schemeClr val="dk1"/>
+              </a:fontRef>
+            </p:style>
+          </p:cxnSp>
+          <p:cxnSp>
+            <p:nvCxnSpPr>
+              <p:cNvPr id="21" name="Straight Connector 20"/>
+              <p:cNvCxnSpPr>
+                <a:stCxn id="120" idx="3"/>
+              </p:cNvCxnSpPr>
+              <p:nvPr/>
+            </p:nvCxnSpPr>
+            <p:spPr>
+              <a:xfrm flipV="1">
+                <a:off x="3327796" y="2987375"/>
+                <a:ext cx="216105" cy="1"/>
+              </a:xfrm>
+              <a:prstGeom prst="line">
+                <a:avLst/>
+              </a:prstGeom>
+              <a:ln w="19050">
+                <a:solidFill>
+                  <a:schemeClr val="accent6">
+                    <a:lumMod val="75000"/>
+                  </a:schemeClr>
+                </a:solidFill>
+                <a:prstDash val="sysDot"/>
+                <a:headEnd type="none" w="med" len="med"/>
+                <a:tailEnd type="none" w="med" len="med"/>
+              </a:ln>
+              <a:effectLst/>
+            </p:spPr>
+            <p:style>
+              <a:lnRef idx="1">
+                <a:schemeClr val="accent2"/>
+              </a:lnRef>
+              <a:fillRef idx="2">
+                <a:schemeClr val="accent2"/>
+              </a:fillRef>
+              <a:effectRef idx="1">
+                <a:schemeClr val="accent2"/>
+              </a:effectRef>
+              <a:fontRef idx="minor">
+                <a:schemeClr val="dk1"/>
+              </a:fontRef>
+            </p:style>
+          </p:cxnSp>
+          <p:sp>
+            <p:nvSpPr>
+              <p:cNvPr id="42" name="Flowchart: Decision 96"/>
+              <p:cNvSpPr/>
+              <p:nvPr/>
+            </p:nvSpPr>
+            <p:spPr>
+              <a:xfrm>
+                <a:off x="3898194" y="3187169"/>
+                <a:ext cx="236048" cy="173380"/>
+              </a:xfrm>
+              <a:prstGeom prst="flowChartDecision">
+                <a:avLst/>
+              </a:prstGeom>
+              <a:noFill/>
+              <a:ln w="19050">
+                <a:solidFill>
+                  <a:schemeClr val="accent6">
+                    <a:lumMod val="75000"/>
+                  </a:schemeClr>
+                </a:solidFill>
+              </a:ln>
+              <a:effectLst/>
+            </p:spPr>
+            <p:style>
+              <a:lnRef idx="1">
+                <a:schemeClr val="accent2"/>
+              </a:lnRef>
+              <a:fillRef idx="2">
+                <a:schemeClr val="accent2"/>
+              </a:fillRef>
+              <a:effectRef idx="1">
+                <a:schemeClr val="accent2"/>
+              </a:effectRef>
+              <a:fontRef idx="minor">
+                <a:schemeClr val="dk1"/>
+              </a:fontRef>
+            </p:style>
+            <p:txBody>
+              <a:bodyPr rtlCol="0" anchor="ctr"/>
+              <a:lstStyle/>
+              <a:p>
+                <a:pPr algn="ctr"/>
+                <a:endParaRPr lang="en-US" sz="1050">
+                  <a:solidFill>
+                    <a:schemeClr val="bg1"/>
+                  </a:solidFill>
+                </a:endParaRPr>
+              </a:p>
+            </p:txBody>
+          </p:sp>
+          <p:cxnSp>
+            <p:nvCxnSpPr>
+              <p:cNvPr id="97" name="Elbow Connector 63"/>
+              <p:cNvCxnSpPr>
+                <a:stCxn id="99" idx="3"/>
+                <a:endCxn id="50" idx="1"/>
+              </p:cNvCxnSpPr>
+              <p:nvPr/>
+            </p:nvCxnSpPr>
+            <p:spPr>
+              <a:xfrm flipV="1">
+                <a:off x="5875913" y="3279143"/>
+                <a:ext cx="223324" cy="1"/>
+              </a:xfrm>
+              <a:prstGeom prst="bentConnector3">
+                <a:avLst>
+                  <a:gd name="adj1" fmla="val 50000"/>
+                </a:avLst>
+              </a:prstGeom>
+              <a:ln w="19050">
+                <a:solidFill>
+                  <a:schemeClr val="accent6">
+                    <a:lumMod val="75000"/>
+                  </a:schemeClr>
+                </a:solidFill>
+                <a:prstDash val="sysDot"/>
+                <a:headEnd type="none" w="med" len="med"/>
+                <a:tailEnd type="none" w="med" len="med"/>
+              </a:ln>
+              <a:effectLst/>
+            </p:spPr>
+            <p:style>
+              <a:lnRef idx="1">
+                <a:schemeClr val="accent2"/>
+              </a:lnRef>
+              <a:fillRef idx="2">
+                <a:schemeClr val="accent2"/>
+              </a:fillRef>
+              <a:effectRef idx="1">
+                <a:schemeClr val="accent2"/>
+              </a:effectRef>
+              <a:fontRef idx="minor">
+                <a:schemeClr val="dk1"/>
+              </a:fontRef>
+            </p:style>
+          </p:cxnSp>
+          <p:sp>
+            <p:nvSpPr>
+              <p:cNvPr id="99" name="Isosceles Triangle 102"/>
+              <p:cNvSpPr/>
+              <p:nvPr/>
+            </p:nvSpPr>
+            <p:spPr>
+              <a:xfrm rot="5400000" flipV="1">
+                <a:off x="5652899" y="3191382"/>
+                <a:ext cx="270504" cy="175523"/>
+              </a:xfrm>
+              <a:prstGeom prst="triangle">
+                <a:avLst/>
+              </a:prstGeom>
+              <a:solidFill>
+                <a:schemeClr val="accent6">
+                  <a:lumMod val="75000"/>
+                </a:schemeClr>
+              </a:solidFill>
+              <a:ln w="19050">
+                <a:solidFill>
+                  <a:schemeClr val="accent6">
+                    <a:lumMod val="75000"/>
+                  </a:schemeClr>
+                </a:solidFill>
+              </a:ln>
+              <a:effectLst/>
+            </p:spPr>
+            <p:style>
+              <a:lnRef idx="1">
+                <a:schemeClr val="accent2"/>
+              </a:lnRef>
+              <a:fillRef idx="2">
+                <a:schemeClr val="accent2"/>
+              </a:fillRef>
+              <a:effectRef idx="1">
+                <a:schemeClr val="accent2"/>
+              </a:effectRef>
+              <a:fontRef idx="minor">
+                <a:schemeClr val="dk1"/>
+              </a:fontRef>
+            </p:style>
+            <p:txBody>
+              <a:bodyPr rtlCol="0" anchor="ctr"/>
+              <a:lstStyle/>
+              <a:p>
+                <a:pPr algn="ctr"/>
+                <a:endParaRPr lang="en-SG" sz="1050">
+                  <a:solidFill>
+                    <a:schemeClr val="bg1"/>
+                  </a:solidFill>
+                </a:endParaRPr>
+              </a:p>
+            </p:txBody>
+          </p:sp>
+          <p:cxnSp>
+            <p:nvCxnSpPr>
+              <p:cNvPr id="124" name="Elbow Connector 122"/>
+              <p:cNvCxnSpPr>
+                <a:cxnSpLocks/>
+                <a:stCxn id="50" idx="2"/>
+                <a:endCxn id="66" idx="0"/>
+              </p:cNvCxnSpPr>
+              <p:nvPr/>
+            </p:nvCxnSpPr>
+            <p:spPr>
+              <a:xfrm rot="5400000">
+                <a:off x="5926999" y="3021171"/>
+                <a:ext cx="325805" cy="1188508"/>
+              </a:xfrm>
+              <a:prstGeom prst="bentConnector3">
+                <a:avLst>
+                  <a:gd name="adj1" fmla="val 50000"/>
+                </a:avLst>
+              </a:prstGeom>
+              <a:ln w="19050">
+                <a:solidFill>
+                  <a:schemeClr val="accent6">
+                    <a:lumMod val="75000"/>
+                  </a:schemeClr>
+                </a:solidFill>
+                <a:prstDash val="sysDot"/>
+                <a:headEnd type="none" w="med" len="med"/>
+                <a:tailEnd type="arrow" w="med" len="med"/>
+              </a:ln>
+              <a:effectLst/>
+            </p:spPr>
+            <p:style>
+              <a:lnRef idx="1">
+                <a:schemeClr val="accent2"/>
+              </a:lnRef>
+              <a:fillRef idx="2">
+                <a:schemeClr val="accent2"/>
+              </a:fillRef>
+              <a:effectRef idx="1">
+                <a:schemeClr val="accent2"/>
+              </a:effectRef>
+              <a:fontRef idx="minor">
+                <a:schemeClr val="dk1"/>
+              </a:fontRef>
+            </p:style>
+          </p:cxnSp>
+          <p:sp>
+            <p:nvSpPr>
+              <p:cNvPr id="50" name="Rectangle 8"/>
+              <p:cNvSpPr/>
+              <p:nvPr/>
+            </p:nvSpPr>
+            <p:spPr>
+              <a:xfrm>
+                <a:off x="6099237" y="3105763"/>
+                <a:ext cx="1169835" cy="346760"/>
+              </a:xfrm>
+              <a:prstGeom prst="rect">
+                <a:avLst/>
+              </a:prstGeom>
+              <a:ln w="19050"/>
+              <a:effectLst/>
+            </p:spPr>
+            <p:style>
+              <a:lnRef idx="1">
+                <a:schemeClr val="accent6"/>
+              </a:lnRef>
+              <a:fillRef idx="2">
+                <a:schemeClr val="accent6"/>
+              </a:fillRef>
+              <a:effectRef idx="1">
+                <a:schemeClr val="accent6"/>
+              </a:effectRef>
+              <a:fontRef idx="minor">
+                <a:schemeClr val="dk1"/>
+              </a:fontRef>
+            </p:style>
+            <p:txBody>
+              <a:bodyPr rtlCol="0" anchor="ctr"/>
+              <a:lstStyle/>
+              <a:p>
+                <a:pPr algn="ctr"/>
+                <a:r>
+                  <a:rPr lang="en-US" sz="1050" b="1" dirty="0" err="1">
+                    <a:solidFill>
+                      <a:schemeClr val="accent6">
+                        <a:lumMod val="75000"/>
+                      </a:schemeClr>
+                    </a:solidFill>
+                  </a:rPr>
+                  <a:t>JsonApplication</a:t>
+                </a:r>
+                <a:br>
+                  <a:rPr lang="en-US" sz="1050" b="1" dirty="0">
+                    <a:solidFill>
+                      <a:schemeClr val="accent6">
+                        <a:lumMod val="75000"/>
+                      </a:schemeClr>
+                    </a:solidFill>
+                  </a:rPr>
+                </a:br>
+                <a:r>
+                  <a:rPr lang="en-US" sz="1050" b="1" dirty="0">
+                    <a:solidFill>
+                      <a:schemeClr val="accent6">
+                        <a:lumMod val="75000"/>
+                      </a:schemeClr>
+                    </a:solidFill>
+                  </a:rPr>
+                  <a:t>Storage</a:t>
+                </a:r>
+                <a:endParaRPr lang="en-SG" sz="1050" b="1" dirty="0">
+                  <a:solidFill>
+                    <a:schemeClr val="accent6">
+                      <a:lumMod val="75000"/>
+                    </a:schemeClr>
+                  </a:solidFill>
+                </a:endParaRPr>
+              </a:p>
+            </p:txBody>
+          </p:sp>
+          <p:sp>
+            <p:nvSpPr>
+              <p:cNvPr id="52" name="Rectangle 8"/>
+              <p:cNvSpPr/>
+              <p:nvPr/>
+            </p:nvSpPr>
+            <p:spPr>
+              <a:xfrm>
+                <a:off x="4351815" y="2505363"/>
+                <a:ext cx="1323049" cy="346760"/>
+              </a:xfrm>
+              <a:prstGeom prst="rect">
+                <a:avLst/>
+              </a:prstGeom>
+              <a:solidFill>
+                <a:schemeClr val="accent6">
+                  <a:lumMod val="75000"/>
+                </a:schemeClr>
+              </a:solidFill>
+              <a:ln w="19050">
+                <a:solidFill>
+                  <a:schemeClr val="accent6">
+                    <a:lumMod val="75000"/>
+                  </a:schemeClr>
+                </a:solidFill>
+              </a:ln>
+              <a:effectLst/>
+            </p:spPr>
+            <p:style>
+              <a:lnRef idx="1">
+                <a:schemeClr val="accent2"/>
+              </a:lnRef>
+              <a:fillRef idx="2">
+                <a:schemeClr val="accent2"/>
+              </a:fillRef>
+              <a:effectRef idx="1">
+                <a:schemeClr val="accent2"/>
+              </a:effectRef>
+              <a:fontRef idx="minor">
+                <a:schemeClr val="dk1"/>
+              </a:fontRef>
+            </p:style>
+            <p:txBody>
+              <a:bodyPr rtlCol="0" anchor="ctr"/>
+              <a:lstStyle/>
+              <a:p>
+                <a:pPr algn="ctr"/>
+                <a:r>
+                  <a:rPr lang="en-US" sz="1050" dirty="0">
+                    <a:solidFill>
+                      <a:schemeClr val="bg1"/>
+                    </a:solidFill>
+                  </a:rPr>
+                  <a:t>&lt;&lt;interface&gt;&gt;</a:t>
+                </a:r>
+                <a:br>
+                  <a:rPr lang="en-US" sz="1050" dirty="0">
+                    <a:solidFill>
+                      <a:schemeClr val="bg1"/>
+                    </a:solidFill>
+                  </a:rPr>
+                </a:br>
+                <a:r>
+                  <a:rPr lang="en-US" sz="1050" dirty="0" err="1">
+                    <a:solidFill>
+                      <a:schemeClr val="bg1"/>
+                    </a:solidFill>
+                  </a:rPr>
+                  <a:t>UserPrefsStorage</a:t>
+                </a:r>
+                <a:endParaRPr lang="en-SG" sz="1050" dirty="0">
+                  <a:solidFill>
+                    <a:schemeClr val="bg1"/>
+                  </a:solidFill>
+                </a:endParaRPr>
+              </a:p>
+            </p:txBody>
+          </p:sp>
+          <p:cxnSp>
+            <p:nvCxnSpPr>
+              <p:cNvPr id="54" name="Straight Arrow Connector 53"/>
+              <p:cNvCxnSpPr>
+                <a:stCxn id="56" idx="3"/>
+                <a:endCxn id="52" idx="1"/>
+              </p:cNvCxnSpPr>
+              <p:nvPr/>
+            </p:nvCxnSpPr>
+            <p:spPr>
+              <a:xfrm>
+                <a:off x="4131005" y="2673459"/>
+                <a:ext cx="220810" cy="5284"/>
+              </a:xfrm>
+              <a:prstGeom prst="straightConnector1">
+                <a:avLst/>
+              </a:prstGeom>
+              <a:ln w="19050">
+                <a:solidFill>
+                  <a:schemeClr val="accent6">
+                    <a:lumMod val="75000"/>
+                  </a:schemeClr>
+                </a:solidFill>
+                <a:headEnd type="none" w="med" len="med"/>
+                <a:tailEnd type="arrow" w="med" len="med"/>
+              </a:ln>
+              <a:effectLst/>
+            </p:spPr>
+            <p:style>
+              <a:lnRef idx="1">
+                <a:schemeClr val="accent2"/>
+              </a:lnRef>
+              <a:fillRef idx="2">
+                <a:schemeClr val="accent2"/>
+              </a:fillRef>
+              <a:effectRef idx="1">
+                <a:schemeClr val="accent2"/>
+              </a:effectRef>
+              <a:fontRef idx="minor">
+                <a:schemeClr val="dk1"/>
+              </a:fontRef>
+            </p:style>
+          </p:cxnSp>
+          <p:sp>
+            <p:nvSpPr>
+              <p:cNvPr id="56" name="Flowchart: Decision 96"/>
+              <p:cNvSpPr/>
+              <p:nvPr/>
+            </p:nvSpPr>
+            <p:spPr>
+              <a:xfrm>
+                <a:off x="3894957" y="2586769"/>
+                <a:ext cx="236048" cy="173380"/>
+              </a:xfrm>
+              <a:prstGeom prst="flowChartDecision">
+                <a:avLst/>
+              </a:prstGeom>
+              <a:noFill/>
+              <a:ln w="19050">
+                <a:solidFill>
+                  <a:schemeClr val="accent6">
+                    <a:lumMod val="75000"/>
+                  </a:schemeClr>
+                </a:solidFill>
+              </a:ln>
+              <a:effectLst/>
+            </p:spPr>
+            <p:style>
+              <a:lnRef idx="1">
+                <a:schemeClr val="accent2"/>
+              </a:lnRef>
+              <a:fillRef idx="2">
+                <a:schemeClr val="accent2"/>
+              </a:fillRef>
+              <a:effectRef idx="1">
+                <a:schemeClr val="accent2"/>
+              </a:effectRef>
+              <a:fontRef idx="minor">
+                <a:schemeClr val="dk1"/>
+              </a:fontRef>
+            </p:style>
+            <p:txBody>
+              <a:bodyPr rtlCol="0" anchor="ctr"/>
+              <a:lstStyle/>
+              <a:p>
+                <a:pPr algn="ctr"/>
+                <a:endParaRPr lang="en-US" sz="1050">
+                  <a:solidFill>
+                    <a:schemeClr val="bg1"/>
+                  </a:solidFill>
+                </a:endParaRPr>
+              </a:p>
+            </p:txBody>
+          </p:sp>
+          <p:cxnSp>
+            <p:nvCxnSpPr>
+              <p:cNvPr id="60" name="Elbow Connector 63"/>
+              <p:cNvCxnSpPr>
+                <a:stCxn id="61" idx="3"/>
+                <a:endCxn id="65" idx="1"/>
+              </p:cNvCxnSpPr>
+              <p:nvPr/>
+            </p:nvCxnSpPr>
+            <p:spPr>
+              <a:xfrm flipV="1">
+                <a:off x="5872676" y="2678743"/>
+                <a:ext cx="223324" cy="1"/>
+              </a:xfrm>
+              <a:prstGeom prst="bentConnector3">
+                <a:avLst>
+                  <a:gd name="adj1" fmla="val 50000"/>
+                </a:avLst>
+              </a:prstGeom>
+              <a:ln w="19050">
+                <a:solidFill>
+                  <a:schemeClr val="accent6">
+                    <a:lumMod val="75000"/>
+                  </a:schemeClr>
+                </a:solidFill>
+                <a:prstDash val="sysDot"/>
+                <a:headEnd type="none" w="med" len="med"/>
+                <a:tailEnd type="none" w="med" len="med"/>
+              </a:ln>
+              <a:effectLst/>
+            </p:spPr>
+            <p:style>
+              <a:lnRef idx="1">
+                <a:schemeClr val="accent2"/>
+              </a:lnRef>
+              <a:fillRef idx="2">
+                <a:schemeClr val="accent2"/>
+              </a:fillRef>
+              <a:effectRef idx="1">
+                <a:schemeClr val="accent2"/>
+              </a:effectRef>
+              <a:fontRef idx="minor">
+                <a:schemeClr val="dk1"/>
+              </a:fontRef>
+            </p:style>
+          </p:cxnSp>
+          <p:sp>
+            <p:nvSpPr>
+              <p:cNvPr id="61" name="Isosceles Triangle 102"/>
+              <p:cNvSpPr/>
+              <p:nvPr/>
+            </p:nvSpPr>
+            <p:spPr>
+              <a:xfrm rot="5400000" flipV="1">
+                <a:off x="5649662" y="2590982"/>
+                <a:ext cx="270504" cy="175523"/>
+              </a:xfrm>
+              <a:prstGeom prst="triangle">
+                <a:avLst/>
+              </a:prstGeom>
+              <a:solidFill>
+                <a:schemeClr val="accent6">
+                  <a:lumMod val="75000"/>
+                </a:schemeClr>
+              </a:solidFill>
+              <a:ln w="19050">
+                <a:solidFill>
+                  <a:schemeClr val="accent6">
+                    <a:lumMod val="75000"/>
+                  </a:schemeClr>
+                </a:solidFill>
+              </a:ln>
+              <a:effectLst/>
+            </p:spPr>
+            <p:style>
+              <a:lnRef idx="1">
+                <a:schemeClr val="accent2"/>
+              </a:lnRef>
+              <a:fillRef idx="2">
+                <a:schemeClr val="accent2"/>
+              </a:fillRef>
+              <a:effectRef idx="1">
+                <a:schemeClr val="accent2"/>
+              </a:effectRef>
+              <a:fontRef idx="minor">
+                <a:schemeClr val="dk1"/>
+              </a:fontRef>
+            </p:style>
+            <p:txBody>
+              <a:bodyPr rtlCol="0" anchor="ctr"/>
+              <a:lstStyle/>
+              <a:p>
+                <a:pPr algn="ctr"/>
+                <a:endParaRPr lang="en-SG" sz="1050">
+                  <a:solidFill>
+                    <a:schemeClr val="bg1"/>
+                  </a:solidFill>
+                </a:endParaRPr>
+              </a:p>
+            </p:txBody>
+          </p:sp>
+          <p:sp>
+            <p:nvSpPr>
+              <p:cNvPr id="65" name="Rectangle 8"/>
+              <p:cNvSpPr/>
+              <p:nvPr/>
+            </p:nvSpPr>
+            <p:spPr>
+              <a:xfrm>
+                <a:off x="6096000" y="2505363"/>
+                <a:ext cx="1093635" cy="346760"/>
+              </a:xfrm>
+              <a:prstGeom prst="rect">
+                <a:avLst/>
+              </a:prstGeom>
+              <a:solidFill>
+                <a:schemeClr val="accent6">
+                  <a:lumMod val="75000"/>
+                </a:schemeClr>
+              </a:solidFill>
+              <a:ln w="19050">
+                <a:solidFill>
+                  <a:schemeClr val="accent6">
+                    <a:lumMod val="75000"/>
+                  </a:schemeClr>
+                </a:solidFill>
+              </a:ln>
+              <a:effectLst/>
+            </p:spPr>
+            <p:style>
+              <a:lnRef idx="1">
+                <a:schemeClr val="accent2"/>
+              </a:lnRef>
+              <a:fillRef idx="2">
+                <a:schemeClr val="accent2"/>
+              </a:fillRef>
+              <a:effectRef idx="1">
+                <a:schemeClr val="accent2"/>
+              </a:effectRef>
+              <a:fontRef idx="minor">
+                <a:schemeClr val="dk1"/>
+              </a:fontRef>
+            </p:style>
+            <p:txBody>
+              <a:bodyPr rtlCol="0" anchor="ctr"/>
+              <a:lstStyle/>
+              <a:p>
+                <a:pPr algn="ctr"/>
+                <a:r>
+                  <a:rPr lang="en-US" sz="1050" dirty="0" err="1">
+                    <a:solidFill>
+                      <a:schemeClr val="bg1"/>
+                    </a:solidFill>
+                  </a:rPr>
+                  <a:t>JsonUserPrefs</a:t>
+                </a:r>
+                <a:br>
+                  <a:rPr lang="en-US" sz="1050" dirty="0">
+                    <a:solidFill>
+                      <a:schemeClr val="bg1"/>
+                    </a:solidFill>
+                  </a:rPr>
+                </a:br>
+                <a:r>
+                  <a:rPr lang="en-US" sz="1050" dirty="0">
+                    <a:solidFill>
+                      <a:schemeClr val="bg1"/>
+                    </a:solidFill>
+                  </a:rPr>
+                  <a:t>Storage</a:t>
+                </a:r>
+                <a:endParaRPr lang="en-SG" sz="1050" dirty="0">
+                  <a:solidFill>
+                    <a:schemeClr val="bg1"/>
+                  </a:solidFill>
+                </a:endParaRPr>
+              </a:p>
+            </p:txBody>
+          </p:sp>
+          <p:sp>
+            <p:nvSpPr>
+              <p:cNvPr id="66" name="Rectangle 8"/>
+              <p:cNvSpPr/>
+              <p:nvPr/>
+            </p:nvSpPr>
+            <p:spPr>
+              <a:xfrm>
+                <a:off x="4895293" y="3778328"/>
+                <a:ext cx="1200707" cy="346760"/>
+              </a:xfrm>
+              <a:prstGeom prst="rect">
+                <a:avLst/>
+              </a:prstGeom>
+              <a:ln w="19050"/>
+              <a:effectLst/>
+            </p:spPr>
+            <p:style>
+              <a:lnRef idx="1">
+                <a:schemeClr val="accent6"/>
+              </a:lnRef>
+              <a:fillRef idx="2">
+                <a:schemeClr val="accent6"/>
+              </a:fillRef>
+              <a:effectRef idx="1">
+                <a:schemeClr val="accent6"/>
+              </a:effectRef>
+              <a:fontRef idx="minor">
+                <a:schemeClr val="dk1"/>
+              </a:fontRef>
+            </p:style>
+            <p:txBody>
+              <a:bodyPr rtlCol="0" anchor="ctr"/>
+              <a:lstStyle/>
+              <a:p>
+                <a:pPr algn="ctr"/>
+                <a:r>
+                  <a:rPr lang="en-US" sz="1050" b="1" dirty="0" err="1">
+                    <a:solidFill>
+                      <a:schemeClr val="accent6">
+                        <a:lumMod val="75000"/>
+                      </a:schemeClr>
+                    </a:solidFill>
+                  </a:rPr>
+                  <a:t>JsonSerializable</a:t>
+                </a:r>
+                <a:br>
+                  <a:rPr lang="en-US" sz="1050" b="1" dirty="0">
+                    <a:solidFill>
+                      <a:schemeClr val="accent6">
+                        <a:lumMod val="75000"/>
+                      </a:schemeClr>
+                    </a:solidFill>
+                  </a:rPr>
+                </a:br>
+                <a:r>
+                  <a:rPr lang="en-US" sz="1050" b="1" dirty="0">
+                    <a:solidFill>
+                      <a:schemeClr val="accent6">
+                        <a:lumMod val="75000"/>
+                      </a:schemeClr>
+                    </a:solidFill>
+                  </a:rPr>
+                  <a:t>Application</a:t>
+                </a:r>
+                <a:endParaRPr lang="en-SG" sz="1050" b="1" dirty="0">
+                  <a:solidFill>
+                    <a:schemeClr val="accent6">
+                      <a:lumMod val="75000"/>
+                    </a:schemeClr>
+                  </a:solidFill>
+                </a:endParaRPr>
+              </a:p>
+            </p:txBody>
+          </p:sp>
+          <p:sp>
+            <p:nvSpPr>
+              <p:cNvPr id="73" name="Rectangle 8"/>
+              <p:cNvSpPr/>
+              <p:nvPr/>
+            </p:nvSpPr>
+            <p:spPr>
+              <a:xfrm>
+                <a:off x="6981119" y="5533714"/>
+                <a:ext cx="1405507" cy="346760"/>
+              </a:xfrm>
+              <a:prstGeom prst="rect">
+                <a:avLst/>
+              </a:prstGeom>
+              <a:ln w="19050"/>
+              <a:effectLst/>
+            </p:spPr>
+            <p:style>
+              <a:lnRef idx="1">
+                <a:schemeClr val="accent6"/>
+              </a:lnRef>
+              <a:fillRef idx="2">
+                <a:schemeClr val="accent6"/>
+              </a:fillRef>
+              <a:effectRef idx="1">
+                <a:schemeClr val="accent6"/>
+              </a:effectRef>
+              <a:fontRef idx="minor">
+                <a:schemeClr val="dk1"/>
+              </a:fontRef>
+            </p:style>
+            <p:txBody>
+              <a:bodyPr rtlCol="0" anchor="ctr"/>
+              <a:lstStyle/>
+              <a:p>
+                <a:pPr algn="ctr"/>
+                <a:r>
+                  <a:rPr lang="en-US" sz="1050" b="1" dirty="0" err="1">
+                    <a:solidFill>
+                      <a:schemeClr val="accent6">
+                        <a:lumMod val="75000"/>
+                      </a:schemeClr>
+                    </a:solidFill>
+                  </a:rPr>
+                  <a:t>JsonAdaptedTag</a:t>
+                </a:r>
+                <a:endParaRPr lang="en-SG" sz="1050" b="1" dirty="0">
+                  <a:solidFill>
+                    <a:schemeClr val="accent6">
+                      <a:lumMod val="75000"/>
+                    </a:schemeClr>
+                  </a:solidFill>
+                </a:endParaRPr>
+              </a:p>
+            </p:txBody>
+          </p:sp>
+          <p:cxnSp>
+            <p:nvCxnSpPr>
+              <p:cNvPr id="37" name="Elbow Connector 122">
+                <a:extLst>
+                  <a:ext uri="{FF2B5EF4-FFF2-40B4-BE49-F238E27FC236}">
+                    <a16:creationId xmlns:a16="http://schemas.microsoft.com/office/drawing/2014/main" id="{6C6BD4DE-078B-4478-A2A0-BF45F863C92D}"/>
+                  </a:ext>
+                </a:extLst>
+              </p:cNvPr>
+              <p:cNvCxnSpPr>
+                <a:cxnSpLocks/>
+                <a:stCxn id="66" idx="2"/>
+                <a:endCxn id="38" idx="0"/>
+              </p:cNvCxnSpPr>
+              <p:nvPr/>
+            </p:nvCxnSpPr>
+            <p:spPr>
+              <a:xfrm rot="5400000">
+                <a:off x="5347549" y="4273186"/>
+                <a:ext cx="296197" cy="1"/>
+              </a:xfrm>
+              <a:prstGeom prst="bentConnector3">
+                <a:avLst>
+                  <a:gd name="adj1" fmla="val 50000"/>
+                </a:avLst>
+              </a:prstGeom>
+              <a:ln w="19050">
+                <a:solidFill>
+                  <a:schemeClr val="accent6">
+                    <a:lumMod val="75000"/>
+                  </a:schemeClr>
+                </a:solidFill>
+                <a:prstDash val="sysDot"/>
+                <a:headEnd type="none" w="med" len="med"/>
+                <a:tailEnd type="arrow" w="med" len="med"/>
+              </a:ln>
+              <a:effectLst/>
+            </p:spPr>
+            <p:style>
+              <a:lnRef idx="1">
+                <a:schemeClr val="accent2"/>
+              </a:lnRef>
+              <a:fillRef idx="2">
+                <a:schemeClr val="accent2"/>
+              </a:fillRef>
+              <a:effectRef idx="1">
+                <a:schemeClr val="accent2"/>
+              </a:effectRef>
+              <a:fontRef idx="minor">
+                <a:schemeClr val="dk1"/>
+              </a:fontRef>
+            </p:style>
+          </p:cxnSp>
+          <p:sp>
+            <p:nvSpPr>
+              <p:cNvPr id="38" name="Rectangle 8">
+                <a:extLst>
+                  <a:ext uri="{FF2B5EF4-FFF2-40B4-BE49-F238E27FC236}">
+                    <a16:creationId xmlns:a16="http://schemas.microsoft.com/office/drawing/2014/main" id="{AF712354-A047-4445-9A49-E11CB796F952}"/>
+                  </a:ext>
+                </a:extLst>
+              </p:cNvPr>
+              <p:cNvSpPr/>
+              <p:nvPr/>
+            </p:nvSpPr>
+            <p:spPr>
+              <a:xfrm>
+                <a:off x="4684718" y="4421285"/>
+                <a:ext cx="1621856" cy="346760"/>
+              </a:xfrm>
+              <a:prstGeom prst="rect">
+                <a:avLst/>
+              </a:prstGeom>
+              <a:ln w="19050"/>
+              <a:effectLst/>
+            </p:spPr>
+            <p:style>
+              <a:lnRef idx="1">
+                <a:schemeClr val="accent6"/>
+              </a:lnRef>
+              <a:fillRef idx="2">
+                <a:schemeClr val="accent6"/>
+              </a:fillRef>
+              <a:effectRef idx="1">
+                <a:schemeClr val="accent6"/>
+              </a:effectRef>
+              <a:fontRef idx="minor">
+                <a:schemeClr val="dk1"/>
+              </a:fontRef>
+            </p:style>
+            <p:txBody>
+              <a:bodyPr rtlCol="0" anchor="ctr"/>
+              <a:lstStyle/>
+              <a:p>
+                <a:pPr algn="ctr"/>
+                <a:r>
+                  <a:rPr lang="en-US" sz="1050" b="1" dirty="0" err="1">
+                    <a:solidFill>
+                      <a:schemeClr val="accent6">
+                        <a:lumMod val="75000"/>
+                      </a:schemeClr>
+                    </a:solidFill>
+                  </a:rPr>
+                  <a:t>JsonSerializable</a:t>
+                </a:r>
+                <a:br>
+                  <a:rPr lang="en-US" sz="1050" b="1" dirty="0">
+                    <a:solidFill>
+                      <a:schemeClr val="accent6">
+                        <a:lumMod val="75000"/>
+                      </a:schemeClr>
+                    </a:solidFill>
+                  </a:rPr>
+                </a:br>
+                <a:r>
+                  <a:rPr lang="en-US" sz="1050" b="1" dirty="0" err="1">
+                    <a:solidFill>
+                      <a:schemeClr val="accent6">
+                        <a:lumMod val="75000"/>
+                      </a:schemeClr>
+                    </a:solidFill>
+                  </a:rPr>
+                  <a:t>RequirementCategoryList</a:t>
+                </a:r>
+                <a:endParaRPr lang="en-SG" sz="1050" b="1" dirty="0">
+                  <a:solidFill>
+                    <a:schemeClr val="accent6">
+                      <a:lumMod val="75000"/>
+                    </a:schemeClr>
+                  </a:solidFill>
+                </a:endParaRPr>
+              </a:p>
+            </p:txBody>
+          </p:sp>
+          <p:sp>
+            <p:nvSpPr>
+              <p:cNvPr id="39" name="Rectangle 8">
+                <a:extLst>
+                  <a:ext uri="{FF2B5EF4-FFF2-40B4-BE49-F238E27FC236}">
+                    <a16:creationId xmlns:a16="http://schemas.microsoft.com/office/drawing/2014/main" id="{24867C62-854D-4D85-B324-1E7EA74C8742}"/>
+                  </a:ext>
+                </a:extLst>
+              </p:cNvPr>
+              <p:cNvSpPr/>
+              <p:nvPr/>
+            </p:nvSpPr>
+            <p:spPr>
+              <a:xfrm>
+                <a:off x="6939319" y="4375869"/>
+                <a:ext cx="1450068" cy="346760"/>
+              </a:xfrm>
+              <a:prstGeom prst="rect">
+                <a:avLst/>
+              </a:prstGeom>
+              <a:ln w="19050"/>
+              <a:effectLst/>
+            </p:spPr>
+            <p:style>
+              <a:lnRef idx="1">
+                <a:schemeClr val="accent6"/>
+              </a:lnRef>
+              <a:fillRef idx="2">
+                <a:schemeClr val="accent6"/>
+              </a:fillRef>
+              <a:effectRef idx="1">
+                <a:schemeClr val="accent6"/>
+              </a:effectRef>
+              <a:fontRef idx="minor">
+                <a:schemeClr val="dk1"/>
+              </a:fontRef>
+            </p:style>
+            <p:txBody>
+              <a:bodyPr rtlCol="0" anchor="ctr"/>
+              <a:lstStyle/>
+              <a:p>
+                <a:pPr algn="ctr"/>
+                <a:r>
+                  <a:rPr lang="en-US" sz="1050" b="1" dirty="0" err="1">
+                    <a:solidFill>
+                      <a:schemeClr val="accent6">
+                        <a:lumMod val="75000"/>
+                      </a:schemeClr>
+                    </a:solidFill>
+                  </a:rPr>
+                  <a:t>JsonSerializable</a:t>
+                </a:r>
+                <a:br>
+                  <a:rPr lang="en-US" sz="1050" b="1" dirty="0">
+                    <a:solidFill>
+                      <a:schemeClr val="accent6">
+                        <a:lumMod val="75000"/>
+                      </a:schemeClr>
+                    </a:solidFill>
+                  </a:rPr>
+                </a:br>
+                <a:r>
+                  <a:rPr lang="en-US" sz="1050" b="1" dirty="0" err="1">
+                    <a:solidFill>
+                      <a:schemeClr val="accent6">
+                        <a:lumMod val="75000"/>
+                      </a:schemeClr>
+                    </a:solidFill>
+                  </a:rPr>
+                  <a:t>ModuleList</a:t>
+                </a:r>
+                <a:endParaRPr lang="en-SG" sz="1050" b="1" dirty="0">
+                  <a:solidFill>
+                    <a:schemeClr val="accent6">
+                      <a:lumMod val="75000"/>
+                    </a:schemeClr>
+                  </a:solidFill>
+                </a:endParaRPr>
+              </a:p>
+            </p:txBody>
+          </p:sp>
+          <p:sp>
+            <p:nvSpPr>
+              <p:cNvPr id="40" name="Rectangle 8">
+                <a:extLst>
+                  <a:ext uri="{FF2B5EF4-FFF2-40B4-BE49-F238E27FC236}">
+                    <a16:creationId xmlns:a16="http://schemas.microsoft.com/office/drawing/2014/main" id="{62F39C93-A0F1-43E2-8031-64CE109DC333}"/>
+                  </a:ext>
+                </a:extLst>
+              </p:cNvPr>
+              <p:cNvSpPr/>
+              <p:nvPr/>
+            </p:nvSpPr>
+            <p:spPr>
+              <a:xfrm>
+                <a:off x="2821741" y="4350002"/>
+                <a:ext cx="1200707" cy="346760"/>
+              </a:xfrm>
+              <a:prstGeom prst="rect">
+                <a:avLst/>
+              </a:prstGeom>
+              <a:ln w="19050"/>
+              <a:effectLst/>
+            </p:spPr>
+            <p:style>
+              <a:lnRef idx="1">
+                <a:schemeClr val="accent6"/>
+              </a:lnRef>
+              <a:fillRef idx="2">
+                <a:schemeClr val="accent6"/>
+              </a:fillRef>
+              <a:effectRef idx="1">
+                <a:schemeClr val="accent6"/>
+              </a:effectRef>
+              <a:fontRef idx="minor">
+                <a:schemeClr val="dk1"/>
+              </a:fontRef>
+            </p:style>
+            <p:txBody>
+              <a:bodyPr rtlCol="0" anchor="ctr"/>
+              <a:lstStyle/>
+              <a:p>
+                <a:pPr algn="ctr"/>
+                <a:r>
+                  <a:rPr lang="en-US" sz="1050" b="1" dirty="0" err="1">
+                    <a:solidFill>
+                      <a:schemeClr val="accent6">
+                        <a:lumMod val="75000"/>
+                      </a:schemeClr>
+                    </a:solidFill>
+                  </a:rPr>
+                  <a:t>JsonSerializable</a:t>
+                </a:r>
+                <a:br>
+                  <a:rPr lang="en-US" sz="1050" b="1" dirty="0">
+                    <a:solidFill>
+                      <a:schemeClr val="accent6">
+                        <a:lumMod val="75000"/>
+                      </a:schemeClr>
+                    </a:solidFill>
+                  </a:rPr>
+                </a:br>
+                <a:r>
+                  <a:rPr lang="en-US" sz="1050" b="1" dirty="0" err="1">
+                    <a:solidFill>
+                      <a:schemeClr val="accent6">
+                        <a:lumMod val="75000"/>
+                      </a:schemeClr>
+                    </a:solidFill>
+                  </a:rPr>
+                  <a:t>DegreePlannerList</a:t>
+                </a:r>
+                <a:endParaRPr lang="en-SG" sz="1050" b="1" dirty="0">
+                  <a:solidFill>
+                    <a:schemeClr val="accent6">
+                      <a:lumMod val="75000"/>
+                    </a:schemeClr>
+                  </a:solidFill>
+                </a:endParaRPr>
+              </a:p>
+            </p:txBody>
+          </p:sp>
+          <p:cxnSp>
+            <p:nvCxnSpPr>
+              <p:cNvPr id="43" name="Elbow Connector 122">
+                <a:extLst>
+                  <a:ext uri="{FF2B5EF4-FFF2-40B4-BE49-F238E27FC236}">
+                    <a16:creationId xmlns:a16="http://schemas.microsoft.com/office/drawing/2014/main" id="{8594D4BB-BD8F-4379-871A-5BC61B299381}"/>
+                  </a:ext>
+                </a:extLst>
+              </p:cNvPr>
+              <p:cNvCxnSpPr>
+                <a:cxnSpLocks/>
+                <a:stCxn id="66" idx="2"/>
+                <a:endCxn id="40" idx="0"/>
+              </p:cNvCxnSpPr>
+              <p:nvPr/>
+            </p:nvCxnSpPr>
+            <p:spPr>
+              <a:xfrm rot="5400000">
+                <a:off x="4346414" y="3200769"/>
+                <a:ext cx="224914" cy="2073552"/>
+              </a:xfrm>
+              <a:prstGeom prst="bentConnector3">
+                <a:avLst>
+                  <a:gd name="adj1" fmla="val 50000"/>
+                </a:avLst>
+              </a:prstGeom>
+              <a:ln w="19050">
+                <a:solidFill>
+                  <a:schemeClr val="accent6">
+                    <a:lumMod val="75000"/>
+                  </a:schemeClr>
+                </a:solidFill>
+                <a:prstDash val="sysDot"/>
+                <a:headEnd type="none" w="med" len="med"/>
+                <a:tailEnd type="arrow" w="med" len="med"/>
+              </a:ln>
+              <a:effectLst/>
+            </p:spPr>
+            <p:style>
+              <a:lnRef idx="1">
+                <a:schemeClr val="accent2"/>
+              </a:lnRef>
+              <a:fillRef idx="2">
+                <a:schemeClr val="accent2"/>
+              </a:fillRef>
+              <a:effectRef idx="1">
+                <a:schemeClr val="accent2"/>
+              </a:effectRef>
+              <a:fontRef idx="minor">
+                <a:schemeClr val="dk1"/>
+              </a:fontRef>
+            </p:style>
+          </p:cxnSp>
+          <p:cxnSp>
+            <p:nvCxnSpPr>
+              <p:cNvPr id="46" name="Elbow Connector 122">
+                <a:extLst>
+                  <a:ext uri="{FF2B5EF4-FFF2-40B4-BE49-F238E27FC236}">
+                    <a16:creationId xmlns:a16="http://schemas.microsoft.com/office/drawing/2014/main" id="{DA8DB951-9AC5-4F09-91E1-577DD8AD2FF4}"/>
+                  </a:ext>
+                </a:extLst>
+              </p:cNvPr>
+              <p:cNvCxnSpPr>
+                <a:cxnSpLocks/>
+                <a:stCxn id="66" idx="2"/>
+                <a:endCxn id="39" idx="0"/>
+              </p:cNvCxnSpPr>
+              <p:nvPr/>
+            </p:nvCxnSpPr>
+            <p:spPr>
+              <a:xfrm rot="16200000" flipH="1">
+                <a:off x="6454610" y="3166125"/>
+                <a:ext cx="250781" cy="2168706"/>
+              </a:xfrm>
+              <a:prstGeom prst="bentConnector3">
+                <a:avLst>
+                  <a:gd name="adj1" fmla="val 50000"/>
+                </a:avLst>
+              </a:prstGeom>
+              <a:ln w="19050">
+                <a:solidFill>
+                  <a:schemeClr val="accent6">
+                    <a:lumMod val="75000"/>
+                  </a:schemeClr>
+                </a:solidFill>
+                <a:prstDash val="sysDot"/>
+                <a:headEnd type="none" w="med" len="med"/>
+                <a:tailEnd type="arrow" w="med" len="med"/>
+              </a:ln>
+              <a:effectLst/>
+            </p:spPr>
+            <p:style>
+              <a:lnRef idx="1">
+                <a:schemeClr val="accent2"/>
+              </a:lnRef>
+              <a:fillRef idx="2">
+                <a:schemeClr val="accent2"/>
+              </a:fillRef>
+              <a:effectRef idx="1">
+                <a:schemeClr val="accent2"/>
+              </a:effectRef>
+              <a:fontRef idx="minor">
+                <a:schemeClr val="dk1"/>
+              </a:fontRef>
+            </p:style>
+          </p:cxnSp>
+          <p:sp>
+            <p:nvSpPr>
+              <p:cNvPr id="49" name="Rectangle 8">
+                <a:extLst>
+                  <a:ext uri="{FF2B5EF4-FFF2-40B4-BE49-F238E27FC236}">
+                    <a16:creationId xmlns:a16="http://schemas.microsoft.com/office/drawing/2014/main" id="{1EE6BF26-A055-4F50-918D-14F1091D7BC7}"/>
+                  </a:ext>
+                </a:extLst>
+              </p:cNvPr>
+              <p:cNvSpPr/>
+              <p:nvPr/>
+            </p:nvSpPr>
+            <p:spPr>
+              <a:xfrm>
+                <a:off x="2835494" y="4944678"/>
+                <a:ext cx="1200707" cy="346760"/>
+              </a:xfrm>
+              <a:prstGeom prst="rect">
+                <a:avLst/>
+              </a:prstGeom>
+              <a:ln w="19050"/>
+              <a:effectLst/>
+            </p:spPr>
+            <p:style>
+              <a:lnRef idx="1">
+                <a:schemeClr val="accent6"/>
+              </a:lnRef>
+              <a:fillRef idx="2">
+                <a:schemeClr val="accent6"/>
+              </a:fillRef>
+              <a:effectRef idx="1">
+                <a:schemeClr val="accent6"/>
+              </a:effectRef>
+              <a:fontRef idx="minor">
+                <a:schemeClr val="dk1"/>
+              </a:fontRef>
+            </p:style>
+            <p:txBody>
+              <a:bodyPr rtlCol="0" anchor="ctr"/>
+              <a:lstStyle/>
+              <a:p>
+                <a:pPr algn="ctr"/>
+                <a:r>
+                  <a:rPr lang="en-US" sz="1050" b="1" dirty="0" err="1">
+                    <a:solidFill>
+                      <a:schemeClr val="accent6">
+                        <a:lumMod val="75000"/>
+                      </a:schemeClr>
+                    </a:solidFill>
+                  </a:rPr>
+                  <a:t>JsonAdapted</a:t>
+                </a:r>
+                <a:br>
+                  <a:rPr lang="en-US" sz="1050" b="1" dirty="0">
+                    <a:solidFill>
+                      <a:schemeClr val="accent6">
+                        <a:lumMod val="75000"/>
+                      </a:schemeClr>
+                    </a:solidFill>
+                  </a:rPr>
+                </a:br>
+                <a:r>
+                  <a:rPr lang="en-US" sz="1050" b="1" dirty="0" err="1">
+                    <a:solidFill>
+                      <a:schemeClr val="accent6">
+                        <a:lumMod val="75000"/>
+                      </a:schemeClr>
+                    </a:solidFill>
+                  </a:rPr>
+                  <a:t>DegreePlanner</a:t>
+                </a:r>
+                <a:endParaRPr lang="en-SG" sz="1050" b="1" dirty="0">
+                  <a:solidFill>
+                    <a:schemeClr val="accent6">
+                      <a:lumMod val="75000"/>
+                    </a:schemeClr>
+                  </a:solidFill>
+                </a:endParaRPr>
+              </a:p>
+            </p:txBody>
+          </p:sp>
+          <p:sp>
+            <p:nvSpPr>
+              <p:cNvPr id="51" name="Rectangle 8">
+                <a:extLst>
+                  <a:ext uri="{FF2B5EF4-FFF2-40B4-BE49-F238E27FC236}">
+                    <a16:creationId xmlns:a16="http://schemas.microsoft.com/office/drawing/2014/main" id="{E29B6698-1D0F-4750-BD03-ACC5B240E399}"/>
+                  </a:ext>
+                </a:extLst>
+              </p:cNvPr>
+              <p:cNvSpPr/>
+              <p:nvPr/>
+            </p:nvSpPr>
+            <p:spPr>
+              <a:xfrm>
+                <a:off x="4898054" y="4938883"/>
+                <a:ext cx="1200707" cy="346760"/>
+              </a:xfrm>
+              <a:prstGeom prst="rect">
+                <a:avLst/>
+              </a:prstGeom>
+              <a:ln w="19050"/>
+              <a:effectLst/>
+            </p:spPr>
+            <p:style>
+              <a:lnRef idx="1">
+                <a:schemeClr val="accent6"/>
+              </a:lnRef>
+              <a:fillRef idx="2">
+                <a:schemeClr val="accent6"/>
+              </a:fillRef>
+              <a:effectRef idx="1">
+                <a:schemeClr val="accent6"/>
+              </a:effectRef>
+              <a:fontRef idx="minor">
+                <a:schemeClr val="dk1"/>
+              </a:fontRef>
+            </p:style>
+            <p:txBody>
+              <a:bodyPr rtlCol="0" anchor="ctr"/>
+              <a:lstStyle/>
+              <a:p>
+                <a:pPr algn="ctr"/>
+                <a:r>
+                  <a:rPr lang="en-US" sz="1050" b="1" dirty="0" err="1">
+                    <a:solidFill>
+                      <a:schemeClr val="accent6">
+                        <a:lumMod val="75000"/>
+                      </a:schemeClr>
+                    </a:solidFill>
+                  </a:rPr>
+                  <a:t>JsonAdapted</a:t>
+                </a:r>
+                <a:br>
+                  <a:rPr lang="en-US" sz="1050" b="1" dirty="0">
+                    <a:solidFill>
+                      <a:schemeClr val="accent6">
+                        <a:lumMod val="75000"/>
+                      </a:schemeClr>
+                    </a:solidFill>
+                  </a:rPr>
+                </a:br>
+                <a:r>
+                  <a:rPr lang="en-US" sz="1050" b="1" dirty="0" err="1">
+                    <a:solidFill>
+                      <a:schemeClr val="accent6">
+                        <a:lumMod val="75000"/>
+                      </a:schemeClr>
+                    </a:solidFill>
+                  </a:rPr>
+                  <a:t>RequirementList</a:t>
+                </a:r>
+                <a:endParaRPr lang="en-SG" sz="1050" b="1" dirty="0">
+                  <a:solidFill>
+                    <a:schemeClr val="accent6">
+                      <a:lumMod val="75000"/>
+                    </a:schemeClr>
+                  </a:solidFill>
+                </a:endParaRPr>
+              </a:p>
+            </p:txBody>
+          </p:sp>
+          <p:sp>
+            <p:nvSpPr>
+              <p:cNvPr id="55" name="Rectangle 8">
+                <a:extLst>
+                  <a:ext uri="{FF2B5EF4-FFF2-40B4-BE49-F238E27FC236}">
+                    <a16:creationId xmlns:a16="http://schemas.microsoft.com/office/drawing/2014/main" id="{46D0CB68-F420-458B-BED9-15DB056FEBC7}"/>
+                  </a:ext>
+                </a:extLst>
+              </p:cNvPr>
+              <p:cNvSpPr/>
+              <p:nvPr/>
+            </p:nvSpPr>
+            <p:spPr>
+              <a:xfrm>
+                <a:off x="6957853" y="4934905"/>
+                <a:ext cx="1420771" cy="346760"/>
+              </a:xfrm>
+              <a:prstGeom prst="rect">
+                <a:avLst/>
+              </a:prstGeom>
+              <a:ln w="19050"/>
+              <a:effectLst/>
+            </p:spPr>
+            <p:style>
+              <a:lnRef idx="1">
+                <a:schemeClr val="accent6"/>
+              </a:lnRef>
+              <a:fillRef idx="2">
+                <a:schemeClr val="accent6"/>
+              </a:fillRef>
+              <a:effectRef idx="1">
+                <a:schemeClr val="accent6"/>
+              </a:effectRef>
+              <a:fontRef idx="minor">
+                <a:schemeClr val="dk1"/>
+              </a:fontRef>
+            </p:style>
+            <p:txBody>
+              <a:bodyPr rtlCol="0" anchor="ctr"/>
+              <a:lstStyle/>
+              <a:p>
+                <a:pPr algn="ctr"/>
+                <a:r>
+                  <a:rPr lang="en-US" sz="1030" b="1" dirty="0" err="1">
+                    <a:solidFill>
+                      <a:schemeClr val="accent6">
+                        <a:lumMod val="75000"/>
+                      </a:schemeClr>
+                    </a:solidFill>
+                  </a:rPr>
+                  <a:t>JsonAdaptedModule</a:t>
+                </a:r>
+                <a:endParaRPr lang="en-SG" sz="1030" b="1" dirty="0">
+                  <a:solidFill>
+                    <a:schemeClr val="accent6">
+                      <a:lumMod val="75000"/>
+                    </a:schemeClr>
+                  </a:solidFill>
+                </a:endParaRPr>
+              </a:p>
+            </p:txBody>
+          </p:sp>
+          <p:cxnSp>
+            <p:nvCxnSpPr>
+              <p:cNvPr id="57" name="Elbow Connector 122">
+                <a:extLst>
+                  <a:ext uri="{FF2B5EF4-FFF2-40B4-BE49-F238E27FC236}">
+                    <a16:creationId xmlns:a16="http://schemas.microsoft.com/office/drawing/2014/main" id="{819F60E2-ADB0-4159-92FC-FC45338654CE}"/>
+                  </a:ext>
+                </a:extLst>
+              </p:cNvPr>
+              <p:cNvCxnSpPr>
+                <a:cxnSpLocks/>
+                <a:stCxn id="39" idx="2"/>
+                <a:endCxn id="55" idx="0"/>
+              </p:cNvCxnSpPr>
+              <p:nvPr/>
+            </p:nvCxnSpPr>
+            <p:spPr>
+              <a:xfrm rot="16200000" flipH="1">
+                <a:off x="7560158" y="4826824"/>
+                <a:ext cx="212276" cy="3886"/>
+              </a:xfrm>
+              <a:prstGeom prst="bentConnector3">
+                <a:avLst>
+                  <a:gd name="adj1" fmla="val 50000"/>
+                </a:avLst>
+              </a:prstGeom>
+              <a:ln w="19050">
+                <a:solidFill>
+                  <a:schemeClr val="accent6">
+                    <a:lumMod val="75000"/>
+                  </a:schemeClr>
+                </a:solidFill>
+                <a:prstDash val="sysDot"/>
+                <a:headEnd type="none" w="med" len="med"/>
+                <a:tailEnd type="arrow" w="med" len="med"/>
+              </a:ln>
+              <a:effectLst/>
+            </p:spPr>
+            <p:style>
+              <a:lnRef idx="1">
+                <a:schemeClr val="accent2"/>
+              </a:lnRef>
+              <a:fillRef idx="2">
+                <a:schemeClr val="accent2"/>
+              </a:fillRef>
+              <a:effectRef idx="1">
+                <a:schemeClr val="accent2"/>
+              </a:effectRef>
+              <a:fontRef idx="minor">
+                <a:schemeClr val="dk1"/>
+              </a:fontRef>
+            </p:style>
+          </p:cxnSp>
+          <p:cxnSp>
+            <p:nvCxnSpPr>
+              <p:cNvPr id="59" name="Elbow Connector 122">
+                <a:extLst>
+                  <a:ext uri="{FF2B5EF4-FFF2-40B4-BE49-F238E27FC236}">
+                    <a16:creationId xmlns:a16="http://schemas.microsoft.com/office/drawing/2014/main" id="{497685BC-3EB0-488D-8BF4-255CC76E950F}"/>
+                  </a:ext>
+                </a:extLst>
+              </p:cNvPr>
+              <p:cNvCxnSpPr>
+                <a:cxnSpLocks/>
+                <a:stCxn id="38" idx="2"/>
+                <a:endCxn id="51" idx="0"/>
+              </p:cNvCxnSpPr>
+              <p:nvPr/>
+            </p:nvCxnSpPr>
+            <p:spPr>
+              <a:xfrm rot="16200000" flipH="1">
+                <a:off x="5411608" y="4852083"/>
+                <a:ext cx="170838" cy="2762"/>
+              </a:xfrm>
+              <a:prstGeom prst="bentConnector3">
+                <a:avLst>
+                  <a:gd name="adj1" fmla="val 50000"/>
+                </a:avLst>
+              </a:prstGeom>
+              <a:ln w="19050">
+                <a:solidFill>
+                  <a:schemeClr val="accent6">
+                    <a:lumMod val="75000"/>
+                  </a:schemeClr>
+                </a:solidFill>
+                <a:prstDash val="sysDot"/>
+                <a:headEnd type="none" w="med" len="med"/>
+                <a:tailEnd type="arrow" w="med" len="med"/>
+              </a:ln>
+              <a:effectLst/>
+            </p:spPr>
+            <p:style>
+              <a:lnRef idx="1">
+                <a:schemeClr val="accent2"/>
+              </a:lnRef>
+              <a:fillRef idx="2">
+                <a:schemeClr val="accent2"/>
+              </a:fillRef>
+              <a:effectRef idx="1">
+                <a:schemeClr val="accent2"/>
+              </a:effectRef>
+              <a:fontRef idx="minor">
+                <a:schemeClr val="dk1"/>
+              </a:fontRef>
+            </p:style>
+          </p:cxnSp>
+          <p:cxnSp>
+            <p:nvCxnSpPr>
+              <p:cNvPr id="62" name="Elbow Connector 122">
+                <a:extLst>
+                  <a:ext uri="{FF2B5EF4-FFF2-40B4-BE49-F238E27FC236}">
+                    <a16:creationId xmlns:a16="http://schemas.microsoft.com/office/drawing/2014/main" id="{05E1C576-4CF8-4F2D-9E18-E6F7C31A0421}"/>
+                  </a:ext>
+                </a:extLst>
+              </p:cNvPr>
+              <p:cNvCxnSpPr>
+                <a:cxnSpLocks/>
+                <a:stCxn id="40" idx="2"/>
+                <a:endCxn id="49" idx="0"/>
+              </p:cNvCxnSpPr>
+              <p:nvPr/>
+            </p:nvCxnSpPr>
+            <p:spPr>
+              <a:xfrm rot="16200000" flipH="1">
+                <a:off x="3305013" y="4813843"/>
+                <a:ext cx="247916" cy="13753"/>
+              </a:xfrm>
+              <a:prstGeom prst="bentConnector3">
+                <a:avLst>
+                  <a:gd name="adj1" fmla="val 50000"/>
+                </a:avLst>
+              </a:prstGeom>
+              <a:ln w="19050">
+                <a:solidFill>
+                  <a:schemeClr val="accent6">
+                    <a:lumMod val="75000"/>
+                  </a:schemeClr>
+                </a:solidFill>
+                <a:prstDash val="sysDot"/>
+                <a:headEnd type="none" w="med" len="med"/>
+                <a:tailEnd type="arrow" w="med" len="med"/>
+              </a:ln>
+              <a:effectLst/>
+            </p:spPr>
+            <p:style>
+              <a:lnRef idx="1">
+                <a:schemeClr val="accent2"/>
+              </a:lnRef>
+              <a:fillRef idx="2">
+                <a:schemeClr val="accent2"/>
+              </a:fillRef>
+              <a:effectRef idx="1">
+                <a:schemeClr val="accent2"/>
+              </a:effectRef>
+              <a:fontRef idx="minor">
+                <a:schemeClr val="dk1"/>
+              </a:fontRef>
+            </p:style>
+          </p:cxnSp>
+          <p:sp>
+            <p:nvSpPr>
+              <p:cNvPr id="84" name="Rectangle 8">
+                <a:extLst>
+                  <a:ext uri="{FF2B5EF4-FFF2-40B4-BE49-F238E27FC236}">
+                    <a16:creationId xmlns:a16="http://schemas.microsoft.com/office/drawing/2014/main" id="{E37B3C1D-5BD0-47F7-89C9-1E681F13184E}"/>
+                  </a:ext>
+                </a:extLst>
+              </p:cNvPr>
+              <p:cNvSpPr/>
+              <p:nvPr/>
+            </p:nvSpPr>
+            <p:spPr>
+              <a:xfrm>
+                <a:off x="4898054" y="6694645"/>
+                <a:ext cx="1246555" cy="346760"/>
+              </a:xfrm>
+              <a:prstGeom prst="rect">
+                <a:avLst/>
+              </a:prstGeom>
+              <a:ln w="19050"/>
+              <a:effectLst/>
+            </p:spPr>
+            <p:style>
+              <a:lnRef idx="1">
+                <a:schemeClr val="accent6"/>
+              </a:lnRef>
+              <a:fillRef idx="2">
+                <a:schemeClr val="accent6"/>
+              </a:fillRef>
+              <a:effectRef idx="1">
+                <a:schemeClr val="accent6"/>
+              </a:effectRef>
+              <a:fontRef idx="minor">
+                <a:schemeClr val="dk1"/>
+              </a:fontRef>
+            </p:style>
+            <p:txBody>
+              <a:bodyPr rtlCol="0" anchor="ctr"/>
+              <a:lstStyle/>
+              <a:p>
+                <a:pPr algn="ctr"/>
+                <a:r>
+                  <a:rPr lang="en-US" sz="1050" b="1" dirty="0" err="1">
+                    <a:solidFill>
+                      <a:schemeClr val="accent6">
+                        <a:lumMod val="75000"/>
+                      </a:schemeClr>
+                    </a:solidFill>
+                  </a:rPr>
+                  <a:t>JsonAdaptedCode</a:t>
+                </a:r>
+                <a:endParaRPr lang="en-SG" sz="1050" b="1" dirty="0">
+                  <a:solidFill>
+                    <a:schemeClr val="accent6">
+                      <a:lumMod val="75000"/>
+                    </a:schemeClr>
+                  </a:solidFill>
+                </a:endParaRPr>
+              </a:p>
+            </p:txBody>
+          </p:sp>
+          <p:cxnSp>
+            <p:nvCxnSpPr>
+              <p:cNvPr id="85" name="Elbow Connector 122">
+                <a:extLst>
+                  <a:ext uri="{FF2B5EF4-FFF2-40B4-BE49-F238E27FC236}">
+                    <a16:creationId xmlns:a16="http://schemas.microsoft.com/office/drawing/2014/main" id="{9991B445-9091-456C-83A5-57D816B77127}"/>
+                  </a:ext>
+                </a:extLst>
+              </p:cNvPr>
+              <p:cNvCxnSpPr>
+                <a:cxnSpLocks/>
+                <a:stCxn id="51" idx="1"/>
+                <a:endCxn id="84" idx="1"/>
+              </p:cNvCxnSpPr>
+              <p:nvPr/>
+            </p:nvCxnSpPr>
+            <p:spPr>
+              <a:xfrm rot="10800000" flipV="1">
+                <a:off x="4898054" y="5112263"/>
+                <a:ext cx="12700" cy="1755762"/>
+              </a:xfrm>
+              <a:prstGeom prst="bentConnector3">
+                <a:avLst>
+                  <a:gd name="adj1" fmla="val 1800000"/>
+                </a:avLst>
+              </a:prstGeom>
+              <a:ln w="19050">
+                <a:solidFill>
+                  <a:schemeClr val="accent6">
+                    <a:lumMod val="75000"/>
+                  </a:schemeClr>
+                </a:solidFill>
+                <a:prstDash val="sysDot"/>
+                <a:headEnd type="none" w="med" len="med"/>
+                <a:tailEnd type="arrow" w="med" len="med"/>
+              </a:ln>
+              <a:effectLst/>
+            </p:spPr>
+            <p:style>
+              <a:lnRef idx="1">
+                <a:schemeClr val="accent2"/>
+              </a:lnRef>
+              <a:fillRef idx="2">
+                <a:schemeClr val="accent2"/>
+              </a:fillRef>
+              <a:effectRef idx="1">
+                <a:schemeClr val="accent2"/>
+              </a:effectRef>
+              <a:fontRef idx="minor">
+                <a:schemeClr val="dk1"/>
+              </a:fontRef>
+            </p:style>
+          </p:cxnSp>
+          <p:cxnSp>
+            <p:nvCxnSpPr>
+              <p:cNvPr id="88" name="Elbow Connector 122">
+                <a:extLst>
+                  <a:ext uri="{FF2B5EF4-FFF2-40B4-BE49-F238E27FC236}">
+                    <a16:creationId xmlns:a16="http://schemas.microsoft.com/office/drawing/2014/main" id="{C6373681-9F7C-40C9-A415-CF7E05083F3F}"/>
+                  </a:ext>
+                </a:extLst>
+              </p:cNvPr>
+              <p:cNvCxnSpPr>
+                <a:cxnSpLocks/>
+                <a:stCxn id="49" idx="3"/>
+                <a:endCxn id="84" idx="1"/>
+              </p:cNvCxnSpPr>
+              <p:nvPr/>
+            </p:nvCxnSpPr>
+            <p:spPr>
+              <a:xfrm>
+                <a:off x="4036201" y="5118058"/>
+                <a:ext cx="861853" cy="1749967"/>
+              </a:xfrm>
+              <a:prstGeom prst="bentConnector3">
+                <a:avLst>
+                  <a:gd name="adj1" fmla="val 50000"/>
+                </a:avLst>
+              </a:prstGeom>
+              <a:ln w="19050">
+                <a:solidFill>
+                  <a:schemeClr val="accent6">
+                    <a:lumMod val="75000"/>
+                  </a:schemeClr>
+                </a:solidFill>
+                <a:prstDash val="sysDot"/>
+                <a:headEnd type="none" w="med" len="med"/>
+                <a:tailEnd type="arrow" w="med" len="med"/>
+              </a:ln>
+              <a:effectLst/>
+            </p:spPr>
+            <p:style>
+              <a:lnRef idx="1">
+                <a:schemeClr val="accent2"/>
+              </a:lnRef>
+              <a:fillRef idx="2">
+                <a:schemeClr val="accent2"/>
+              </a:fillRef>
+              <a:effectRef idx="1">
+                <a:schemeClr val="accent2"/>
+              </a:effectRef>
+              <a:fontRef idx="minor">
+                <a:schemeClr val="dk1"/>
+              </a:fontRef>
+            </p:style>
+          </p:cxnSp>
+          <p:cxnSp>
+            <p:nvCxnSpPr>
+              <p:cNvPr id="91" name="Elbow Connector 122">
+                <a:extLst>
+                  <a:ext uri="{FF2B5EF4-FFF2-40B4-BE49-F238E27FC236}">
+                    <a16:creationId xmlns:a16="http://schemas.microsoft.com/office/drawing/2014/main" id="{7C266A05-812F-49C9-B251-38C1B1C0751D}"/>
+                  </a:ext>
+                </a:extLst>
+              </p:cNvPr>
+              <p:cNvCxnSpPr>
+                <a:cxnSpLocks/>
+                <a:stCxn id="55" idx="1"/>
+                <a:endCxn id="84" idx="3"/>
+              </p:cNvCxnSpPr>
+              <p:nvPr/>
+            </p:nvCxnSpPr>
+            <p:spPr>
+              <a:xfrm rot="10800000" flipV="1">
+                <a:off x="6144609" y="5108285"/>
+                <a:ext cx="813244" cy="1759740"/>
+              </a:xfrm>
+              <a:prstGeom prst="bentConnector3">
+                <a:avLst>
+                  <a:gd name="adj1" fmla="val 50000"/>
+                </a:avLst>
+              </a:prstGeom>
+              <a:ln w="19050">
+                <a:solidFill>
+                  <a:schemeClr val="accent6">
+                    <a:lumMod val="75000"/>
+                  </a:schemeClr>
+                </a:solidFill>
+                <a:prstDash val="sysDot"/>
+                <a:headEnd type="none" w="med" len="med"/>
+                <a:tailEnd type="arrow" w="med" len="med"/>
+              </a:ln>
+              <a:effectLst/>
+            </p:spPr>
+            <p:style>
+              <a:lnRef idx="1">
+                <a:schemeClr val="accent2"/>
+              </a:lnRef>
+              <a:fillRef idx="2">
+                <a:schemeClr val="accent2"/>
+              </a:fillRef>
+              <a:effectRef idx="1">
+                <a:schemeClr val="accent2"/>
+              </a:effectRef>
+              <a:fontRef idx="minor">
+                <a:schemeClr val="dk1"/>
+              </a:fontRef>
+            </p:style>
+          </p:cxnSp>
+          <p:cxnSp>
+            <p:nvCxnSpPr>
+              <p:cNvPr id="94" name="Elbow Connector 122">
+                <a:extLst>
+                  <a:ext uri="{FF2B5EF4-FFF2-40B4-BE49-F238E27FC236}">
+                    <a16:creationId xmlns:a16="http://schemas.microsoft.com/office/drawing/2014/main" id="{E9CF500D-0F3F-419C-A880-F8CAC840BE7F}"/>
+                  </a:ext>
+                </a:extLst>
+              </p:cNvPr>
+              <p:cNvCxnSpPr>
+                <a:cxnSpLocks/>
+                <a:stCxn id="55" idx="2"/>
+                <a:endCxn id="73" idx="0"/>
+              </p:cNvCxnSpPr>
+              <p:nvPr/>
+            </p:nvCxnSpPr>
+            <p:spPr>
+              <a:xfrm rot="16200000" flipH="1">
+                <a:off x="7550032" y="5399872"/>
+                <a:ext cx="252049" cy="15634"/>
+              </a:xfrm>
+              <a:prstGeom prst="bentConnector3">
+                <a:avLst>
+                  <a:gd name="adj1" fmla="val 50000"/>
+                </a:avLst>
+              </a:prstGeom>
+              <a:ln w="19050">
+                <a:solidFill>
+                  <a:schemeClr val="accent6">
+                    <a:lumMod val="75000"/>
+                  </a:schemeClr>
+                </a:solidFill>
+                <a:prstDash val="sysDot"/>
+                <a:headEnd type="none" w="med" len="med"/>
+                <a:tailEnd type="arrow" w="med" len="med"/>
+              </a:ln>
+              <a:effectLst/>
+            </p:spPr>
+            <p:style>
+              <a:lnRef idx="1">
+                <a:schemeClr val="accent2"/>
+              </a:lnRef>
+              <a:fillRef idx="2">
+                <a:schemeClr val="accent2"/>
+              </a:fillRef>
+              <a:effectRef idx="1">
+                <a:schemeClr val="accent2"/>
+              </a:effectRef>
+              <a:fontRef idx="minor">
+                <a:schemeClr val="dk1"/>
+              </a:fontRef>
+            </p:style>
+          </p:cxnSp>
+        </p:grpSp>
         <p:sp>
           <p:nvSpPr>
-            <p:cNvPr id="118" name="Rectangle 65"/>
+            <p:cNvPr id="41" name="Rectangle 8">
+              <a:extLst>
+                <a:ext uri="{FF2B5EF4-FFF2-40B4-BE49-F238E27FC236}">
+                  <a16:creationId xmlns:a16="http://schemas.microsoft.com/office/drawing/2014/main" id="{70AAFDC6-35BE-4EEC-831E-AFFC629488F4}"/>
+                </a:ext>
+              </a:extLst>
+            </p:cNvPr>
             <p:cNvSpPr/>
             <p:nvPr/>
           </p:nvSpPr>
           <p:spPr>
             <a:xfrm>
-              <a:off x="2643867" y="2086382"/>
-              <a:ext cx="4899934" cy="3930558"/>
-            </a:xfrm>
-            <a:prstGeom prst="roundRect">
-              <a:avLst>
-                <a:gd name="adj" fmla="val 3484"/>
-              </a:avLst>
-            </a:prstGeom>
-            <a:solidFill>
-              <a:schemeClr val="accent6">
-                <a:lumMod val="20000"/>
-                <a:lumOff val="80000"/>
-              </a:schemeClr>
-            </a:solidFill>
-            <a:ln w="19050">
-              <a:noFill/>
-            </a:ln>
-            <a:effectLst/>
-          </p:spPr>
-          <p:style>
-            <a:lnRef idx="1">
-              <a:schemeClr val="accent2"/>
-            </a:lnRef>
-            <a:fillRef idx="2">
-              <a:schemeClr val="accent2"/>
-            </a:fillRef>
-            <a:effectRef idx="1">
-              <a:schemeClr val="accent2"/>
-            </a:effectRef>
-            <a:fontRef idx="minor">
-              <a:schemeClr val="dk1"/>
-            </a:fontRef>
-          </p:style>
-          <p:txBody>
-            <a:bodyPr rtlCol="0" anchor="t"/>
-            <a:lstStyle/>
-            <a:p>
-              <a:r>
-                <a:rPr lang="en-US" sz="1200" b="1" dirty="0">
-                  <a:solidFill>
-                    <a:schemeClr val="accent6">
-                      <a:lumMod val="75000"/>
-                    </a:schemeClr>
-                  </a:solidFill>
-                </a:rPr>
-                <a:t>Storage</a:t>
-              </a:r>
-              <a:endParaRPr lang="en-SG" sz="1200" b="1" dirty="0">
-                <a:solidFill>
-                  <a:schemeClr val="accent6">
-                    <a:lumMod val="75000"/>
-                  </a:schemeClr>
-                </a:solidFill>
-              </a:endParaRPr>
-            </a:p>
-          </p:txBody>
-        </p:sp>
-        <p:sp>
-          <p:nvSpPr>
-            <p:cNvPr id="2" name="Rectangle 8"/>
-            <p:cNvSpPr/>
-            <p:nvPr/>
-          </p:nvSpPr>
-          <p:spPr>
-            <a:xfrm>
-              <a:off x="4355052" y="3105763"/>
-              <a:ext cx="1323049" cy="346760"/>
-            </a:xfrm>
-            <a:prstGeom prst="rect">
-              <a:avLst/>
-            </a:prstGeom>
-            <a:solidFill>
-              <a:schemeClr val="accent6">
-                <a:lumMod val="75000"/>
-              </a:schemeClr>
-            </a:solidFill>
-            <a:ln w="19050">
-              <a:solidFill>
-                <a:schemeClr val="accent6">
-                  <a:lumMod val="75000"/>
-                </a:schemeClr>
-              </a:solidFill>
-            </a:ln>
-            <a:effectLst/>
-          </p:spPr>
-          <p:style>
-            <a:lnRef idx="1">
-              <a:schemeClr val="accent2"/>
-            </a:lnRef>
-            <a:fillRef idx="2">
-              <a:schemeClr val="accent2"/>
-            </a:fillRef>
-            <a:effectRef idx="1">
-              <a:schemeClr val="accent2"/>
-            </a:effectRef>
-            <a:fontRef idx="minor">
-              <a:schemeClr val="dk1"/>
-            </a:fontRef>
-          </p:style>
-          <p:txBody>
-            <a:bodyPr rtlCol="0" anchor="ctr"/>
-            <a:lstStyle/>
-            <a:p>
-              <a:pPr algn="ctr"/>
-              <a:r>
-                <a:rPr lang="en-US" sz="1050" dirty="0">
-                  <a:solidFill>
-                    <a:schemeClr val="bg1"/>
-                  </a:solidFill>
-                </a:rPr>
-                <a:t>&lt;&lt;interface&gt;&gt;</a:t>
-              </a:r>
-              <a:br>
-                <a:rPr lang="en-US" sz="1050" dirty="0">
-                  <a:solidFill>
-                    <a:schemeClr val="bg1"/>
-                  </a:solidFill>
-                </a:rPr>
-              </a:br>
-              <a:r>
-                <a:rPr lang="en-US" sz="1050" dirty="0" err="1">
-                  <a:solidFill>
-                    <a:schemeClr val="bg1"/>
-                  </a:solidFill>
-                </a:rPr>
-                <a:t>AddressBookStorage</a:t>
-              </a:r>
-              <a:endParaRPr lang="en-SG" sz="1050" dirty="0">
-                <a:solidFill>
-                  <a:schemeClr val="bg1"/>
-                </a:solidFill>
-              </a:endParaRPr>
-            </a:p>
-          </p:txBody>
-        </p:sp>
-        <p:sp>
-          <p:nvSpPr>
-            <p:cNvPr id="9" name="Rectangle 62"/>
-            <p:cNvSpPr/>
-            <p:nvPr/>
-          </p:nvSpPr>
-          <p:spPr>
-            <a:xfrm rot="16200000">
-              <a:off x="3161835" y="2816010"/>
-              <a:ext cx="1093635" cy="346760"/>
-            </a:xfrm>
-            <a:prstGeom prst="rect">
-              <a:avLst/>
-            </a:prstGeom>
-            <a:solidFill>
-              <a:schemeClr val="accent6">
-                <a:lumMod val="75000"/>
-              </a:schemeClr>
-            </a:solidFill>
-            <a:ln w="19050">
-              <a:solidFill>
-                <a:schemeClr val="accent6">
-                  <a:lumMod val="75000"/>
-                </a:schemeClr>
-              </a:solidFill>
-            </a:ln>
-            <a:effectLst/>
-          </p:spPr>
-          <p:style>
-            <a:lnRef idx="1">
-              <a:schemeClr val="accent2"/>
-            </a:lnRef>
-            <a:fillRef idx="2">
-              <a:schemeClr val="accent2"/>
-            </a:fillRef>
-            <a:effectRef idx="1">
-              <a:schemeClr val="accent2"/>
-            </a:effectRef>
-            <a:fontRef idx="minor">
-              <a:schemeClr val="dk1"/>
-            </a:fontRef>
-          </p:style>
-          <p:txBody>
-            <a:bodyPr rtlCol="0" anchor="ctr"/>
-            <a:lstStyle/>
-            <a:p>
-              <a:pPr algn="ctr"/>
-              <a:r>
-                <a:rPr lang="en-US" sz="1050" dirty="0" err="1">
-                  <a:solidFill>
-                    <a:schemeClr val="bg1"/>
-                  </a:solidFill>
-                </a:rPr>
-                <a:t>StorageManager</a:t>
-              </a:r>
-              <a:endParaRPr lang="en-SG" sz="1050" dirty="0">
-                <a:solidFill>
-                  <a:schemeClr val="bg1"/>
-                </a:solidFill>
-              </a:endParaRPr>
-            </a:p>
-          </p:txBody>
-        </p:sp>
-        <p:sp>
-          <p:nvSpPr>
-            <p:cNvPr id="119" name="Rectangle 62"/>
-            <p:cNvSpPr/>
-            <p:nvPr/>
-          </p:nvSpPr>
-          <p:spPr>
-            <a:xfrm rot="16200000">
-              <a:off x="2434074" y="2808525"/>
-              <a:ext cx="1093635" cy="346760"/>
-            </a:xfrm>
-            <a:prstGeom prst="rect">
-              <a:avLst/>
-            </a:prstGeom>
-            <a:solidFill>
-              <a:schemeClr val="accent6">
-                <a:lumMod val="75000"/>
-              </a:schemeClr>
-            </a:solidFill>
-            <a:ln w="19050">
-              <a:solidFill>
-                <a:schemeClr val="accent6">
-                  <a:lumMod val="75000"/>
-                </a:schemeClr>
-              </a:solidFill>
-            </a:ln>
-            <a:effectLst/>
-          </p:spPr>
-          <p:style>
-            <a:lnRef idx="1">
-              <a:schemeClr val="accent2"/>
-            </a:lnRef>
-            <a:fillRef idx="2">
-              <a:schemeClr val="accent2"/>
-            </a:fillRef>
-            <a:effectRef idx="1">
-              <a:schemeClr val="accent2"/>
-            </a:effectRef>
-            <a:fontRef idx="minor">
-              <a:schemeClr val="dk1"/>
-            </a:fontRef>
-          </p:style>
-          <p:txBody>
-            <a:bodyPr rtlCol="0" anchor="ctr"/>
-            <a:lstStyle/>
-            <a:p>
-              <a:pPr algn="ctr"/>
-              <a:r>
-                <a:rPr lang="en-US" sz="1050" dirty="0">
-                  <a:solidFill>
-                    <a:schemeClr val="bg1"/>
-                  </a:solidFill>
-                </a:rPr>
-                <a:t>&lt;&lt;interface&gt;&gt;</a:t>
-              </a:r>
-            </a:p>
-            <a:p>
-              <a:pPr algn="ctr"/>
-              <a:r>
-                <a:rPr lang="en-US" sz="1050" dirty="0">
-                  <a:solidFill>
-                    <a:schemeClr val="bg1"/>
-                  </a:solidFill>
-                </a:rPr>
-                <a:t>Storage</a:t>
-              </a:r>
-              <a:endParaRPr lang="en-SG" sz="1050" dirty="0">
-                <a:solidFill>
-                  <a:schemeClr val="bg1"/>
-                </a:solidFill>
-              </a:endParaRPr>
-            </a:p>
-          </p:txBody>
-        </p:sp>
-        <p:sp>
-          <p:nvSpPr>
-            <p:cNvPr id="120" name="Isosceles Triangle 102"/>
-            <p:cNvSpPr/>
-            <p:nvPr/>
-          </p:nvSpPr>
-          <p:spPr>
-            <a:xfrm rot="16200000">
-              <a:off x="3104782" y="2899614"/>
-              <a:ext cx="270504" cy="175523"/>
-            </a:xfrm>
-            <a:prstGeom prst="triangle">
-              <a:avLst/>
-            </a:prstGeom>
-            <a:solidFill>
-              <a:schemeClr val="accent6">
-                <a:lumMod val="75000"/>
-              </a:schemeClr>
-            </a:solidFill>
-            <a:ln w="19050">
-              <a:solidFill>
-                <a:schemeClr val="accent6">
-                  <a:lumMod val="75000"/>
-                </a:schemeClr>
-              </a:solidFill>
-            </a:ln>
-            <a:effectLst/>
-          </p:spPr>
-          <p:style>
-            <a:lnRef idx="1">
-              <a:schemeClr val="accent2"/>
-            </a:lnRef>
-            <a:fillRef idx="2">
-              <a:schemeClr val="accent2"/>
-            </a:fillRef>
-            <a:effectRef idx="1">
-              <a:schemeClr val="accent2"/>
-            </a:effectRef>
-            <a:fontRef idx="minor">
-              <a:schemeClr val="dk1"/>
-            </a:fontRef>
-          </p:style>
-          <p:txBody>
-            <a:bodyPr rtlCol="0" anchor="ctr"/>
-            <a:lstStyle/>
-            <a:p>
-              <a:pPr algn="ctr"/>
-              <a:endParaRPr lang="en-SG" sz="1050">
-                <a:solidFill>
-                  <a:schemeClr val="bg1"/>
-                </a:solidFill>
-              </a:endParaRPr>
-            </a:p>
-          </p:txBody>
-        </p:sp>
-        <p:cxnSp>
-          <p:nvCxnSpPr>
-            <p:cNvPr id="58" name="Straight Arrow Connector 57"/>
-            <p:cNvCxnSpPr>
-              <a:stCxn id="42" idx="3"/>
-              <a:endCxn id="2" idx="1"/>
-            </p:cNvCxnSpPr>
-            <p:nvPr/>
-          </p:nvCxnSpPr>
-          <p:spPr>
-            <a:xfrm>
-              <a:off x="4134242" y="3273859"/>
-              <a:ext cx="220810" cy="5284"/>
-            </a:xfrm>
-            <a:prstGeom prst="straightConnector1">
-              <a:avLst/>
-            </a:prstGeom>
-            <a:ln w="19050">
-              <a:solidFill>
-                <a:schemeClr val="accent6">
-                  <a:lumMod val="75000"/>
-                </a:schemeClr>
-              </a:solidFill>
-              <a:headEnd type="none" w="med" len="med"/>
-              <a:tailEnd type="arrow" w="med" len="med"/>
-            </a:ln>
-            <a:effectLst/>
-          </p:spPr>
-          <p:style>
-            <a:lnRef idx="1">
-              <a:schemeClr val="accent2"/>
-            </a:lnRef>
-            <a:fillRef idx="2">
-              <a:schemeClr val="accent2"/>
-            </a:fillRef>
-            <a:effectRef idx="1">
-              <a:schemeClr val="accent2"/>
-            </a:effectRef>
-            <a:fontRef idx="minor">
-              <a:schemeClr val="dk1"/>
-            </a:fontRef>
-          </p:style>
-        </p:cxnSp>
-        <p:cxnSp>
-          <p:nvCxnSpPr>
-            <p:cNvPr id="75" name="Elbow Connector 122"/>
-            <p:cNvCxnSpPr/>
-            <p:nvPr/>
-          </p:nvCxnSpPr>
-          <p:spPr>
-            <a:xfrm>
-              <a:off x="2387963" y="2987376"/>
-              <a:ext cx="419548" cy="2860"/>
-            </a:xfrm>
-            <a:prstGeom prst="bentConnector3">
-              <a:avLst>
-                <a:gd name="adj1" fmla="val 50000"/>
-              </a:avLst>
-            </a:prstGeom>
-            <a:ln w="19050">
-              <a:solidFill>
-                <a:schemeClr val="bg1">
-                  <a:lumMod val="75000"/>
-                </a:schemeClr>
-              </a:solidFill>
-              <a:prstDash val="sysDot"/>
-              <a:headEnd type="none" w="med" len="med"/>
-              <a:tailEnd type="arrow" w="med" len="med"/>
-            </a:ln>
-            <a:effectLst/>
-          </p:spPr>
-          <p:style>
-            <a:lnRef idx="1">
-              <a:schemeClr val="accent2"/>
-            </a:lnRef>
-            <a:fillRef idx="2">
-              <a:schemeClr val="accent2"/>
-            </a:fillRef>
-            <a:effectRef idx="1">
-              <a:schemeClr val="accent2"/>
-            </a:effectRef>
-            <a:fontRef idx="minor">
-              <a:schemeClr val="dk1"/>
-            </a:fontRef>
-          </p:style>
-        </p:cxnSp>
-        <p:cxnSp>
-          <p:nvCxnSpPr>
-            <p:cNvPr id="21" name="Straight Connector 20"/>
-            <p:cNvCxnSpPr>
-              <a:stCxn id="120" idx="3"/>
-            </p:cNvCxnSpPr>
-            <p:nvPr/>
-          </p:nvCxnSpPr>
-          <p:spPr>
-            <a:xfrm flipV="1">
-              <a:off x="3327796" y="2987375"/>
-              <a:ext cx="216105" cy="1"/>
-            </a:xfrm>
-            <a:prstGeom prst="line">
-              <a:avLst/>
-            </a:prstGeom>
-            <a:ln w="19050">
-              <a:solidFill>
-                <a:schemeClr val="accent6">
-                  <a:lumMod val="75000"/>
-                </a:schemeClr>
-              </a:solidFill>
-              <a:prstDash val="sysDot"/>
-              <a:headEnd type="none" w="med" len="med"/>
-              <a:tailEnd type="none" w="med" len="med"/>
-            </a:ln>
-            <a:effectLst/>
-          </p:spPr>
-          <p:style>
-            <a:lnRef idx="1">
-              <a:schemeClr val="accent2"/>
-            </a:lnRef>
-            <a:fillRef idx="2">
-              <a:schemeClr val="accent2"/>
-            </a:fillRef>
-            <a:effectRef idx="1">
-              <a:schemeClr val="accent2"/>
-            </a:effectRef>
-            <a:fontRef idx="minor">
-              <a:schemeClr val="dk1"/>
-            </a:fontRef>
-          </p:style>
-        </p:cxnSp>
-        <p:sp>
-          <p:nvSpPr>
-            <p:cNvPr id="42" name="Flowchart: Decision 96"/>
-            <p:cNvSpPr/>
-            <p:nvPr/>
-          </p:nvSpPr>
-          <p:spPr>
-            <a:xfrm>
-              <a:off x="3898194" y="3187169"/>
-              <a:ext cx="236048" cy="173380"/>
-            </a:xfrm>
-            <a:prstGeom prst="flowChartDecision">
-              <a:avLst/>
-            </a:prstGeom>
-            <a:noFill/>
-            <a:ln w="19050">
-              <a:solidFill>
-                <a:schemeClr val="accent6">
-                  <a:lumMod val="75000"/>
-                </a:schemeClr>
-              </a:solidFill>
-            </a:ln>
-            <a:effectLst/>
-          </p:spPr>
-          <p:style>
-            <a:lnRef idx="1">
-              <a:schemeClr val="accent2"/>
-            </a:lnRef>
-            <a:fillRef idx="2">
-              <a:schemeClr val="accent2"/>
-            </a:fillRef>
-            <a:effectRef idx="1">
-              <a:schemeClr val="accent2"/>
-            </a:effectRef>
-            <a:fontRef idx="minor">
-              <a:schemeClr val="dk1"/>
-            </a:fontRef>
-          </p:style>
-          <p:txBody>
-            <a:bodyPr rtlCol="0" anchor="ctr"/>
-            <a:lstStyle/>
-            <a:p>
-              <a:pPr algn="ctr"/>
-              <a:endParaRPr lang="en-US" sz="1050">
-                <a:solidFill>
-                  <a:schemeClr val="bg1"/>
-                </a:solidFill>
-              </a:endParaRPr>
-            </a:p>
-          </p:txBody>
-        </p:sp>
-        <p:cxnSp>
-          <p:nvCxnSpPr>
-            <p:cNvPr id="97" name="Elbow Connector 63"/>
-            <p:cNvCxnSpPr>
-              <a:stCxn id="99" idx="3"/>
-              <a:endCxn id="50" idx="1"/>
-            </p:cNvCxnSpPr>
-            <p:nvPr/>
-          </p:nvCxnSpPr>
-          <p:spPr>
-            <a:xfrm flipV="1">
-              <a:off x="5875913" y="3279143"/>
-              <a:ext cx="223324" cy="1"/>
-            </a:xfrm>
-            <a:prstGeom prst="bentConnector3">
-              <a:avLst>
-                <a:gd name="adj1" fmla="val 50000"/>
-              </a:avLst>
-            </a:prstGeom>
-            <a:ln w="19050">
-              <a:solidFill>
-                <a:schemeClr val="accent6">
-                  <a:lumMod val="75000"/>
-                </a:schemeClr>
-              </a:solidFill>
-              <a:prstDash val="sysDot"/>
-              <a:headEnd type="none" w="med" len="med"/>
-              <a:tailEnd type="none" w="med" len="med"/>
-            </a:ln>
-            <a:effectLst/>
-          </p:spPr>
-          <p:style>
-            <a:lnRef idx="1">
-              <a:schemeClr val="accent2"/>
-            </a:lnRef>
-            <a:fillRef idx="2">
-              <a:schemeClr val="accent2"/>
-            </a:fillRef>
-            <a:effectRef idx="1">
-              <a:schemeClr val="accent2"/>
-            </a:effectRef>
-            <a:fontRef idx="minor">
-              <a:schemeClr val="dk1"/>
-            </a:fontRef>
-          </p:style>
-        </p:cxnSp>
-        <p:sp>
-          <p:nvSpPr>
-            <p:cNvPr id="99" name="Isosceles Triangle 102"/>
-            <p:cNvSpPr/>
-            <p:nvPr/>
-          </p:nvSpPr>
-          <p:spPr>
-            <a:xfrm rot="5400000" flipV="1">
-              <a:off x="5652899" y="3191382"/>
-              <a:ext cx="270504" cy="175523"/>
-            </a:xfrm>
-            <a:prstGeom prst="triangle">
-              <a:avLst/>
-            </a:prstGeom>
-            <a:solidFill>
-              <a:schemeClr val="accent6">
-                <a:lumMod val="75000"/>
-              </a:schemeClr>
-            </a:solidFill>
-            <a:ln w="19050">
-              <a:solidFill>
-                <a:schemeClr val="accent6">
-                  <a:lumMod val="75000"/>
-                </a:schemeClr>
-              </a:solidFill>
-            </a:ln>
-            <a:effectLst/>
-          </p:spPr>
-          <p:style>
-            <a:lnRef idx="1">
-              <a:schemeClr val="accent2"/>
-            </a:lnRef>
-            <a:fillRef idx="2">
-              <a:schemeClr val="accent2"/>
-            </a:fillRef>
-            <a:effectRef idx="1">
-              <a:schemeClr val="accent2"/>
-            </a:effectRef>
-            <a:fontRef idx="minor">
-              <a:schemeClr val="dk1"/>
-            </a:fontRef>
-          </p:style>
-          <p:txBody>
-            <a:bodyPr rtlCol="0" anchor="ctr"/>
-            <a:lstStyle/>
-            <a:p>
-              <a:pPr algn="ctr"/>
-              <a:endParaRPr lang="en-SG" sz="1050">
-                <a:solidFill>
-                  <a:schemeClr val="bg1"/>
-                </a:solidFill>
-              </a:endParaRPr>
-            </a:p>
-          </p:txBody>
-        </p:sp>
-        <p:cxnSp>
-          <p:nvCxnSpPr>
-            <p:cNvPr id="124" name="Elbow Connector 122"/>
-            <p:cNvCxnSpPr>
-              <a:cxnSpLocks/>
-              <a:stCxn id="50" idx="2"/>
-              <a:endCxn id="66" idx="0"/>
-            </p:cNvCxnSpPr>
-            <p:nvPr/>
-          </p:nvCxnSpPr>
-          <p:spPr>
-            <a:xfrm rot="5400000">
-              <a:off x="5750187" y="2776297"/>
-              <a:ext cx="257743" cy="1610195"/>
-            </a:xfrm>
-            <a:prstGeom prst="bentConnector3">
-              <a:avLst>
-                <a:gd name="adj1" fmla="val 50000"/>
-              </a:avLst>
-            </a:prstGeom>
-            <a:ln w="19050">
-              <a:solidFill>
-                <a:schemeClr val="accent6">
-                  <a:lumMod val="75000"/>
-                </a:schemeClr>
-              </a:solidFill>
-              <a:prstDash val="sysDot"/>
-              <a:headEnd type="none" w="med" len="med"/>
-              <a:tailEnd type="arrow" w="med" len="med"/>
-            </a:ln>
-            <a:effectLst/>
-          </p:spPr>
-          <p:style>
-            <a:lnRef idx="1">
-              <a:schemeClr val="accent2"/>
-            </a:lnRef>
-            <a:fillRef idx="2">
-              <a:schemeClr val="accent2"/>
-            </a:fillRef>
-            <a:effectRef idx="1">
-              <a:schemeClr val="accent2"/>
-            </a:effectRef>
-            <a:fontRef idx="minor">
-              <a:schemeClr val="dk1"/>
-            </a:fontRef>
-          </p:style>
-        </p:cxnSp>
-        <p:sp>
-          <p:nvSpPr>
-            <p:cNvPr id="50" name="Rectangle 8"/>
-            <p:cNvSpPr/>
-            <p:nvPr/>
-          </p:nvSpPr>
-          <p:spPr>
-            <a:xfrm>
-              <a:off x="6099237" y="3105763"/>
-              <a:ext cx="1169835" cy="346760"/>
-            </a:xfrm>
-            <a:prstGeom prst="rect">
-              <a:avLst/>
-            </a:prstGeom>
-            <a:ln w="19050"/>
-            <a:effectLst/>
-          </p:spPr>
-          <p:style>
-            <a:lnRef idx="1">
-              <a:schemeClr val="accent6"/>
-            </a:lnRef>
-            <a:fillRef idx="2">
-              <a:schemeClr val="accent6"/>
-            </a:fillRef>
-            <a:effectRef idx="1">
-              <a:schemeClr val="accent6"/>
-            </a:effectRef>
-            <a:fontRef idx="minor">
-              <a:schemeClr val="dk1"/>
-            </a:fontRef>
-          </p:style>
-          <p:txBody>
-            <a:bodyPr rtlCol="0" anchor="ctr"/>
-            <a:lstStyle/>
-            <a:p>
-              <a:pPr algn="ctr"/>
-              <a:r>
-                <a:rPr lang="en-US" sz="1050" b="1" dirty="0" err="1">
-                  <a:solidFill>
-                    <a:schemeClr val="accent6">
-                      <a:lumMod val="75000"/>
-                    </a:schemeClr>
-                  </a:solidFill>
-                </a:rPr>
-                <a:t>JsonAddressBook</a:t>
-              </a:r>
-              <a:br>
-                <a:rPr lang="en-US" sz="1050" b="1" dirty="0">
-                  <a:solidFill>
-                    <a:schemeClr val="accent6">
-                      <a:lumMod val="75000"/>
-                    </a:schemeClr>
-                  </a:solidFill>
-                </a:rPr>
-              </a:br>
-              <a:r>
-                <a:rPr lang="en-US" sz="1050" b="1" dirty="0">
-                  <a:solidFill>
-                    <a:schemeClr val="accent6">
-                      <a:lumMod val="75000"/>
-                    </a:schemeClr>
-                  </a:solidFill>
-                </a:rPr>
-                <a:t>Storage</a:t>
-              </a:r>
-              <a:endParaRPr lang="en-SG" sz="1050" b="1" dirty="0">
-                <a:solidFill>
-                  <a:schemeClr val="accent6">
-                    <a:lumMod val="75000"/>
-                  </a:schemeClr>
-                </a:solidFill>
-              </a:endParaRPr>
-            </a:p>
-          </p:txBody>
-        </p:sp>
-        <p:sp>
-          <p:nvSpPr>
-            <p:cNvPr id="52" name="Rectangle 8"/>
-            <p:cNvSpPr/>
-            <p:nvPr/>
-          </p:nvSpPr>
-          <p:spPr>
-            <a:xfrm>
-              <a:off x="4351815" y="2505363"/>
-              <a:ext cx="1323049" cy="346760"/>
-            </a:xfrm>
-            <a:prstGeom prst="rect">
-              <a:avLst/>
-            </a:prstGeom>
-            <a:solidFill>
-              <a:schemeClr val="accent6">
-                <a:lumMod val="75000"/>
-              </a:schemeClr>
-            </a:solidFill>
-            <a:ln w="19050">
-              <a:solidFill>
-                <a:schemeClr val="accent6">
-                  <a:lumMod val="75000"/>
-                </a:schemeClr>
-              </a:solidFill>
-            </a:ln>
-            <a:effectLst/>
-          </p:spPr>
-          <p:style>
-            <a:lnRef idx="1">
-              <a:schemeClr val="accent2"/>
-            </a:lnRef>
-            <a:fillRef idx="2">
-              <a:schemeClr val="accent2"/>
-            </a:fillRef>
-            <a:effectRef idx="1">
-              <a:schemeClr val="accent2"/>
-            </a:effectRef>
-            <a:fontRef idx="minor">
-              <a:schemeClr val="dk1"/>
-            </a:fontRef>
-          </p:style>
-          <p:txBody>
-            <a:bodyPr rtlCol="0" anchor="ctr"/>
-            <a:lstStyle/>
-            <a:p>
-              <a:pPr algn="ctr"/>
-              <a:r>
-                <a:rPr lang="en-US" sz="1050" dirty="0">
-                  <a:solidFill>
-                    <a:schemeClr val="bg1"/>
-                  </a:solidFill>
-                </a:rPr>
-                <a:t>&lt;&lt;interface&gt;&gt;</a:t>
-              </a:r>
-              <a:br>
-                <a:rPr lang="en-US" sz="1050" dirty="0">
-                  <a:solidFill>
-                    <a:schemeClr val="bg1"/>
-                  </a:solidFill>
-                </a:rPr>
-              </a:br>
-              <a:r>
-                <a:rPr lang="en-US" sz="1050" dirty="0" err="1">
-                  <a:solidFill>
-                    <a:schemeClr val="bg1"/>
-                  </a:solidFill>
-                </a:rPr>
-                <a:t>UserPrefsStorage</a:t>
-              </a:r>
-              <a:endParaRPr lang="en-SG" sz="1050" dirty="0">
-                <a:solidFill>
-                  <a:schemeClr val="bg1"/>
-                </a:solidFill>
-              </a:endParaRPr>
-            </a:p>
-          </p:txBody>
-        </p:sp>
-        <p:cxnSp>
-          <p:nvCxnSpPr>
-            <p:cNvPr id="54" name="Straight Arrow Connector 53"/>
-            <p:cNvCxnSpPr>
-              <a:stCxn id="56" idx="3"/>
-              <a:endCxn id="52" idx="1"/>
-            </p:cNvCxnSpPr>
-            <p:nvPr/>
-          </p:nvCxnSpPr>
-          <p:spPr>
-            <a:xfrm>
-              <a:off x="4131005" y="2673459"/>
-              <a:ext cx="220810" cy="5284"/>
-            </a:xfrm>
-            <a:prstGeom prst="straightConnector1">
-              <a:avLst/>
-            </a:prstGeom>
-            <a:ln w="19050">
-              <a:solidFill>
-                <a:schemeClr val="accent6">
-                  <a:lumMod val="75000"/>
-                </a:schemeClr>
-              </a:solidFill>
-              <a:headEnd type="none" w="med" len="med"/>
-              <a:tailEnd type="arrow" w="med" len="med"/>
-            </a:ln>
-            <a:effectLst/>
-          </p:spPr>
-          <p:style>
-            <a:lnRef idx="1">
-              <a:schemeClr val="accent2"/>
-            </a:lnRef>
-            <a:fillRef idx="2">
-              <a:schemeClr val="accent2"/>
-            </a:fillRef>
-            <a:effectRef idx="1">
-              <a:schemeClr val="accent2"/>
-            </a:effectRef>
-            <a:fontRef idx="minor">
-              <a:schemeClr val="dk1"/>
-            </a:fontRef>
-          </p:style>
-        </p:cxnSp>
-        <p:sp>
-          <p:nvSpPr>
-            <p:cNvPr id="56" name="Flowchart: Decision 96"/>
-            <p:cNvSpPr/>
-            <p:nvPr/>
-          </p:nvSpPr>
-          <p:spPr>
-            <a:xfrm>
-              <a:off x="3894957" y="2586769"/>
-              <a:ext cx="236048" cy="173380"/>
-            </a:xfrm>
-            <a:prstGeom prst="flowChartDecision">
-              <a:avLst/>
-            </a:prstGeom>
-            <a:noFill/>
-            <a:ln w="19050">
-              <a:solidFill>
-                <a:schemeClr val="accent6">
-                  <a:lumMod val="75000"/>
-                </a:schemeClr>
-              </a:solidFill>
-            </a:ln>
-            <a:effectLst/>
-          </p:spPr>
-          <p:style>
-            <a:lnRef idx="1">
-              <a:schemeClr val="accent2"/>
-            </a:lnRef>
-            <a:fillRef idx="2">
-              <a:schemeClr val="accent2"/>
-            </a:fillRef>
-            <a:effectRef idx="1">
-              <a:schemeClr val="accent2"/>
-            </a:effectRef>
-            <a:fontRef idx="minor">
-              <a:schemeClr val="dk1"/>
-            </a:fontRef>
-          </p:style>
-          <p:txBody>
-            <a:bodyPr rtlCol="0" anchor="ctr"/>
-            <a:lstStyle/>
-            <a:p>
-              <a:pPr algn="ctr"/>
-              <a:endParaRPr lang="en-US" sz="1050">
-                <a:solidFill>
-                  <a:schemeClr val="bg1"/>
-                </a:solidFill>
-              </a:endParaRPr>
-            </a:p>
-          </p:txBody>
-        </p:sp>
-        <p:cxnSp>
-          <p:nvCxnSpPr>
-            <p:cNvPr id="60" name="Elbow Connector 63"/>
-            <p:cNvCxnSpPr>
-              <a:stCxn id="61" idx="3"/>
-              <a:endCxn id="65" idx="1"/>
-            </p:cNvCxnSpPr>
-            <p:nvPr/>
-          </p:nvCxnSpPr>
-          <p:spPr>
-            <a:xfrm flipV="1">
-              <a:off x="5872676" y="2678743"/>
-              <a:ext cx="223324" cy="1"/>
-            </a:xfrm>
-            <a:prstGeom prst="bentConnector3">
-              <a:avLst>
-                <a:gd name="adj1" fmla="val 50000"/>
-              </a:avLst>
-            </a:prstGeom>
-            <a:ln w="19050">
-              <a:solidFill>
-                <a:schemeClr val="accent6">
-                  <a:lumMod val="75000"/>
-                </a:schemeClr>
-              </a:solidFill>
-              <a:prstDash val="sysDot"/>
-              <a:headEnd type="none" w="med" len="med"/>
-              <a:tailEnd type="none" w="med" len="med"/>
-            </a:ln>
-            <a:effectLst/>
-          </p:spPr>
-          <p:style>
-            <a:lnRef idx="1">
-              <a:schemeClr val="accent2"/>
-            </a:lnRef>
-            <a:fillRef idx="2">
-              <a:schemeClr val="accent2"/>
-            </a:fillRef>
-            <a:effectRef idx="1">
-              <a:schemeClr val="accent2"/>
-            </a:effectRef>
-            <a:fontRef idx="minor">
-              <a:schemeClr val="dk1"/>
-            </a:fontRef>
-          </p:style>
-        </p:cxnSp>
-        <p:sp>
-          <p:nvSpPr>
-            <p:cNvPr id="61" name="Isosceles Triangle 102"/>
-            <p:cNvSpPr/>
-            <p:nvPr/>
-          </p:nvSpPr>
-          <p:spPr>
-            <a:xfrm rot="5400000" flipV="1">
-              <a:off x="5649662" y="2590982"/>
-              <a:ext cx="270504" cy="175523"/>
-            </a:xfrm>
-            <a:prstGeom prst="triangle">
-              <a:avLst/>
-            </a:prstGeom>
-            <a:solidFill>
-              <a:schemeClr val="accent6">
-                <a:lumMod val="75000"/>
-              </a:schemeClr>
-            </a:solidFill>
-            <a:ln w="19050">
-              <a:solidFill>
-                <a:schemeClr val="accent6">
-                  <a:lumMod val="75000"/>
-                </a:schemeClr>
-              </a:solidFill>
-            </a:ln>
-            <a:effectLst/>
-          </p:spPr>
-          <p:style>
-            <a:lnRef idx="1">
-              <a:schemeClr val="accent2"/>
-            </a:lnRef>
-            <a:fillRef idx="2">
-              <a:schemeClr val="accent2"/>
-            </a:fillRef>
-            <a:effectRef idx="1">
-              <a:schemeClr val="accent2"/>
-            </a:effectRef>
-            <a:fontRef idx="minor">
-              <a:schemeClr val="dk1"/>
-            </a:fontRef>
-          </p:style>
-          <p:txBody>
-            <a:bodyPr rtlCol="0" anchor="ctr"/>
-            <a:lstStyle/>
-            <a:p>
-              <a:pPr algn="ctr"/>
-              <a:endParaRPr lang="en-SG" sz="1050">
-                <a:solidFill>
-                  <a:schemeClr val="bg1"/>
-                </a:solidFill>
-              </a:endParaRPr>
-            </a:p>
-          </p:txBody>
-        </p:sp>
-        <p:sp>
-          <p:nvSpPr>
-            <p:cNvPr id="65" name="Rectangle 8"/>
-            <p:cNvSpPr/>
-            <p:nvPr/>
-          </p:nvSpPr>
-          <p:spPr>
-            <a:xfrm>
-              <a:off x="6096000" y="2505363"/>
-              <a:ext cx="1093635" cy="346760"/>
-            </a:xfrm>
-            <a:prstGeom prst="rect">
-              <a:avLst/>
-            </a:prstGeom>
-            <a:solidFill>
-              <a:schemeClr val="accent6">
-                <a:lumMod val="75000"/>
-              </a:schemeClr>
-            </a:solidFill>
-            <a:ln w="19050">
-              <a:solidFill>
-                <a:schemeClr val="accent6">
-                  <a:lumMod val="75000"/>
-                </a:schemeClr>
-              </a:solidFill>
-            </a:ln>
-            <a:effectLst/>
-          </p:spPr>
-          <p:style>
-            <a:lnRef idx="1">
-              <a:schemeClr val="accent2"/>
-            </a:lnRef>
-            <a:fillRef idx="2">
-              <a:schemeClr val="accent2"/>
-            </a:fillRef>
-            <a:effectRef idx="1">
-              <a:schemeClr val="accent2"/>
-            </a:effectRef>
-            <a:fontRef idx="minor">
-              <a:schemeClr val="dk1"/>
-            </a:fontRef>
-          </p:style>
-          <p:txBody>
-            <a:bodyPr rtlCol="0" anchor="ctr"/>
-            <a:lstStyle/>
-            <a:p>
-              <a:pPr algn="ctr"/>
-              <a:r>
-                <a:rPr lang="en-US" sz="1050" dirty="0" err="1">
-                  <a:solidFill>
-                    <a:schemeClr val="bg1"/>
-                  </a:solidFill>
-                </a:rPr>
-                <a:t>JsonUserPrefs</a:t>
-              </a:r>
-              <a:br>
-                <a:rPr lang="en-US" sz="1050" dirty="0">
-                  <a:solidFill>
-                    <a:schemeClr val="bg1"/>
-                  </a:solidFill>
-                </a:rPr>
-              </a:br>
-              <a:r>
-                <a:rPr lang="en-US" sz="1050" dirty="0">
-                  <a:solidFill>
-                    <a:schemeClr val="bg1"/>
-                  </a:solidFill>
-                </a:rPr>
-                <a:t>Storage</a:t>
-              </a:r>
-              <a:endParaRPr lang="en-SG" sz="1050" dirty="0">
-                <a:solidFill>
-                  <a:schemeClr val="bg1"/>
-                </a:solidFill>
-              </a:endParaRPr>
-            </a:p>
-          </p:txBody>
-        </p:sp>
-        <p:sp>
-          <p:nvSpPr>
-            <p:cNvPr id="66" name="Rectangle 8"/>
-            <p:cNvSpPr/>
-            <p:nvPr/>
-          </p:nvSpPr>
-          <p:spPr>
-            <a:xfrm>
-              <a:off x="4473606" y="3710266"/>
-              <a:ext cx="1200707" cy="346760"/>
-            </a:xfrm>
-            <a:prstGeom prst="rect">
-              <a:avLst/>
-            </a:prstGeom>
-            <a:ln w="19050"/>
-            <a:effectLst/>
-          </p:spPr>
-          <p:style>
-            <a:lnRef idx="1">
-              <a:schemeClr val="accent6"/>
-            </a:lnRef>
-            <a:fillRef idx="2">
-              <a:schemeClr val="accent6"/>
-            </a:fillRef>
-            <a:effectRef idx="1">
-              <a:schemeClr val="accent6"/>
-            </a:effectRef>
-            <a:fontRef idx="minor">
-              <a:schemeClr val="dk1"/>
-            </a:fontRef>
-          </p:style>
-          <p:txBody>
-            <a:bodyPr rtlCol="0" anchor="ctr"/>
-            <a:lstStyle/>
-            <a:p>
-              <a:pPr algn="ctr"/>
-              <a:r>
-                <a:rPr lang="en-US" sz="1050" b="1" dirty="0" err="1">
-                  <a:solidFill>
-                    <a:schemeClr val="accent6">
-                      <a:lumMod val="75000"/>
-                    </a:schemeClr>
-                  </a:solidFill>
-                </a:rPr>
-                <a:t>JsonSerializable</a:t>
-              </a:r>
-              <a:br>
-                <a:rPr lang="en-US" sz="1050" b="1" dirty="0">
-                  <a:solidFill>
-                    <a:schemeClr val="accent6">
-                      <a:lumMod val="75000"/>
-                    </a:schemeClr>
-                  </a:solidFill>
-                </a:rPr>
-              </a:br>
-              <a:r>
-                <a:rPr lang="en-US" sz="1050" b="1" dirty="0" err="1">
-                  <a:solidFill>
-                    <a:schemeClr val="accent6">
-                      <a:lumMod val="75000"/>
-                    </a:schemeClr>
-                  </a:solidFill>
-                </a:rPr>
-                <a:t>AddressBook</a:t>
-              </a:r>
-              <a:endParaRPr lang="en-SG" sz="1050" b="1" dirty="0">
-                <a:solidFill>
-                  <a:schemeClr val="accent6">
-                    <a:lumMod val="75000"/>
-                  </a:schemeClr>
-                </a:solidFill>
-              </a:endParaRPr>
-            </a:p>
-          </p:txBody>
-        </p:sp>
-        <p:sp>
-          <p:nvSpPr>
-            <p:cNvPr id="73" name="Rectangle 8"/>
-            <p:cNvSpPr/>
-            <p:nvPr/>
-          </p:nvSpPr>
-          <p:spPr>
-            <a:xfrm>
-              <a:off x="6060660" y="5511067"/>
+              <a:off x="2329253" y="3710445"/>
               <a:ext cx="1331655" cy="346760"/>
             </a:xfrm>
             <a:prstGeom prst="rect">
@@ -4670,7 +5814,7 @@
                     </a:schemeClr>
                   </a:solidFill>
                 </a:rPr>
-                <a:t>JsonAdaptedTag</a:t>
+                <a:t>JsonAdaptedYear</a:t>
               </a:r>
               <a:endParaRPr lang="en-SG" sz="1050" b="1" dirty="0">
                 <a:solidFill>
@@ -4682,65 +5826,12 @@
             </a:p>
           </p:txBody>
         </p:sp>
-        <p:cxnSp>
-          <p:nvCxnSpPr>
-            <p:cNvPr id="37" name="Elbow Connector 122">
+        <p:sp>
+          <p:nvSpPr>
+            <p:cNvPr id="44" name="Rectangle 8">
               <a:extLst>
                 <a:ext uri="{FF2B5EF4-FFF2-40B4-BE49-F238E27FC236}">
-                  <a16:creationId xmlns:a16="http://schemas.microsoft.com/office/drawing/2014/main" id="{6C6BD4DE-078B-4478-A2A0-BF45F863C92D}"/>
-                </a:ext>
-              </a:extLst>
-            </p:cNvPr>
-            <p:cNvCxnSpPr>
-              <a:cxnSpLocks/>
-              <a:stCxn id="66" idx="2"/>
-              <a:endCxn id="38" idx="0"/>
-            </p:cNvCxnSpPr>
-            <p:nvPr/>
-          </p:nvCxnSpPr>
-          <p:spPr>
-            <a:xfrm rot="5400000">
-              <a:off x="4925862" y="4205124"/>
-              <a:ext cx="296197" cy="1"/>
-            </a:xfrm>
-            <a:prstGeom prst="bentConnector3">
-              <a:avLst>
-                <a:gd name="adj1" fmla="val 50000"/>
-              </a:avLst>
-            </a:prstGeom>
-            <a:ln w="19050">
-              <a:solidFill>
-                <a:schemeClr val="accent6">
-                  <a:lumMod val="75000"/>
-                </a:schemeClr>
-              </a:solidFill>
-              <a:prstDash val="sysDot"/>
-              <a:headEnd type="none" w="med" len="med"/>
-              <a:tailEnd type="arrow" w="med" len="med"/>
-            </a:ln>
-            <a:effectLst/>
-          </p:spPr>
-          <p:style>
-            <a:lnRef idx="1">
-              <a:schemeClr val="accent2"/>
-            </a:lnRef>
-            <a:fillRef idx="2">
-              <a:schemeClr val="accent2"/>
-            </a:fillRef>
-            <a:effectRef idx="1">
-              <a:schemeClr val="accent2"/>
-            </a:effectRef>
-            <a:fontRef idx="minor">
-              <a:schemeClr val="dk1"/>
-            </a:fontRef>
-          </p:style>
-        </p:cxnSp>
-        <p:sp>
-          <p:nvSpPr>
-            <p:cNvPr id="38" name="Rectangle 8">
-              <a:extLst>
-                <a:ext uri="{FF2B5EF4-FFF2-40B4-BE49-F238E27FC236}">
-                  <a16:creationId xmlns:a16="http://schemas.microsoft.com/office/drawing/2014/main" id="{AF712354-A047-4445-9A49-E11CB796F952}"/>
+                  <a16:creationId xmlns:a16="http://schemas.microsoft.com/office/drawing/2014/main" id="{7F3ED9A4-046B-4665-9FDA-59D29E2171F8}"/>
                 </a:ext>
               </a:extLst>
             </p:cNvPr>
@@ -4749,8 +5840,8 @@
           </p:nvSpPr>
           <p:spPr>
             <a:xfrm>
-              <a:off x="4263031" y="4353223"/>
-              <a:ext cx="1621856" cy="346760"/>
+              <a:off x="4410114" y="3712246"/>
+              <a:ext cx="1242135" cy="346760"/>
             </a:xfrm>
             <a:prstGeom prst="rect">
               <a:avLst/>
@@ -4785,188 +5876,7 @@
                     </a:schemeClr>
                   </a:solidFill>
                 </a:rPr>
-                <a:t>JsonSerializable</a:t>
-              </a:r>
-              <a:br>
-                <a:rPr lang="en-US" sz="1050" b="1" dirty="0">
-                  <a:solidFill>
-                    <a:schemeClr val="accent6">
-                      <a:lumMod val="75000"/>
-                    </a:schemeClr>
-                  </a:solidFill>
-                </a:rPr>
-              </a:br>
-              <a:r>
-                <a:rPr lang="en-US" sz="1050" b="1" dirty="0" err="1">
-                  <a:solidFill>
-                    <a:schemeClr val="accent6">
-                      <a:lumMod val="75000"/>
-                    </a:schemeClr>
-                  </a:solidFill>
-                </a:rPr>
-                <a:t>RequirementCategoryList</a:t>
-              </a:r>
-              <a:endParaRPr lang="en-SG" sz="1050" b="1" dirty="0">
-                <a:solidFill>
-                  <a:schemeClr val="accent6">
-                    <a:lumMod val="75000"/>
-                  </a:schemeClr>
-                </a:solidFill>
-              </a:endParaRPr>
-            </a:p>
-          </p:txBody>
-        </p:sp>
-        <p:sp>
-          <p:nvSpPr>
-            <p:cNvPr id="39" name="Rectangle 8">
-              <a:extLst>
-                <a:ext uri="{FF2B5EF4-FFF2-40B4-BE49-F238E27FC236}">
-                  <a16:creationId xmlns:a16="http://schemas.microsoft.com/office/drawing/2014/main" id="{24867C62-854D-4D85-B324-1E7EA74C8742}"/>
-                </a:ext>
-              </a:extLst>
-            </p:cNvPr>
-            <p:cNvSpPr/>
-            <p:nvPr/>
-          </p:nvSpPr>
-          <p:spPr>
-            <a:xfrm>
-              <a:off x="6125470" y="4353222"/>
-              <a:ext cx="1200707" cy="346760"/>
-            </a:xfrm>
-            <a:prstGeom prst="rect">
-              <a:avLst/>
-            </a:prstGeom>
-            <a:ln w="19050"/>
-            <a:effectLst/>
-          </p:spPr>
-          <p:style>
-            <a:lnRef idx="1">
-              <a:schemeClr val="accent6"/>
-            </a:lnRef>
-            <a:fillRef idx="2">
-              <a:schemeClr val="accent6"/>
-            </a:fillRef>
-            <a:effectRef idx="1">
-              <a:schemeClr val="accent6"/>
-            </a:effectRef>
-            <a:fontRef idx="minor">
-              <a:schemeClr val="dk1"/>
-            </a:fontRef>
-          </p:style>
-          <p:txBody>
-            <a:bodyPr rtlCol="0" anchor="ctr"/>
-            <a:lstStyle/>
-            <a:p>
-              <a:pPr algn="ctr"/>
-              <a:r>
-                <a:rPr lang="en-US" sz="1050" b="1" dirty="0" err="1">
-                  <a:solidFill>
-                    <a:schemeClr val="accent6">
-                      <a:lumMod val="75000"/>
-                    </a:schemeClr>
-                  </a:solidFill>
-                </a:rPr>
-                <a:t>JsonSerializable</a:t>
-              </a:r>
-              <a:br>
-                <a:rPr lang="en-US" sz="1050" b="1" dirty="0">
-                  <a:solidFill>
-                    <a:schemeClr val="accent6">
-                      <a:lumMod val="75000"/>
-                    </a:schemeClr>
-                  </a:solidFill>
-                </a:rPr>
-              </a:br>
-              <a:r>
-                <a:rPr lang="en-US" sz="1050" b="1" dirty="0" err="1">
-                  <a:solidFill>
-                    <a:schemeClr val="accent6">
-                      <a:lumMod val="75000"/>
-                    </a:schemeClr>
-                  </a:solidFill>
-                </a:rPr>
-                <a:t>ModuleList</a:t>
-              </a:r>
-              <a:endParaRPr lang="en-SG" sz="1050" b="1" dirty="0">
-                <a:solidFill>
-                  <a:schemeClr val="accent6">
-                    <a:lumMod val="75000"/>
-                  </a:schemeClr>
-                </a:solidFill>
-              </a:endParaRPr>
-            </a:p>
-          </p:txBody>
-        </p:sp>
-        <p:sp>
-          <p:nvSpPr>
-            <p:cNvPr id="40" name="Rectangle 8">
-              <a:extLst>
-                <a:ext uri="{FF2B5EF4-FFF2-40B4-BE49-F238E27FC236}">
-                  <a16:creationId xmlns:a16="http://schemas.microsoft.com/office/drawing/2014/main" id="{62F39C93-A0F1-43E2-8031-64CE109DC333}"/>
-                </a:ext>
-              </a:extLst>
-            </p:cNvPr>
-            <p:cNvSpPr/>
-            <p:nvPr/>
-          </p:nvSpPr>
-          <p:spPr>
-            <a:xfrm>
-              <a:off x="2821741" y="4350002"/>
-              <a:ext cx="1200707" cy="346760"/>
-            </a:xfrm>
-            <a:prstGeom prst="rect">
-              <a:avLst/>
-            </a:prstGeom>
-            <a:ln w="19050"/>
-            <a:effectLst/>
-          </p:spPr>
-          <p:style>
-            <a:lnRef idx="1">
-              <a:schemeClr val="accent6"/>
-            </a:lnRef>
-            <a:fillRef idx="2">
-              <a:schemeClr val="accent6"/>
-            </a:fillRef>
-            <a:effectRef idx="1">
-              <a:schemeClr val="accent6"/>
-            </a:effectRef>
-            <a:fontRef idx="minor">
-              <a:schemeClr val="dk1"/>
-            </a:fontRef>
-          </p:style>
-          <p:txBody>
-            <a:bodyPr rtlCol="0" anchor="ctr"/>
-            <a:lstStyle/>
-            <a:p>
-              <a:pPr algn="ctr"/>
-              <a:r>
-                <a:rPr lang="en-US" sz="1050" b="1" dirty="0" err="1">
-                  <a:solidFill>
-                    <a:schemeClr val="accent6">
-                      <a:lumMod val="75000"/>
-                    </a:schemeClr>
-                  </a:solidFill>
-                </a:rPr>
-                <a:t>JsonSerializable</a:t>
-              </a:r>
-              <a:br>
-                <a:rPr lang="en-US" sz="1050" b="1" dirty="0">
-                  <a:solidFill>
-                    <a:schemeClr val="accent6">
-                      <a:lumMod val="75000"/>
-                    </a:schemeClr>
-                  </a:solidFill>
-                </a:rPr>
-              </a:br>
-              <a:r>
-                <a:rPr lang="en-US" sz="1050" b="1" dirty="0" err="1">
-                  <a:solidFill>
-                    <a:schemeClr val="accent6">
-                      <a:lumMod val="75000"/>
-                    </a:schemeClr>
-                  </a:solidFill>
-                </a:rPr>
-                <a:t>DegreePlannerList</a:t>
+                <a:t>JsonAdaptedName</a:t>
               </a:r>
               <a:endParaRPr lang="en-SG" sz="1050" b="1" dirty="0">
                 <a:solidFill>
@@ -4980,24 +5890,23 @@
         </p:sp>
         <p:cxnSp>
           <p:nvCxnSpPr>
-            <p:cNvPr id="43" name="Elbow Connector 122">
+            <p:cNvPr id="45" name="Elbow Connector 122">
               <a:extLst>
                 <a:ext uri="{FF2B5EF4-FFF2-40B4-BE49-F238E27FC236}">
-                  <a16:creationId xmlns:a16="http://schemas.microsoft.com/office/drawing/2014/main" id="{8594D4BB-BD8F-4379-871A-5BC61B299381}"/>
+                  <a16:creationId xmlns:a16="http://schemas.microsoft.com/office/drawing/2014/main" id="{AFCA9F69-B8E9-4F42-920D-E8D616DF5B48}"/>
                 </a:ext>
               </a:extLst>
             </p:cNvPr>
             <p:cNvCxnSpPr>
               <a:cxnSpLocks/>
-              <a:stCxn id="66" idx="2"/>
-              <a:endCxn id="40" idx="0"/>
+              <a:stCxn id="49" idx="2"/>
             </p:cNvCxnSpPr>
             <p:nvPr/>
           </p:nvCxnSpPr>
           <p:spPr>
-            <a:xfrm rot="5400000">
-              <a:off x="4101540" y="3377582"/>
-              <a:ext cx="292976" cy="1651865"/>
+            <a:xfrm rot="16200000" flipH="1">
+              <a:off x="2814504" y="3553083"/>
+              <a:ext cx="285938" cy="10298"/>
             </a:xfrm>
             <a:prstGeom prst="bentConnector3">
               <a:avLst>
@@ -5033,28 +5942,28 @@
         </p:cxnSp>
         <p:cxnSp>
           <p:nvCxnSpPr>
-            <p:cNvPr id="46" name="Elbow Connector 122">
+            <p:cNvPr id="47" name="Elbow Connector 122">
               <a:extLst>
                 <a:ext uri="{FF2B5EF4-FFF2-40B4-BE49-F238E27FC236}">
-                  <a16:creationId xmlns:a16="http://schemas.microsoft.com/office/drawing/2014/main" id="{DA8DB951-9AC5-4F09-91E1-577DD8AD2FF4}"/>
+                  <a16:creationId xmlns:a16="http://schemas.microsoft.com/office/drawing/2014/main" id="{4436C3B5-1043-4052-94C4-0792051CE4B5}"/>
                 </a:ext>
               </a:extLst>
             </p:cNvPr>
             <p:cNvCxnSpPr>
               <a:cxnSpLocks/>
-              <a:stCxn id="66" idx="2"/>
-              <a:endCxn id="39" idx="0"/>
+              <a:stCxn id="49" idx="1"/>
+              <a:endCxn id="63" idx="1"/>
             </p:cNvCxnSpPr>
             <p:nvPr/>
           </p:nvCxnSpPr>
           <p:spPr>
-            <a:xfrm rot="16200000" flipH="1">
-              <a:off x="5751794" y="3379192"/>
-              <a:ext cx="296196" cy="1651864"/>
+            <a:xfrm rot="10800000" flipV="1">
+              <a:off x="2329254" y="3241883"/>
+              <a:ext cx="22717" cy="1194526"/>
             </a:xfrm>
             <a:prstGeom prst="bentConnector3">
               <a:avLst>
-                <a:gd name="adj1" fmla="val 50000"/>
+                <a:gd name="adj1" fmla="val 1106295"/>
               </a:avLst>
             </a:prstGeom>
             <a:ln w="19050">
@@ -5086,10 +5995,10 @@
         </p:cxnSp>
         <p:sp>
           <p:nvSpPr>
-            <p:cNvPr id="49" name="Rectangle 8">
+            <p:cNvPr id="63" name="Rectangle 8">
               <a:extLst>
                 <a:ext uri="{FF2B5EF4-FFF2-40B4-BE49-F238E27FC236}">
-                  <a16:creationId xmlns:a16="http://schemas.microsoft.com/office/drawing/2014/main" id="{1EE6BF26-A055-4F50-918D-14F1091D7BC7}"/>
+                  <a16:creationId xmlns:a16="http://schemas.microsoft.com/office/drawing/2014/main" id="{5C77A2B3-4B40-4560-A444-69644CD0671E}"/>
                 </a:ext>
               </a:extLst>
             </p:cNvPr>
@@ -5098,8 +6007,8 @@
           </p:nvSpPr>
           <p:spPr>
             <a:xfrm>
-              <a:off x="2827492" y="4870821"/>
-              <a:ext cx="1200707" cy="346760"/>
+              <a:off x="2329253" y="4263029"/>
+              <a:ext cx="1331655" cy="346760"/>
             </a:xfrm>
             <a:prstGeom prst="rect">
               <a:avLst/>
@@ -5146,14 +6055,14 @@
                 </a:rPr>
               </a:br>
               <a:r>
-                <a:rPr lang="en-US" sz="1050" b="1" dirty="0" err="1">
+                <a:rPr lang="en-US" sz="1050" b="1" dirty="0">
                   <a:solidFill>
                     <a:schemeClr val="accent6">
                       <a:lumMod val="75000"/>
                     </a:schemeClr>
                   </a:solidFill>
                 </a:rPr>
-                <a:t>DegreePlanner</a:t>
+                <a:t>Semester</a:t>
               </a:r>
               <a:endParaRPr lang="en-SG" sz="1050" b="1" dirty="0">
                 <a:solidFill>
@@ -5167,10 +6076,10 @@
         </p:sp>
         <p:sp>
           <p:nvSpPr>
-            <p:cNvPr id="51" name="Rectangle 8">
+            <p:cNvPr id="104" name="Rectangle 8">
               <a:extLst>
                 <a:ext uri="{FF2B5EF4-FFF2-40B4-BE49-F238E27FC236}">
-                  <a16:creationId xmlns:a16="http://schemas.microsoft.com/office/drawing/2014/main" id="{E29B6698-1D0F-4750-BD03-ACC5B240E399}"/>
+                  <a16:creationId xmlns:a16="http://schemas.microsoft.com/office/drawing/2014/main" id="{9E553998-74F8-45F7-9B92-604DE3FB1CCC}"/>
                 </a:ext>
               </a:extLst>
             </p:cNvPr>
@@ -5179,8 +6088,8 @@
           </p:nvSpPr>
           <p:spPr>
             <a:xfrm>
-              <a:off x="4476367" y="4870821"/>
-              <a:ext cx="1200707" cy="346760"/>
+              <a:off x="4416464" y="4269688"/>
+              <a:ext cx="1255387" cy="346760"/>
             </a:xfrm>
             <a:prstGeom prst="rect">
               <a:avLst/>
@@ -5215,26 +6124,7 @@
                     </a:schemeClr>
                   </a:solidFill>
                 </a:rPr>
-                <a:t>JsonAdapted</a:t>
-              </a:r>
-              <a:br>
-                <a:rPr lang="en-US" sz="1050" b="1" dirty="0">
-                  <a:solidFill>
-                    <a:schemeClr val="accent6">
-                      <a:lumMod val="75000"/>
-                    </a:schemeClr>
-                  </a:solidFill>
-                </a:rPr>
-              </a:br>
-              <a:r>
-                <a:rPr lang="en-US" sz="1050" b="1" dirty="0" err="1">
-                  <a:solidFill>
-                    <a:schemeClr val="accent6">
-                      <a:lumMod val="75000"/>
-                    </a:schemeClr>
-                  </a:solidFill>
-                </a:rPr>
-                <a:t>RequirementList</a:t>
+                <a:t>JsonAdaptedCredit</a:t>
               </a:r>
               <a:endParaRPr lang="en-SG" sz="1050" b="1" dirty="0">
                 <a:solidFill>
@@ -5246,88 +6136,24 @@
             </a:p>
           </p:txBody>
         </p:sp>
-        <p:sp>
-          <p:nvSpPr>
-            <p:cNvPr id="55" name="Rectangle 8">
+        <p:cxnSp>
+          <p:nvCxnSpPr>
+            <p:cNvPr id="130" name="Elbow Connector 122">
               <a:extLst>
                 <a:ext uri="{FF2B5EF4-FFF2-40B4-BE49-F238E27FC236}">
-                  <a16:creationId xmlns:a16="http://schemas.microsoft.com/office/drawing/2014/main" id="{46D0CB68-F420-458B-BED9-15DB056FEBC7}"/>
-                </a:ext>
-              </a:extLst>
-            </p:cNvPr>
-            <p:cNvSpPr/>
-            <p:nvPr/>
-          </p:nvSpPr>
-          <p:spPr>
-            <a:xfrm>
-              <a:off x="6054909" y="4862873"/>
-              <a:ext cx="1331656" cy="346760"/>
-            </a:xfrm>
-            <a:prstGeom prst="rect">
-              <a:avLst/>
-            </a:prstGeom>
-            <a:ln w="19050"/>
-            <a:effectLst/>
-          </p:spPr>
-          <p:style>
-            <a:lnRef idx="1">
-              <a:schemeClr val="accent6"/>
-            </a:lnRef>
-            <a:fillRef idx="2">
-              <a:schemeClr val="accent6"/>
-            </a:fillRef>
-            <a:effectRef idx="1">
-              <a:schemeClr val="accent6"/>
-            </a:effectRef>
-            <a:fontRef idx="minor">
-              <a:schemeClr val="dk1"/>
-            </a:fontRef>
-          </p:style>
-          <p:txBody>
-            <a:bodyPr rtlCol="0" anchor="ctr"/>
-            <a:lstStyle/>
-            <a:p>
-              <a:pPr algn="ctr"/>
-              <a:r>
-                <a:rPr lang="en-US" sz="1030" b="1" dirty="0" err="1">
-                  <a:solidFill>
-                    <a:schemeClr val="accent6">
-                      <a:lumMod val="75000"/>
-                    </a:schemeClr>
-                  </a:solidFill>
-                </a:rPr>
-                <a:t>JsonAdaptedModule</a:t>
-              </a:r>
-              <a:endParaRPr lang="en-SG" sz="1030" b="1" dirty="0">
-                <a:solidFill>
-                  <a:schemeClr val="accent6">
-                    <a:lumMod val="75000"/>
-                  </a:schemeClr>
-                </a:solidFill>
-              </a:endParaRPr>
-            </a:p>
-          </p:txBody>
-        </p:sp>
-        <p:cxnSp>
-          <p:nvCxnSpPr>
-            <p:cNvPr id="57" name="Elbow Connector 122">
-              <a:extLst>
-                <a:ext uri="{FF2B5EF4-FFF2-40B4-BE49-F238E27FC236}">
-                  <a16:creationId xmlns:a16="http://schemas.microsoft.com/office/drawing/2014/main" id="{819F60E2-ADB0-4159-92FC-FC45338654CE}"/>
+                  <a16:creationId xmlns:a16="http://schemas.microsoft.com/office/drawing/2014/main" id="{15137D78-BA2F-497A-913A-8881B6F10AAC}"/>
                 </a:ext>
               </a:extLst>
             </p:cNvPr>
             <p:cNvCxnSpPr>
               <a:cxnSpLocks/>
-              <a:stCxn id="39" idx="2"/>
-              <a:endCxn id="55" idx="0"/>
             </p:cNvCxnSpPr>
             <p:nvPr/>
           </p:nvCxnSpPr>
           <p:spPr>
             <a:xfrm rot="5400000">
-              <a:off x="6641836" y="4778884"/>
-              <a:ext cx="162891" cy="5087"/>
+              <a:off x="4867455" y="3569983"/>
+              <a:ext cx="309038" cy="12700"/>
             </a:xfrm>
             <a:prstGeom prst="bentConnector3">
               <a:avLst>
@@ -5363,28 +6189,28 @@
         </p:cxnSp>
         <p:cxnSp>
           <p:nvCxnSpPr>
-            <p:cNvPr id="59" name="Elbow Connector 122">
+            <p:cNvPr id="132" name="Elbow Connector 122">
               <a:extLst>
                 <a:ext uri="{FF2B5EF4-FFF2-40B4-BE49-F238E27FC236}">
-                  <a16:creationId xmlns:a16="http://schemas.microsoft.com/office/drawing/2014/main" id="{497685BC-3EB0-488D-8BF4-255CC76E950F}"/>
+                  <a16:creationId xmlns:a16="http://schemas.microsoft.com/office/drawing/2014/main" id="{101D1EAA-616E-4567-9C68-2E7FE4DE6DDA}"/>
                 </a:ext>
               </a:extLst>
             </p:cNvPr>
             <p:cNvCxnSpPr>
               <a:cxnSpLocks/>
-              <a:stCxn id="38" idx="2"/>
-              <a:endCxn id="51" idx="0"/>
+              <a:stCxn id="51" idx="1"/>
             </p:cNvCxnSpPr>
             <p:nvPr/>
           </p:nvCxnSpPr>
           <p:spPr>
-            <a:xfrm rot="16200000" flipH="1">
-              <a:off x="4989921" y="4784021"/>
-              <a:ext cx="170838" cy="2762"/>
+            <a:xfrm rot="10800000" flipH="1" flipV="1">
+              <a:off x="4414530" y="3236088"/>
+              <a:ext cx="3868" cy="1198320"/>
             </a:xfrm>
-            <a:prstGeom prst="bentConnector3">
+            <a:prstGeom prst="bentConnector4">
               <a:avLst>
-                <a:gd name="adj1" fmla="val 50000"/>
+                <a:gd name="adj1" fmla="val -5602223"/>
+                <a:gd name="adj2" fmla="val 100157"/>
               </a:avLst>
             </a:prstGeom>
             <a:ln w="19050">
@@ -5416,143 +6242,28 @@
         </p:cxnSp>
         <p:cxnSp>
           <p:nvCxnSpPr>
-            <p:cNvPr id="62" name="Elbow Connector 122">
+            <p:cNvPr id="136" name="Elbow Connector 122">
               <a:extLst>
                 <a:ext uri="{FF2B5EF4-FFF2-40B4-BE49-F238E27FC236}">
-                  <a16:creationId xmlns:a16="http://schemas.microsoft.com/office/drawing/2014/main" id="{05E1C576-4CF8-4F2D-9E18-E6F7C31A0421}"/>
+                  <a16:creationId xmlns:a16="http://schemas.microsoft.com/office/drawing/2014/main" id="{063C2CF8-CEC5-40EE-AEE5-78195E1307A2}"/>
                 </a:ext>
               </a:extLst>
             </p:cNvPr>
             <p:cNvCxnSpPr>
               <a:cxnSpLocks/>
-              <a:stCxn id="40" idx="2"/>
-              <a:endCxn id="49" idx="0"/>
+              <a:stCxn id="55" idx="1"/>
+              <a:endCxn id="44" idx="3"/>
             </p:cNvCxnSpPr>
             <p:nvPr/>
           </p:nvCxnSpPr>
           <p:spPr>
-            <a:xfrm rot="16200000" flipH="1">
-              <a:off x="3337941" y="4780915"/>
-              <a:ext cx="174059" cy="5751"/>
+            <a:xfrm rot="10800000" flipV="1">
+              <a:off x="5652249" y="3232110"/>
+              <a:ext cx="822080" cy="653516"/>
             </a:xfrm>
             <a:prstGeom prst="bentConnector3">
               <a:avLst>
-                <a:gd name="adj1" fmla="val 50000"/>
-              </a:avLst>
-            </a:prstGeom>
-            <a:ln w="19050">
-              <a:solidFill>
-                <a:schemeClr val="accent6">
-                  <a:lumMod val="75000"/>
-                </a:schemeClr>
-              </a:solidFill>
-              <a:prstDash val="sysDot"/>
-              <a:headEnd type="none" w="med" len="med"/>
-              <a:tailEnd type="arrow" w="med" len="med"/>
-            </a:ln>
-            <a:effectLst/>
-          </p:spPr>
-          <p:style>
-            <a:lnRef idx="1">
-              <a:schemeClr val="accent2"/>
-            </a:lnRef>
-            <a:fillRef idx="2">
-              <a:schemeClr val="accent2"/>
-            </a:fillRef>
-            <a:effectRef idx="1">
-              <a:schemeClr val="accent2"/>
-            </a:effectRef>
-            <a:fontRef idx="minor">
-              <a:schemeClr val="dk1"/>
-            </a:fontRef>
-          </p:style>
-        </p:cxnSp>
-        <p:sp>
-          <p:nvSpPr>
-            <p:cNvPr id="84" name="Rectangle 8">
-              <a:extLst>
-                <a:ext uri="{FF2B5EF4-FFF2-40B4-BE49-F238E27FC236}">
-                  <a16:creationId xmlns:a16="http://schemas.microsoft.com/office/drawing/2014/main" id="{E37B3C1D-5BD0-47F7-89C9-1E681F13184E}"/>
-                </a:ext>
-              </a:extLst>
-            </p:cNvPr>
-            <p:cNvSpPr/>
-            <p:nvPr/>
-          </p:nvSpPr>
-          <p:spPr>
-            <a:xfrm>
-              <a:off x="4413002" y="5511067"/>
-              <a:ext cx="1331655" cy="346760"/>
-            </a:xfrm>
-            <a:prstGeom prst="rect">
-              <a:avLst/>
-            </a:prstGeom>
-            <a:ln w="19050"/>
-            <a:effectLst/>
-          </p:spPr>
-          <p:style>
-            <a:lnRef idx="1">
-              <a:schemeClr val="accent6"/>
-            </a:lnRef>
-            <a:fillRef idx="2">
-              <a:schemeClr val="accent6"/>
-            </a:fillRef>
-            <a:effectRef idx="1">
-              <a:schemeClr val="accent6"/>
-            </a:effectRef>
-            <a:fontRef idx="minor">
-              <a:schemeClr val="dk1"/>
-            </a:fontRef>
-          </p:style>
-          <p:txBody>
-            <a:bodyPr rtlCol="0" anchor="ctr"/>
-            <a:lstStyle/>
-            <a:p>
-              <a:pPr algn="ctr"/>
-              <a:r>
-                <a:rPr lang="en-US" sz="1050" b="1" dirty="0" err="1">
-                  <a:solidFill>
-                    <a:schemeClr val="accent6">
-                      <a:lumMod val="75000"/>
-                    </a:schemeClr>
-                  </a:solidFill>
-                </a:rPr>
-                <a:t>JsonAdaptedCode</a:t>
-              </a:r>
-              <a:endParaRPr lang="en-SG" sz="1050" b="1" dirty="0">
-                <a:solidFill>
-                  <a:schemeClr val="accent6">
-                    <a:lumMod val="75000"/>
-                  </a:schemeClr>
-                </a:solidFill>
-              </a:endParaRPr>
-            </a:p>
-          </p:txBody>
-        </p:sp>
-        <p:cxnSp>
-          <p:nvCxnSpPr>
-            <p:cNvPr id="85" name="Elbow Connector 122">
-              <a:extLst>
-                <a:ext uri="{FF2B5EF4-FFF2-40B4-BE49-F238E27FC236}">
-                  <a16:creationId xmlns:a16="http://schemas.microsoft.com/office/drawing/2014/main" id="{9991B445-9091-456C-83A5-57D816B77127}"/>
-                </a:ext>
-              </a:extLst>
-            </p:cNvPr>
-            <p:cNvCxnSpPr>
-              <a:cxnSpLocks/>
-              <a:stCxn id="51" idx="2"/>
-              <a:endCxn id="84" idx="0"/>
-            </p:cNvCxnSpPr>
-            <p:nvPr/>
-          </p:nvCxnSpPr>
-          <p:spPr>
-            <a:xfrm rot="16200000" flipH="1">
-              <a:off x="4931032" y="5363269"/>
-              <a:ext cx="293486" cy="2109"/>
-            </a:xfrm>
-            <a:prstGeom prst="bentConnector3">
-              <a:avLst>
-                <a:gd name="adj1" fmla="val 50000"/>
+                <a:gd name="adj1" fmla="val 49903"/>
               </a:avLst>
             </a:prstGeom>
             <a:ln w="19050">
@@ -5584,79 +6295,28 @@
         </p:cxnSp>
         <p:cxnSp>
           <p:nvCxnSpPr>
-            <p:cNvPr id="88" name="Elbow Connector 122">
+            <p:cNvPr id="141" name="Elbow Connector 122">
               <a:extLst>
                 <a:ext uri="{FF2B5EF4-FFF2-40B4-BE49-F238E27FC236}">
-                  <a16:creationId xmlns:a16="http://schemas.microsoft.com/office/drawing/2014/main" id="{C6373681-9F7C-40C9-A415-CF7E05083F3F}"/>
-                </a:ext>
-              </a:extLst>
-            </p:cNvPr>
-            <p:cNvCxnSpPr>
-              <a:cxnSpLocks/>
-              <a:stCxn id="49" idx="2"/>
-              <a:endCxn id="84" idx="1"/>
-            </p:cNvCxnSpPr>
-            <p:nvPr/>
-          </p:nvCxnSpPr>
-          <p:spPr>
-            <a:xfrm rot="16200000" flipH="1">
-              <a:off x="3686991" y="4958436"/>
-              <a:ext cx="466866" cy="985156"/>
-            </a:xfrm>
-            <a:prstGeom prst="bentConnector2">
-              <a:avLst/>
-            </a:prstGeom>
-            <a:ln w="19050">
-              <a:solidFill>
-                <a:schemeClr val="accent6">
-                  <a:lumMod val="75000"/>
-                </a:schemeClr>
-              </a:solidFill>
-              <a:prstDash val="sysDot"/>
-              <a:headEnd type="none" w="med" len="med"/>
-              <a:tailEnd type="arrow" w="med" len="med"/>
-            </a:ln>
-            <a:effectLst/>
-          </p:spPr>
-          <p:style>
-            <a:lnRef idx="1">
-              <a:schemeClr val="accent2"/>
-            </a:lnRef>
-            <a:fillRef idx="2">
-              <a:schemeClr val="accent2"/>
-            </a:fillRef>
-            <a:effectRef idx="1">
-              <a:schemeClr val="accent2"/>
-            </a:effectRef>
-            <a:fontRef idx="minor">
-              <a:schemeClr val="dk1"/>
-            </a:fontRef>
-          </p:style>
-        </p:cxnSp>
-        <p:cxnSp>
-          <p:nvCxnSpPr>
-            <p:cNvPr id="91" name="Elbow Connector 122">
-              <a:extLst>
-                <a:ext uri="{FF2B5EF4-FFF2-40B4-BE49-F238E27FC236}">
-                  <a16:creationId xmlns:a16="http://schemas.microsoft.com/office/drawing/2014/main" id="{7C266A05-812F-49C9-B251-38C1B1C0751D}"/>
+                  <a16:creationId xmlns:a16="http://schemas.microsoft.com/office/drawing/2014/main" id="{ABFCD2D8-68B5-4137-A0D8-6EADC677BBFB}"/>
                 </a:ext>
               </a:extLst>
             </p:cNvPr>
             <p:cNvCxnSpPr>
               <a:cxnSpLocks/>
               <a:stCxn id="55" idx="1"/>
-              <a:endCxn id="84" idx="3"/>
+              <a:endCxn id="104" idx="3"/>
             </p:cNvCxnSpPr>
             <p:nvPr/>
           </p:nvCxnSpPr>
           <p:spPr>
             <a:xfrm rot="10800000" flipV="1">
-              <a:off x="5744657" y="5036253"/>
-              <a:ext cx="310252" cy="648194"/>
+              <a:off x="5671851" y="3232110"/>
+              <a:ext cx="802478" cy="1210958"/>
             </a:xfrm>
             <a:prstGeom prst="bentConnector3">
               <a:avLst>
-                <a:gd name="adj1" fmla="val 50000"/>
+                <a:gd name="adj1" fmla="val 50890"/>
               </a:avLst>
             </a:prstGeom>
             <a:ln w="19050">
@@ -5688,28 +6348,29 @@
         </p:cxnSp>
         <p:cxnSp>
           <p:nvCxnSpPr>
-            <p:cNvPr id="94" name="Elbow Connector 122">
+            <p:cNvPr id="195" name="Elbow Connector 122">
               <a:extLst>
                 <a:ext uri="{FF2B5EF4-FFF2-40B4-BE49-F238E27FC236}">
-                  <a16:creationId xmlns:a16="http://schemas.microsoft.com/office/drawing/2014/main" id="{E9CF500D-0F3F-419C-A880-F8CAC840BE7F}"/>
+                  <a16:creationId xmlns:a16="http://schemas.microsoft.com/office/drawing/2014/main" id="{92139FD5-CECE-4C76-BC7D-3CABF7CF00BF}"/>
                 </a:ext>
               </a:extLst>
             </p:cNvPr>
             <p:cNvCxnSpPr>
               <a:cxnSpLocks/>
-              <a:stCxn id="55" idx="2"/>
-              <a:endCxn id="73" idx="0"/>
+              <a:stCxn id="55" idx="1"/>
+              <a:endCxn id="63" idx="2"/>
             </p:cNvCxnSpPr>
             <p:nvPr/>
           </p:nvCxnSpPr>
           <p:spPr>
-            <a:xfrm rot="16200000" flipH="1">
-              <a:off x="6572895" y="5357474"/>
-              <a:ext cx="301434" cy="5751"/>
+            <a:xfrm rot="10800000" flipV="1">
+              <a:off x="2995081" y="3232109"/>
+              <a:ext cx="3479248" cy="1377679"/>
             </a:xfrm>
-            <a:prstGeom prst="bentConnector3">
+            <a:prstGeom prst="bentConnector4">
               <a:avLst>
-                <a:gd name="adj1" fmla="val 50000"/>
+                <a:gd name="adj1" fmla="val 11740"/>
+                <a:gd name="adj2" fmla="val 159182"/>
               </a:avLst>
             </a:prstGeom>
             <a:ln w="19050">

</xml_diff>

<commit_message>
docs/DeveloperGuide: update to reflect current impelemtation (#232)
</commit_message>
<xml_diff>
--- a/docs/diagrams/StorageComponentClassDiagram.pptx
+++ b/docs/diagrams/StorageComponentClassDiagram.pptx
@@ -208,7 +208,7 @@
           <a:p>
             <a:fld id="{F5CC4B3F-88C1-4FFA-B1B6-F41C21DC6924}" type="datetimeFigureOut">
               <a:rPr lang="en-US" smtClean="0"/>
-              <a:t>4/1/2019</a:t>
+              <a:t>4/14/2019</a:t>
             </a:fld>
             <a:endParaRPr lang="en-US"/>
           </a:p>
@@ -654,7 +654,7 @@
           <a:p>
             <a:fld id="{78C97017-6FC3-485B-9764-EAC9E56C1D49}" type="datetimeFigureOut">
               <a:rPr lang="en-US" smtClean="0"/>
-              <a:t>4/1/2019</a:t>
+              <a:t>4/14/2019</a:t>
             </a:fld>
             <a:endParaRPr lang="en-US"/>
           </a:p>
@@ -822,7 +822,7 @@
           <a:p>
             <a:fld id="{78C97017-6FC3-485B-9764-EAC9E56C1D49}" type="datetimeFigureOut">
               <a:rPr lang="en-US" smtClean="0"/>
-              <a:t>4/1/2019</a:t>
+              <a:t>4/14/2019</a:t>
             </a:fld>
             <a:endParaRPr lang="en-US"/>
           </a:p>
@@ -1000,7 +1000,7 @@
           <a:p>
             <a:fld id="{78C97017-6FC3-485B-9764-EAC9E56C1D49}" type="datetimeFigureOut">
               <a:rPr lang="en-US" smtClean="0"/>
-              <a:t>4/1/2019</a:t>
+              <a:t>4/14/2019</a:t>
             </a:fld>
             <a:endParaRPr lang="en-US"/>
           </a:p>
@@ -1168,7 +1168,7 @@
           <a:p>
             <a:fld id="{78C97017-6FC3-485B-9764-EAC9E56C1D49}" type="datetimeFigureOut">
               <a:rPr lang="en-US" smtClean="0"/>
-              <a:t>4/1/2019</a:t>
+              <a:t>4/14/2019</a:t>
             </a:fld>
             <a:endParaRPr lang="en-US"/>
           </a:p>
@@ -1413,7 +1413,7 @@
           <a:p>
             <a:fld id="{78C97017-6FC3-485B-9764-EAC9E56C1D49}" type="datetimeFigureOut">
               <a:rPr lang="en-US" smtClean="0"/>
-              <a:t>4/1/2019</a:t>
+              <a:t>4/14/2019</a:t>
             </a:fld>
             <a:endParaRPr lang="en-US"/>
           </a:p>
@@ -1698,7 +1698,7 @@
           <a:p>
             <a:fld id="{78C97017-6FC3-485B-9764-EAC9E56C1D49}" type="datetimeFigureOut">
               <a:rPr lang="en-US" smtClean="0"/>
-              <a:t>4/1/2019</a:t>
+              <a:t>4/14/2019</a:t>
             </a:fld>
             <a:endParaRPr lang="en-US"/>
           </a:p>
@@ -2117,7 +2117,7 @@
           <a:p>
             <a:fld id="{78C97017-6FC3-485B-9764-EAC9E56C1D49}" type="datetimeFigureOut">
               <a:rPr lang="en-US" smtClean="0"/>
-              <a:t>4/1/2019</a:t>
+              <a:t>4/14/2019</a:t>
             </a:fld>
             <a:endParaRPr lang="en-US"/>
           </a:p>
@@ -2234,7 +2234,7 @@
           <a:p>
             <a:fld id="{78C97017-6FC3-485B-9764-EAC9E56C1D49}" type="datetimeFigureOut">
               <a:rPr lang="en-US" smtClean="0"/>
-              <a:t>4/1/2019</a:t>
+              <a:t>4/14/2019</a:t>
             </a:fld>
             <a:endParaRPr lang="en-US"/>
           </a:p>
@@ -2329,7 +2329,7 @@
           <a:p>
             <a:fld id="{78C97017-6FC3-485B-9764-EAC9E56C1D49}" type="datetimeFigureOut">
               <a:rPr lang="en-US" smtClean="0"/>
-              <a:t>4/1/2019</a:t>
+              <a:t>4/14/2019</a:t>
             </a:fld>
             <a:endParaRPr lang="en-US"/>
           </a:p>
@@ -2604,7 +2604,7 @@
           <a:p>
             <a:fld id="{78C97017-6FC3-485B-9764-EAC9E56C1D49}" type="datetimeFigureOut">
               <a:rPr lang="en-US" smtClean="0"/>
-              <a:t>4/1/2019</a:t>
+              <a:t>4/14/2019</a:t>
             </a:fld>
             <a:endParaRPr lang="en-US"/>
           </a:p>
@@ -2856,7 +2856,7 @@
           <a:p>
             <a:fld id="{78C97017-6FC3-485B-9764-EAC9E56C1D49}" type="datetimeFigureOut">
               <a:rPr lang="en-US" smtClean="0"/>
-              <a:t>4/1/2019</a:t>
+              <a:t>4/14/2019</a:t>
             </a:fld>
             <a:endParaRPr lang="en-US"/>
           </a:p>
@@ -3067,7 +3067,7 @@
           <a:p>
             <a:fld id="{78C97017-6FC3-485B-9764-EAC9E56C1D49}" type="datetimeFigureOut">
               <a:rPr lang="en-US" smtClean="0"/>
-              <a:t>4/1/2019</a:t>
+              <a:t>4/14/2019</a:t>
             </a:fld>
             <a:endParaRPr lang="en-US"/>
           </a:p>
@@ -3444,10 +3444,10 @@
       </p:grpSpPr>
       <p:grpSp>
         <p:nvGrpSpPr>
-          <p:cNvPr id="89" name="Group 88">
+          <p:cNvPr id="202" name="Group 201">
             <a:extLst>
               <a:ext uri="{FF2B5EF4-FFF2-40B4-BE49-F238E27FC236}">
-                <a16:creationId xmlns:a16="http://schemas.microsoft.com/office/drawing/2014/main" id="{D0390CE2-E95C-4CD7-9EBF-FB624841AB3A}"/>
+                <a16:creationId xmlns:a16="http://schemas.microsoft.com/office/drawing/2014/main" id="{6C19133A-6AAB-48C4-A37C-46095432C7C2}"/>
               </a:ext>
             </a:extLst>
           </p:cNvPr>
@@ -3456,1185 +3456,2329 @@
         </p:nvGrpSpPr>
         <p:grpSpPr>
           <a:xfrm>
-            <a:off x="2387963" y="2086382"/>
-            <a:ext cx="5155838" cy="3930558"/>
-            <a:chOff x="2387963" y="2086382"/>
-            <a:chExt cx="5155838" cy="3930558"/>
+            <a:off x="2057400" y="729094"/>
+            <a:ext cx="6540332" cy="5399812"/>
+            <a:chOff x="1545124" y="212233"/>
+            <a:chExt cx="6540332" cy="5399812"/>
           </a:xfrm>
         </p:grpSpPr>
+        <p:grpSp>
+          <p:nvGrpSpPr>
+            <p:cNvPr id="89" name="Group 88">
+              <a:extLst>
+                <a:ext uri="{FF2B5EF4-FFF2-40B4-BE49-F238E27FC236}">
+                  <a16:creationId xmlns:a16="http://schemas.microsoft.com/office/drawing/2014/main" id="{D0390CE2-E95C-4CD7-9EBF-FB624841AB3A}"/>
+                </a:ext>
+              </a:extLst>
+            </p:cNvPr>
+            <p:cNvGrpSpPr/>
+            <p:nvPr/>
+          </p:nvGrpSpPr>
+          <p:grpSpPr>
+            <a:xfrm>
+              <a:off x="1545124" y="212233"/>
+              <a:ext cx="6540332" cy="5399812"/>
+              <a:chOff x="2028648" y="2088408"/>
+              <a:chExt cx="6540332" cy="5399812"/>
+            </a:xfrm>
+          </p:grpSpPr>
+          <p:sp>
+            <p:nvSpPr>
+              <p:cNvPr id="118" name="Rectangle 65"/>
+              <p:cNvSpPr/>
+              <p:nvPr/>
+            </p:nvSpPr>
+            <p:spPr>
+              <a:xfrm>
+                <a:off x="2236124" y="2088408"/>
+                <a:ext cx="6332856" cy="5399812"/>
+              </a:xfrm>
+              <a:prstGeom prst="roundRect">
+                <a:avLst>
+                  <a:gd name="adj" fmla="val 3484"/>
+                </a:avLst>
+              </a:prstGeom>
+              <a:solidFill>
+                <a:schemeClr val="accent6">
+                  <a:lumMod val="20000"/>
+                  <a:lumOff val="80000"/>
+                </a:schemeClr>
+              </a:solidFill>
+              <a:ln w="19050">
+                <a:noFill/>
+              </a:ln>
+              <a:effectLst/>
+            </p:spPr>
+            <p:style>
+              <a:lnRef idx="1">
+                <a:schemeClr val="accent2"/>
+              </a:lnRef>
+              <a:fillRef idx="2">
+                <a:schemeClr val="accent2"/>
+              </a:fillRef>
+              <a:effectRef idx="1">
+                <a:schemeClr val="accent2"/>
+              </a:effectRef>
+              <a:fontRef idx="minor">
+                <a:schemeClr val="dk1"/>
+              </a:fontRef>
+            </p:style>
+            <p:txBody>
+              <a:bodyPr rtlCol="0" anchor="t"/>
+              <a:lstStyle/>
+              <a:p>
+                <a:r>
+                  <a:rPr lang="en-US" sz="1200" b="1" dirty="0">
+                    <a:solidFill>
+                      <a:schemeClr val="accent6">
+                        <a:lumMod val="75000"/>
+                      </a:schemeClr>
+                    </a:solidFill>
+                  </a:rPr>
+                  <a:t>Storage</a:t>
+                </a:r>
+                <a:endParaRPr lang="en-SG" sz="1200" b="1" dirty="0">
+                  <a:solidFill>
+                    <a:schemeClr val="accent6">
+                      <a:lumMod val="75000"/>
+                    </a:schemeClr>
+                  </a:solidFill>
+                </a:endParaRPr>
+              </a:p>
+            </p:txBody>
+          </p:sp>
+          <p:sp>
+            <p:nvSpPr>
+              <p:cNvPr id="2" name="Rectangle 8"/>
+              <p:cNvSpPr/>
+              <p:nvPr/>
+            </p:nvSpPr>
+            <p:spPr>
+              <a:xfrm>
+                <a:off x="4355052" y="3105763"/>
+                <a:ext cx="1323049" cy="346760"/>
+              </a:xfrm>
+              <a:prstGeom prst="rect">
+                <a:avLst/>
+              </a:prstGeom>
+              <a:solidFill>
+                <a:schemeClr val="accent6">
+                  <a:lumMod val="75000"/>
+                </a:schemeClr>
+              </a:solidFill>
+              <a:ln w="19050">
+                <a:solidFill>
+                  <a:schemeClr val="accent6">
+                    <a:lumMod val="75000"/>
+                  </a:schemeClr>
+                </a:solidFill>
+              </a:ln>
+              <a:effectLst/>
+            </p:spPr>
+            <p:style>
+              <a:lnRef idx="1">
+                <a:schemeClr val="accent2"/>
+              </a:lnRef>
+              <a:fillRef idx="2">
+                <a:schemeClr val="accent2"/>
+              </a:fillRef>
+              <a:effectRef idx="1">
+                <a:schemeClr val="accent2"/>
+              </a:effectRef>
+              <a:fontRef idx="minor">
+                <a:schemeClr val="dk1"/>
+              </a:fontRef>
+            </p:style>
+            <p:txBody>
+              <a:bodyPr rtlCol="0" anchor="ctr"/>
+              <a:lstStyle/>
+              <a:p>
+                <a:pPr algn="ctr"/>
+                <a:r>
+                  <a:rPr lang="en-US" sz="1050" dirty="0">
+                    <a:solidFill>
+                      <a:schemeClr val="bg1"/>
+                    </a:solidFill>
+                  </a:rPr>
+                  <a:t>&lt;&lt;interface&gt;&gt;</a:t>
+                </a:r>
+                <a:br>
+                  <a:rPr lang="en-US" sz="1050" dirty="0">
+                    <a:solidFill>
+                      <a:schemeClr val="bg1"/>
+                    </a:solidFill>
+                  </a:rPr>
+                </a:br>
+                <a:r>
+                  <a:rPr lang="en-US" sz="1050" dirty="0" err="1">
+                    <a:solidFill>
+                      <a:schemeClr val="bg1"/>
+                    </a:solidFill>
+                  </a:rPr>
+                  <a:t>ApplicationStorage</a:t>
+                </a:r>
+                <a:endParaRPr lang="en-SG" sz="1050" dirty="0">
+                  <a:solidFill>
+                    <a:schemeClr val="bg1"/>
+                  </a:solidFill>
+                </a:endParaRPr>
+              </a:p>
+            </p:txBody>
+          </p:sp>
+          <p:sp>
+            <p:nvSpPr>
+              <p:cNvPr id="9" name="Rectangle 62"/>
+              <p:cNvSpPr/>
+              <p:nvPr/>
+            </p:nvSpPr>
+            <p:spPr>
+              <a:xfrm rot="16200000">
+                <a:off x="3161835" y="2816010"/>
+                <a:ext cx="1093635" cy="346760"/>
+              </a:xfrm>
+              <a:prstGeom prst="rect">
+                <a:avLst/>
+              </a:prstGeom>
+              <a:solidFill>
+                <a:schemeClr val="accent6">
+                  <a:lumMod val="75000"/>
+                </a:schemeClr>
+              </a:solidFill>
+              <a:ln w="19050">
+                <a:solidFill>
+                  <a:schemeClr val="accent6">
+                    <a:lumMod val="75000"/>
+                  </a:schemeClr>
+                </a:solidFill>
+              </a:ln>
+              <a:effectLst/>
+            </p:spPr>
+            <p:style>
+              <a:lnRef idx="1">
+                <a:schemeClr val="accent2"/>
+              </a:lnRef>
+              <a:fillRef idx="2">
+                <a:schemeClr val="accent2"/>
+              </a:fillRef>
+              <a:effectRef idx="1">
+                <a:schemeClr val="accent2"/>
+              </a:effectRef>
+              <a:fontRef idx="minor">
+                <a:schemeClr val="dk1"/>
+              </a:fontRef>
+            </p:style>
+            <p:txBody>
+              <a:bodyPr rtlCol="0" anchor="ctr"/>
+              <a:lstStyle/>
+              <a:p>
+                <a:pPr algn="ctr"/>
+                <a:r>
+                  <a:rPr lang="en-US" sz="1050" dirty="0" err="1">
+                    <a:solidFill>
+                      <a:schemeClr val="bg1"/>
+                    </a:solidFill>
+                  </a:rPr>
+                  <a:t>StorageManager</a:t>
+                </a:r>
+                <a:endParaRPr lang="en-SG" sz="1050" dirty="0">
+                  <a:solidFill>
+                    <a:schemeClr val="bg1"/>
+                  </a:solidFill>
+                </a:endParaRPr>
+              </a:p>
+            </p:txBody>
+          </p:sp>
+          <p:sp>
+            <p:nvSpPr>
+              <p:cNvPr id="119" name="Rectangle 62"/>
+              <p:cNvSpPr/>
+              <p:nvPr/>
+            </p:nvSpPr>
+            <p:spPr>
+              <a:xfrm rot="16200000">
+                <a:off x="2434074" y="2808525"/>
+                <a:ext cx="1093635" cy="346760"/>
+              </a:xfrm>
+              <a:prstGeom prst="rect">
+                <a:avLst/>
+              </a:prstGeom>
+              <a:solidFill>
+                <a:schemeClr val="accent6">
+                  <a:lumMod val="75000"/>
+                </a:schemeClr>
+              </a:solidFill>
+              <a:ln w="19050">
+                <a:solidFill>
+                  <a:schemeClr val="accent6">
+                    <a:lumMod val="75000"/>
+                  </a:schemeClr>
+                </a:solidFill>
+              </a:ln>
+              <a:effectLst/>
+            </p:spPr>
+            <p:style>
+              <a:lnRef idx="1">
+                <a:schemeClr val="accent2"/>
+              </a:lnRef>
+              <a:fillRef idx="2">
+                <a:schemeClr val="accent2"/>
+              </a:fillRef>
+              <a:effectRef idx="1">
+                <a:schemeClr val="accent2"/>
+              </a:effectRef>
+              <a:fontRef idx="minor">
+                <a:schemeClr val="dk1"/>
+              </a:fontRef>
+            </p:style>
+            <p:txBody>
+              <a:bodyPr rtlCol="0" anchor="ctr"/>
+              <a:lstStyle/>
+              <a:p>
+                <a:pPr algn="ctr"/>
+                <a:r>
+                  <a:rPr lang="en-US" sz="1050" dirty="0">
+                    <a:solidFill>
+                      <a:schemeClr val="bg1"/>
+                    </a:solidFill>
+                  </a:rPr>
+                  <a:t>&lt;&lt;interface&gt;&gt;</a:t>
+                </a:r>
+              </a:p>
+              <a:p>
+                <a:pPr algn="ctr"/>
+                <a:r>
+                  <a:rPr lang="en-US" sz="1050" dirty="0">
+                    <a:solidFill>
+                      <a:schemeClr val="bg1"/>
+                    </a:solidFill>
+                  </a:rPr>
+                  <a:t>Storage</a:t>
+                </a:r>
+                <a:endParaRPr lang="en-SG" sz="1050" dirty="0">
+                  <a:solidFill>
+                    <a:schemeClr val="bg1"/>
+                  </a:solidFill>
+                </a:endParaRPr>
+              </a:p>
+            </p:txBody>
+          </p:sp>
+          <p:sp>
+            <p:nvSpPr>
+              <p:cNvPr id="120" name="Isosceles Triangle 102"/>
+              <p:cNvSpPr/>
+              <p:nvPr/>
+            </p:nvSpPr>
+            <p:spPr>
+              <a:xfrm rot="16200000">
+                <a:off x="3104782" y="2899614"/>
+                <a:ext cx="270504" cy="175523"/>
+              </a:xfrm>
+              <a:prstGeom prst="triangle">
+                <a:avLst/>
+              </a:prstGeom>
+              <a:solidFill>
+                <a:schemeClr val="accent6">
+                  <a:lumMod val="75000"/>
+                </a:schemeClr>
+              </a:solidFill>
+              <a:ln w="19050">
+                <a:solidFill>
+                  <a:schemeClr val="accent6">
+                    <a:lumMod val="75000"/>
+                  </a:schemeClr>
+                </a:solidFill>
+              </a:ln>
+              <a:effectLst/>
+            </p:spPr>
+            <p:style>
+              <a:lnRef idx="1">
+                <a:schemeClr val="accent2"/>
+              </a:lnRef>
+              <a:fillRef idx="2">
+                <a:schemeClr val="accent2"/>
+              </a:fillRef>
+              <a:effectRef idx="1">
+                <a:schemeClr val="accent2"/>
+              </a:effectRef>
+              <a:fontRef idx="minor">
+                <a:schemeClr val="dk1"/>
+              </a:fontRef>
+            </p:style>
+            <p:txBody>
+              <a:bodyPr rtlCol="0" anchor="ctr"/>
+              <a:lstStyle/>
+              <a:p>
+                <a:pPr algn="ctr"/>
+                <a:endParaRPr lang="en-SG" sz="1050">
+                  <a:solidFill>
+                    <a:schemeClr val="bg1"/>
+                  </a:solidFill>
+                </a:endParaRPr>
+              </a:p>
+            </p:txBody>
+          </p:sp>
+          <p:cxnSp>
+            <p:nvCxnSpPr>
+              <p:cNvPr id="58" name="Straight Arrow Connector 57"/>
+              <p:cNvCxnSpPr>
+                <a:stCxn id="42" idx="3"/>
+                <a:endCxn id="2" idx="1"/>
+              </p:cNvCxnSpPr>
+              <p:nvPr/>
+            </p:nvCxnSpPr>
+            <p:spPr>
+              <a:xfrm>
+                <a:off x="4134242" y="3273859"/>
+                <a:ext cx="220810" cy="5284"/>
+              </a:xfrm>
+              <a:prstGeom prst="straightConnector1">
+                <a:avLst/>
+              </a:prstGeom>
+              <a:ln w="19050">
+                <a:solidFill>
+                  <a:schemeClr val="accent6">
+                    <a:lumMod val="75000"/>
+                  </a:schemeClr>
+                </a:solidFill>
+                <a:headEnd type="none" w="med" len="med"/>
+                <a:tailEnd type="arrow" w="med" len="med"/>
+              </a:ln>
+              <a:effectLst/>
+            </p:spPr>
+            <p:style>
+              <a:lnRef idx="1">
+                <a:schemeClr val="accent2"/>
+              </a:lnRef>
+              <a:fillRef idx="2">
+                <a:schemeClr val="accent2"/>
+              </a:fillRef>
+              <a:effectRef idx="1">
+                <a:schemeClr val="accent2"/>
+              </a:effectRef>
+              <a:fontRef idx="minor">
+                <a:schemeClr val="dk1"/>
+              </a:fontRef>
+            </p:style>
+          </p:cxnSp>
+          <p:cxnSp>
+            <p:nvCxnSpPr>
+              <p:cNvPr id="75" name="Elbow Connector 122"/>
+              <p:cNvCxnSpPr>
+                <a:cxnSpLocks/>
+              </p:cNvCxnSpPr>
+              <p:nvPr/>
+            </p:nvCxnSpPr>
+            <p:spPr>
+              <a:xfrm>
+                <a:off x="2028648" y="2990236"/>
+                <a:ext cx="778863" cy="12700"/>
+              </a:xfrm>
+              <a:prstGeom prst="bentConnector3">
+                <a:avLst>
+                  <a:gd name="adj1" fmla="val 50000"/>
+                </a:avLst>
+              </a:prstGeom>
+              <a:ln w="19050">
+                <a:solidFill>
+                  <a:schemeClr val="bg1">
+                    <a:lumMod val="75000"/>
+                  </a:schemeClr>
+                </a:solidFill>
+                <a:prstDash val="sysDot"/>
+                <a:headEnd type="none" w="med" len="med"/>
+                <a:tailEnd type="arrow" w="med" len="med"/>
+              </a:ln>
+              <a:effectLst/>
+            </p:spPr>
+            <p:style>
+              <a:lnRef idx="1">
+                <a:schemeClr val="accent2"/>
+              </a:lnRef>
+              <a:fillRef idx="2">
+                <a:schemeClr val="accent2"/>
+              </a:fillRef>
+              <a:effectRef idx="1">
+                <a:schemeClr val="accent2"/>
+              </a:effectRef>
+              <a:fontRef idx="minor">
+                <a:schemeClr val="dk1"/>
+              </a:fontRef>
+            </p:style>
+          </p:cxnSp>
+          <p:cxnSp>
+            <p:nvCxnSpPr>
+              <p:cNvPr id="21" name="Straight Connector 20"/>
+              <p:cNvCxnSpPr>
+                <a:stCxn id="120" idx="3"/>
+              </p:cNvCxnSpPr>
+              <p:nvPr/>
+            </p:nvCxnSpPr>
+            <p:spPr>
+              <a:xfrm flipV="1">
+                <a:off x="3327796" y="2987375"/>
+                <a:ext cx="216105" cy="1"/>
+              </a:xfrm>
+              <a:prstGeom prst="line">
+                <a:avLst/>
+              </a:prstGeom>
+              <a:ln w="19050">
+                <a:solidFill>
+                  <a:schemeClr val="accent6">
+                    <a:lumMod val="75000"/>
+                  </a:schemeClr>
+                </a:solidFill>
+                <a:prstDash val="sysDot"/>
+                <a:headEnd type="none" w="med" len="med"/>
+                <a:tailEnd type="none" w="med" len="med"/>
+              </a:ln>
+              <a:effectLst/>
+            </p:spPr>
+            <p:style>
+              <a:lnRef idx="1">
+                <a:schemeClr val="accent2"/>
+              </a:lnRef>
+              <a:fillRef idx="2">
+                <a:schemeClr val="accent2"/>
+              </a:fillRef>
+              <a:effectRef idx="1">
+                <a:schemeClr val="accent2"/>
+              </a:effectRef>
+              <a:fontRef idx="minor">
+                <a:schemeClr val="dk1"/>
+              </a:fontRef>
+            </p:style>
+          </p:cxnSp>
+          <p:sp>
+            <p:nvSpPr>
+              <p:cNvPr id="42" name="Flowchart: Decision 96"/>
+              <p:cNvSpPr/>
+              <p:nvPr/>
+            </p:nvSpPr>
+            <p:spPr>
+              <a:xfrm>
+                <a:off x="3898194" y="3187169"/>
+                <a:ext cx="236048" cy="173380"/>
+              </a:xfrm>
+              <a:prstGeom prst="flowChartDecision">
+                <a:avLst/>
+              </a:prstGeom>
+              <a:noFill/>
+              <a:ln w="19050">
+                <a:solidFill>
+                  <a:schemeClr val="accent6">
+                    <a:lumMod val="75000"/>
+                  </a:schemeClr>
+                </a:solidFill>
+              </a:ln>
+              <a:effectLst/>
+            </p:spPr>
+            <p:style>
+              <a:lnRef idx="1">
+                <a:schemeClr val="accent2"/>
+              </a:lnRef>
+              <a:fillRef idx="2">
+                <a:schemeClr val="accent2"/>
+              </a:fillRef>
+              <a:effectRef idx="1">
+                <a:schemeClr val="accent2"/>
+              </a:effectRef>
+              <a:fontRef idx="minor">
+                <a:schemeClr val="dk1"/>
+              </a:fontRef>
+            </p:style>
+            <p:txBody>
+              <a:bodyPr rtlCol="0" anchor="ctr"/>
+              <a:lstStyle/>
+              <a:p>
+                <a:pPr algn="ctr"/>
+                <a:endParaRPr lang="en-US" sz="1050">
+                  <a:solidFill>
+                    <a:schemeClr val="bg1"/>
+                  </a:solidFill>
+                </a:endParaRPr>
+              </a:p>
+            </p:txBody>
+          </p:sp>
+          <p:cxnSp>
+            <p:nvCxnSpPr>
+              <p:cNvPr id="97" name="Elbow Connector 63"/>
+              <p:cNvCxnSpPr>
+                <a:stCxn id="99" idx="3"/>
+                <a:endCxn id="50" idx="1"/>
+              </p:cNvCxnSpPr>
+              <p:nvPr/>
+            </p:nvCxnSpPr>
+            <p:spPr>
+              <a:xfrm flipV="1">
+                <a:off x="5875913" y="3279143"/>
+                <a:ext cx="223324" cy="1"/>
+              </a:xfrm>
+              <a:prstGeom prst="bentConnector3">
+                <a:avLst>
+                  <a:gd name="adj1" fmla="val 50000"/>
+                </a:avLst>
+              </a:prstGeom>
+              <a:ln w="19050">
+                <a:solidFill>
+                  <a:schemeClr val="accent6">
+                    <a:lumMod val="75000"/>
+                  </a:schemeClr>
+                </a:solidFill>
+                <a:prstDash val="sysDot"/>
+                <a:headEnd type="none" w="med" len="med"/>
+                <a:tailEnd type="none" w="med" len="med"/>
+              </a:ln>
+              <a:effectLst/>
+            </p:spPr>
+            <p:style>
+              <a:lnRef idx="1">
+                <a:schemeClr val="accent2"/>
+              </a:lnRef>
+              <a:fillRef idx="2">
+                <a:schemeClr val="accent2"/>
+              </a:fillRef>
+              <a:effectRef idx="1">
+                <a:schemeClr val="accent2"/>
+              </a:effectRef>
+              <a:fontRef idx="minor">
+                <a:schemeClr val="dk1"/>
+              </a:fontRef>
+            </p:style>
+          </p:cxnSp>
+          <p:sp>
+            <p:nvSpPr>
+              <p:cNvPr id="99" name="Isosceles Triangle 102"/>
+              <p:cNvSpPr/>
+              <p:nvPr/>
+            </p:nvSpPr>
+            <p:spPr>
+              <a:xfrm rot="5400000" flipV="1">
+                <a:off x="5652899" y="3191382"/>
+                <a:ext cx="270504" cy="175523"/>
+              </a:xfrm>
+              <a:prstGeom prst="triangle">
+                <a:avLst/>
+              </a:prstGeom>
+              <a:solidFill>
+                <a:schemeClr val="accent6">
+                  <a:lumMod val="75000"/>
+                </a:schemeClr>
+              </a:solidFill>
+              <a:ln w="19050">
+                <a:solidFill>
+                  <a:schemeClr val="accent6">
+                    <a:lumMod val="75000"/>
+                  </a:schemeClr>
+                </a:solidFill>
+              </a:ln>
+              <a:effectLst/>
+            </p:spPr>
+            <p:style>
+              <a:lnRef idx="1">
+                <a:schemeClr val="accent2"/>
+              </a:lnRef>
+              <a:fillRef idx="2">
+                <a:schemeClr val="accent2"/>
+              </a:fillRef>
+              <a:effectRef idx="1">
+                <a:schemeClr val="accent2"/>
+              </a:effectRef>
+              <a:fontRef idx="minor">
+                <a:schemeClr val="dk1"/>
+              </a:fontRef>
+            </p:style>
+            <p:txBody>
+              <a:bodyPr rtlCol="0" anchor="ctr"/>
+              <a:lstStyle/>
+              <a:p>
+                <a:pPr algn="ctr"/>
+                <a:endParaRPr lang="en-SG" sz="1050">
+                  <a:solidFill>
+                    <a:schemeClr val="bg1"/>
+                  </a:solidFill>
+                </a:endParaRPr>
+              </a:p>
+            </p:txBody>
+          </p:sp>
+          <p:cxnSp>
+            <p:nvCxnSpPr>
+              <p:cNvPr id="124" name="Elbow Connector 122"/>
+              <p:cNvCxnSpPr>
+                <a:cxnSpLocks/>
+                <a:stCxn id="50" idx="2"/>
+                <a:endCxn id="66" idx="0"/>
+              </p:cNvCxnSpPr>
+              <p:nvPr/>
+            </p:nvCxnSpPr>
+            <p:spPr>
+              <a:xfrm rot="5400000">
+                <a:off x="5926999" y="3021171"/>
+                <a:ext cx="325805" cy="1188508"/>
+              </a:xfrm>
+              <a:prstGeom prst="bentConnector3">
+                <a:avLst>
+                  <a:gd name="adj1" fmla="val 50000"/>
+                </a:avLst>
+              </a:prstGeom>
+              <a:ln w="19050">
+                <a:solidFill>
+                  <a:schemeClr val="accent6">
+                    <a:lumMod val="75000"/>
+                  </a:schemeClr>
+                </a:solidFill>
+                <a:prstDash val="sysDot"/>
+                <a:headEnd type="none" w="med" len="med"/>
+                <a:tailEnd type="arrow" w="med" len="med"/>
+              </a:ln>
+              <a:effectLst/>
+            </p:spPr>
+            <p:style>
+              <a:lnRef idx="1">
+                <a:schemeClr val="accent2"/>
+              </a:lnRef>
+              <a:fillRef idx="2">
+                <a:schemeClr val="accent2"/>
+              </a:fillRef>
+              <a:effectRef idx="1">
+                <a:schemeClr val="accent2"/>
+              </a:effectRef>
+              <a:fontRef idx="minor">
+                <a:schemeClr val="dk1"/>
+              </a:fontRef>
+            </p:style>
+          </p:cxnSp>
+          <p:sp>
+            <p:nvSpPr>
+              <p:cNvPr id="50" name="Rectangle 8"/>
+              <p:cNvSpPr/>
+              <p:nvPr/>
+            </p:nvSpPr>
+            <p:spPr>
+              <a:xfrm>
+                <a:off x="6099237" y="3105763"/>
+                <a:ext cx="1169835" cy="346760"/>
+              </a:xfrm>
+              <a:prstGeom prst="rect">
+                <a:avLst/>
+              </a:prstGeom>
+              <a:ln w="19050"/>
+              <a:effectLst/>
+            </p:spPr>
+            <p:style>
+              <a:lnRef idx="1">
+                <a:schemeClr val="accent6"/>
+              </a:lnRef>
+              <a:fillRef idx="2">
+                <a:schemeClr val="accent6"/>
+              </a:fillRef>
+              <a:effectRef idx="1">
+                <a:schemeClr val="accent6"/>
+              </a:effectRef>
+              <a:fontRef idx="minor">
+                <a:schemeClr val="dk1"/>
+              </a:fontRef>
+            </p:style>
+            <p:txBody>
+              <a:bodyPr rtlCol="0" anchor="ctr"/>
+              <a:lstStyle/>
+              <a:p>
+                <a:pPr algn="ctr"/>
+                <a:r>
+                  <a:rPr lang="en-US" sz="1050" b="1" dirty="0" err="1">
+                    <a:solidFill>
+                      <a:schemeClr val="accent6">
+                        <a:lumMod val="75000"/>
+                      </a:schemeClr>
+                    </a:solidFill>
+                  </a:rPr>
+                  <a:t>JsonApplication</a:t>
+                </a:r>
+                <a:br>
+                  <a:rPr lang="en-US" sz="1050" b="1" dirty="0">
+                    <a:solidFill>
+                      <a:schemeClr val="accent6">
+                        <a:lumMod val="75000"/>
+                      </a:schemeClr>
+                    </a:solidFill>
+                  </a:rPr>
+                </a:br>
+                <a:r>
+                  <a:rPr lang="en-US" sz="1050" b="1" dirty="0">
+                    <a:solidFill>
+                      <a:schemeClr val="accent6">
+                        <a:lumMod val="75000"/>
+                      </a:schemeClr>
+                    </a:solidFill>
+                  </a:rPr>
+                  <a:t>Storage</a:t>
+                </a:r>
+                <a:endParaRPr lang="en-SG" sz="1050" b="1" dirty="0">
+                  <a:solidFill>
+                    <a:schemeClr val="accent6">
+                      <a:lumMod val="75000"/>
+                    </a:schemeClr>
+                  </a:solidFill>
+                </a:endParaRPr>
+              </a:p>
+            </p:txBody>
+          </p:sp>
+          <p:sp>
+            <p:nvSpPr>
+              <p:cNvPr id="52" name="Rectangle 8"/>
+              <p:cNvSpPr/>
+              <p:nvPr/>
+            </p:nvSpPr>
+            <p:spPr>
+              <a:xfrm>
+                <a:off x="4351815" y="2505363"/>
+                <a:ext cx="1323049" cy="346760"/>
+              </a:xfrm>
+              <a:prstGeom prst="rect">
+                <a:avLst/>
+              </a:prstGeom>
+              <a:solidFill>
+                <a:schemeClr val="accent6">
+                  <a:lumMod val="75000"/>
+                </a:schemeClr>
+              </a:solidFill>
+              <a:ln w="19050">
+                <a:solidFill>
+                  <a:schemeClr val="accent6">
+                    <a:lumMod val="75000"/>
+                  </a:schemeClr>
+                </a:solidFill>
+              </a:ln>
+              <a:effectLst/>
+            </p:spPr>
+            <p:style>
+              <a:lnRef idx="1">
+                <a:schemeClr val="accent2"/>
+              </a:lnRef>
+              <a:fillRef idx="2">
+                <a:schemeClr val="accent2"/>
+              </a:fillRef>
+              <a:effectRef idx="1">
+                <a:schemeClr val="accent2"/>
+              </a:effectRef>
+              <a:fontRef idx="minor">
+                <a:schemeClr val="dk1"/>
+              </a:fontRef>
+            </p:style>
+            <p:txBody>
+              <a:bodyPr rtlCol="0" anchor="ctr"/>
+              <a:lstStyle/>
+              <a:p>
+                <a:pPr algn="ctr"/>
+                <a:r>
+                  <a:rPr lang="en-US" sz="1050" dirty="0">
+                    <a:solidFill>
+                      <a:schemeClr val="bg1"/>
+                    </a:solidFill>
+                  </a:rPr>
+                  <a:t>&lt;&lt;interface&gt;&gt;</a:t>
+                </a:r>
+                <a:br>
+                  <a:rPr lang="en-US" sz="1050" dirty="0">
+                    <a:solidFill>
+                      <a:schemeClr val="bg1"/>
+                    </a:solidFill>
+                  </a:rPr>
+                </a:br>
+                <a:r>
+                  <a:rPr lang="en-US" sz="1050" dirty="0" err="1">
+                    <a:solidFill>
+                      <a:schemeClr val="bg1"/>
+                    </a:solidFill>
+                  </a:rPr>
+                  <a:t>UserPrefsStorage</a:t>
+                </a:r>
+                <a:endParaRPr lang="en-SG" sz="1050" dirty="0">
+                  <a:solidFill>
+                    <a:schemeClr val="bg1"/>
+                  </a:solidFill>
+                </a:endParaRPr>
+              </a:p>
+            </p:txBody>
+          </p:sp>
+          <p:cxnSp>
+            <p:nvCxnSpPr>
+              <p:cNvPr id="54" name="Straight Arrow Connector 53"/>
+              <p:cNvCxnSpPr>
+                <a:stCxn id="56" idx="3"/>
+                <a:endCxn id="52" idx="1"/>
+              </p:cNvCxnSpPr>
+              <p:nvPr/>
+            </p:nvCxnSpPr>
+            <p:spPr>
+              <a:xfrm>
+                <a:off x="4131005" y="2673459"/>
+                <a:ext cx="220810" cy="5284"/>
+              </a:xfrm>
+              <a:prstGeom prst="straightConnector1">
+                <a:avLst/>
+              </a:prstGeom>
+              <a:ln w="19050">
+                <a:solidFill>
+                  <a:schemeClr val="accent6">
+                    <a:lumMod val="75000"/>
+                  </a:schemeClr>
+                </a:solidFill>
+                <a:headEnd type="none" w="med" len="med"/>
+                <a:tailEnd type="arrow" w="med" len="med"/>
+              </a:ln>
+              <a:effectLst/>
+            </p:spPr>
+            <p:style>
+              <a:lnRef idx="1">
+                <a:schemeClr val="accent2"/>
+              </a:lnRef>
+              <a:fillRef idx="2">
+                <a:schemeClr val="accent2"/>
+              </a:fillRef>
+              <a:effectRef idx="1">
+                <a:schemeClr val="accent2"/>
+              </a:effectRef>
+              <a:fontRef idx="minor">
+                <a:schemeClr val="dk1"/>
+              </a:fontRef>
+            </p:style>
+          </p:cxnSp>
+          <p:sp>
+            <p:nvSpPr>
+              <p:cNvPr id="56" name="Flowchart: Decision 96"/>
+              <p:cNvSpPr/>
+              <p:nvPr/>
+            </p:nvSpPr>
+            <p:spPr>
+              <a:xfrm>
+                <a:off x="3894957" y="2586769"/>
+                <a:ext cx="236048" cy="173380"/>
+              </a:xfrm>
+              <a:prstGeom prst="flowChartDecision">
+                <a:avLst/>
+              </a:prstGeom>
+              <a:noFill/>
+              <a:ln w="19050">
+                <a:solidFill>
+                  <a:schemeClr val="accent6">
+                    <a:lumMod val="75000"/>
+                  </a:schemeClr>
+                </a:solidFill>
+              </a:ln>
+              <a:effectLst/>
+            </p:spPr>
+            <p:style>
+              <a:lnRef idx="1">
+                <a:schemeClr val="accent2"/>
+              </a:lnRef>
+              <a:fillRef idx="2">
+                <a:schemeClr val="accent2"/>
+              </a:fillRef>
+              <a:effectRef idx="1">
+                <a:schemeClr val="accent2"/>
+              </a:effectRef>
+              <a:fontRef idx="minor">
+                <a:schemeClr val="dk1"/>
+              </a:fontRef>
+            </p:style>
+            <p:txBody>
+              <a:bodyPr rtlCol="0" anchor="ctr"/>
+              <a:lstStyle/>
+              <a:p>
+                <a:pPr algn="ctr"/>
+                <a:endParaRPr lang="en-US" sz="1050">
+                  <a:solidFill>
+                    <a:schemeClr val="bg1"/>
+                  </a:solidFill>
+                </a:endParaRPr>
+              </a:p>
+            </p:txBody>
+          </p:sp>
+          <p:cxnSp>
+            <p:nvCxnSpPr>
+              <p:cNvPr id="60" name="Elbow Connector 63"/>
+              <p:cNvCxnSpPr>
+                <a:stCxn id="61" idx="3"/>
+                <a:endCxn id="65" idx="1"/>
+              </p:cNvCxnSpPr>
+              <p:nvPr/>
+            </p:nvCxnSpPr>
+            <p:spPr>
+              <a:xfrm flipV="1">
+                <a:off x="5872676" y="2678743"/>
+                <a:ext cx="223324" cy="1"/>
+              </a:xfrm>
+              <a:prstGeom prst="bentConnector3">
+                <a:avLst>
+                  <a:gd name="adj1" fmla="val 50000"/>
+                </a:avLst>
+              </a:prstGeom>
+              <a:ln w="19050">
+                <a:solidFill>
+                  <a:schemeClr val="accent6">
+                    <a:lumMod val="75000"/>
+                  </a:schemeClr>
+                </a:solidFill>
+                <a:prstDash val="sysDot"/>
+                <a:headEnd type="none" w="med" len="med"/>
+                <a:tailEnd type="none" w="med" len="med"/>
+              </a:ln>
+              <a:effectLst/>
+            </p:spPr>
+            <p:style>
+              <a:lnRef idx="1">
+                <a:schemeClr val="accent2"/>
+              </a:lnRef>
+              <a:fillRef idx="2">
+                <a:schemeClr val="accent2"/>
+              </a:fillRef>
+              <a:effectRef idx="1">
+                <a:schemeClr val="accent2"/>
+              </a:effectRef>
+              <a:fontRef idx="minor">
+                <a:schemeClr val="dk1"/>
+              </a:fontRef>
+            </p:style>
+          </p:cxnSp>
+          <p:sp>
+            <p:nvSpPr>
+              <p:cNvPr id="61" name="Isosceles Triangle 102"/>
+              <p:cNvSpPr/>
+              <p:nvPr/>
+            </p:nvSpPr>
+            <p:spPr>
+              <a:xfrm rot="5400000" flipV="1">
+                <a:off x="5649662" y="2590982"/>
+                <a:ext cx="270504" cy="175523"/>
+              </a:xfrm>
+              <a:prstGeom prst="triangle">
+                <a:avLst/>
+              </a:prstGeom>
+              <a:solidFill>
+                <a:schemeClr val="accent6">
+                  <a:lumMod val="75000"/>
+                </a:schemeClr>
+              </a:solidFill>
+              <a:ln w="19050">
+                <a:solidFill>
+                  <a:schemeClr val="accent6">
+                    <a:lumMod val="75000"/>
+                  </a:schemeClr>
+                </a:solidFill>
+              </a:ln>
+              <a:effectLst/>
+            </p:spPr>
+            <p:style>
+              <a:lnRef idx="1">
+                <a:schemeClr val="accent2"/>
+              </a:lnRef>
+              <a:fillRef idx="2">
+                <a:schemeClr val="accent2"/>
+              </a:fillRef>
+              <a:effectRef idx="1">
+                <a:schemeClr val="accent2"/>
+              </a:effectRef>
+              <a:fontRef idx="minor">
+                <a:schemeClr val="dk1"/>
+              </a:fontRef>
+            </p:style>
+            <p:txBody>
+              <a:bodyPr rtlCol="0" anchor="ctr"/>
+              <a:lstStyle/>
+              <a:p>
+                <a:pPr algn="ctr"/>
+                <a:endParaRPr lang="en-SG" sz="1050">
+                  <a:solidFill>
+                    <a:schemeClr val="bg1"/>
+                  </a:solidFill>
+                </a:endParaRPr>
+              </a:p>
+            </p:txBody>
+          </p:sp>
+          <p:sp>
+            <p:nvSpPr>
+              <p:cNvPr id="65" name="Rectangle 8"/>
+              <p:cNvSpPr/>
+              <p:nvPr/>
+            </p:nvSpPr>
+            <p:spPr>
+              <a:xfrm>
+                <a:off x="6096000" y="2505363"/>
+                <a:ext cx="1093635" cy="346760"/>
+              </a:xfrm>
+              <a:prstGeom prst="rect">
+                <a:avLst/>
+              </a:prstGeom>
+              <a:solidFill>
+                <a:schemeClr val="accent6">
+                  <a:lumMod val="75000"/>
+                </a:schemeClr>
+              </a:solidFill>
+              <a:ln w="19050">
+                <a:solidFill>
+                  <a:schemeClr val="accent6">
+                    <a:lumMod val="75000"/>
+                  </a:schemeClr>
+                </a:solidFill>
+              </a:ln>
+              <a:effectLst/>
+            </p:spPr>
+            <p:style>
+              <a:lnRef idx="1">
+                <a:schemeClr val="accent2"/>
+              </a:lnRef>
+              <a:fillRef idx="2">
+                <a:schemeClr val="accent2"/>
+              </a:fillRef>
+              <a:effectRef idx="1">
+                <a:schemeClr val="accent2"/>
+              </a:effectRef>
+              <a:fontRef idx="minor">
+                <a:schemeClr val="dk1"/>
+              </a:fontRef>
+            </p:style>
+            <p:txBody>
+              <a:bodyPr rtlCol="0" anchor="ctr"/>
+              <a:lstStyle/>
+              <a:p>
+                <a:pPr algn="ctr"/>
+                <a:r>
+                  <a:rPr lang="en-US" sz="1050" dirty="0" err="1">
+                    <a:solidFill>
+                      <a:schemeClr val="bg1"/>
+                    </a:solidFill>
+                  </a:rPr>
+                  <a:t>JsonUserPrefs</a:t>
+                </a:r>
+                <a:br>
+                  <a:rPr lang="en-US" sz="1050" dirty="0">
+                    <a:solidFill>
+                      <a:schemeClr val="bg1"/>
+                    </a:solidFill>
+                  </a:rPr>
+                </a:br>
+                <a:r>
+                  <a:rPr lang="en-US" sz="1050" dirty="0">
+                    <a:solidFill>
+                      <a:schemeClr val="bg1"/>
+                    </a:solidFill>
+                  </a:rPr>
+                  <a:t>Storage</a:t>
+                </a:r>
+                <a:endParaRPr lang="en-SG" sz="1050" dirty="0">
+                  <a:solidFill>
+                    <a:schemeClr val="bg1"/>
+                  </a:solidFill>
+                </a:endParaRPr>
+              </a:p>
+            </p:txBody>
+          </p:sp>
+          <p:sp>
+            <p:nvSpPr>
+              <p:cNvPr id="66" name="Rectangle 8"/>
+              <p:cNvSpPr/>
+              <p:nvPr/>
+            </p:nvSpPr>
+            <p:spPr>
+              <a:xfrm>
+                <a:off x="4895293" y="3778328"/>
+                <a:ext cx="1200707" cy="346760"/>
+              </a:xfrm>
+              <a:prstGeom prst="rect">
+                <a:avLst/>
+              </a:prstGeom>
+              <a:ln w="19050"/>
+              <a:effectLst/>
+            </p:spPr>
+            <p:style>
+              <a:lnRef idx="1">
+                <a:schemeClr val="accent6"/>
+              </a:lnRef>
+              <a:fillRef idx="2">
+                <a:schemeClr val="accent6"/>
+              </a:fillRef>
+              <a:effectRef idx="1">
+                <a:schemeClr val="accent6"/>
+              </a:effectRef>
+              <a:fontRef idx="minor">
+                <a:schemeClr val="dk1"/>
+              </a:fontRef>
+            </p:style>
+            <p:txBody>
+              <a:bodyPr rtlCol="0" anchor="ctr"/>
+              <a:lstStyle/>
+              <a:p>
+                <a:pPr algn="ctr"/>
+                <a:r>
+                  <a:rPr lang="en-US" sz="1050" b="1" dirty="0" err="1">
+                    <a:solidFill>
+                      <a:schemeClr val="accent6">
+                        <a:lumMod val="75000"/>
+                      </a:schemeClr>
+                    </a:solidFill>
+                  </a:rPr>
+                  <a:t>JsonSerializable</a:t>
+                </a:r>
+                <a:br>
+                  <a:rPr lang="en-US" sz="1050" b="1" dirty="0">
+                    <a:solidFill>
+                      <a:schemeClr val="accent6">
+                        <a:lumMod val="75000"/>
+                      </a:schemeClr>
+                    </a:solidFill>
+                  </a:rPr>
+                </a:br>
+                <a:r>
+                  <a:rPr lang="en-US" sz="1050" b="1" dirty="0">
+                    <a:solidFill>
+                      <a:schemeClr val="accent6">
+                        <a:lumMod val="75000"/>
+                      </a:schemeClr>
+                    </a:solidFill>
+                  </a:rPr>
+                  <a:t>Application</a:t>
+                </a:r>
+                <a:endParaRPr lang="en-SG" sz="1050" b="1" dirty="0">
+                  <a:solidFill>
+                    <a:schemeClr val="accent6">
+                      <a:lumMod val="75000"/>
+                    </a:schemeClr>
+                  </a:solidFill>
+                </a:endParaRPr>
+              </a:p>
+            </p:txBody>
+          </p:sp>
+          <p:sp>
+            <p:nvSpPr>
+              <p:cNvPr id="73" name="Rectangle 8"/>
+              <p:cNvSpPr/>
+              <p:nvPr/>
+            </p:nvSpPr>
+            <p:spPr>
+              <a:xfrm>
+                <a:off x="6981119" y="5533714"/>
+                <a:ext cx="1405507" cy="346760"/>
+              </a:xfrm>
+              <a:prstGeom prst="rect">
+                <a:avLst/>
+              </a:prstGeom>
+              <a:ln w="19050"/>
+              <a:effectLst/>
+            </p:spPr>
+            <p:style>
+              <a:lnRef idx="1">
+                <a:schemeClr val="accent6"/>
+              </a:lnRef>
+              <a:fillRef idx="2">
+                <a:schemeClr val="accent6"/>
+              </a:fillRef>
+              <a:effectRef idx="1">
+                <a:schemeClr val="accent6"/>
+              </a:effectRef>
+              <a:fontRef idx="minor">
+                <a:schemeClr val="dk1"/>
+              </a:fontRef>
+            </p:style>
+            <p:txBody>
+              <a:bodyPr rtlCol="0" anchor="ctr"/>
+              <a:lstStyle/>
+              <a:p>
+                <a:pPr algn="ctr"/>
+                <a:r>
+                  <a:rPr lang="en-US" sz="1050" b="1" dirty="0" err="1">
+                    <a:solidFill>
+                      <a:schemeClr val="accent6">
+                        <a:lumMod val="75000"/>
+                      </a:schemeClr>
+                    </a:solidFill>
+                  </a:rPr>
+                  <a:t>JsonAdaptedTag</a:t>
+                </a:r>
+                <a:endParaRPr lang="en-SG" sz="1050" b="1" dirty="0">
+                  <a:solidFill>
+                    <a:schemeClr val="accent6">
+                      <a:lumMod val="75000"/>
+                    </a:schemeClr>
+                  </a:solidFill>
+                </a:endParaRPr>
+              </a:p>
+            </p:txBody>
+          </p:sp>
+          <p:cxnSp>
+            <p:nvCxnSpPr>
+              <p:cNvPr id="37" name="Elbow Connector 122">
+                <a:extLst>
+                  <a:ext uri="{FF2B5EF4-FFF2-40B4-BE49-F238E27FC236}">
+                    <a16:creationId xmlns:a16="http://schemas.microsoft.com/office/drawing/2014/main" id="{6C6BD4DE-078B-4478-A2A0-BF45F863C92D}"/>
+                  </a:ext>
+                </a:extLst>
+              </p:cNvPr>
+              <p:cNvCxnSpPr>
+                <a:cxnSpLocks/>
+                <a:stCxn id="66" idx="2"/>
+                <a:endCxn id="38" idx="0"/>
+              </p:cNvCxnSpPr>
+              <p:nvPr/>
+            </p:nvCxnSpPr>
+            <p:spPr>
+              <a:xfrm rot="5400000">
+                <a:off x="5347549" y="4273186"/>
+                <a:ext cx="296197" cy="1"/>
+              </a:xfrm>
+              <a:prstGeom prst="bentConnector3">
+                <a:avLst>
+                  <a:gd name="adj1" fmla="val 50000"/>
+                </a:avLst>
+              </a:prstGeom>
+              <a:ln w="19050">
+                <a:solidFill>
+                  <a:schemeClr val="accent6">
+                    <a:lumMod val="75000"/>
+                  </a:schemeClr>
+                </a:solidFill>
+                <a:prstDash val="sysDot"/>
+                <a:headEnd type="none" w="med" len="med"/>
+                <a:tailEnd type="arrow" w="med" len="med"/>
+              </a:ln>
+              <a:effectLst/>
+            </p:spPr>
+            <p:style>
+              <a:lnRef idx="1">
+                <a:schemeClr val="accent2"/>
+              </a:lnRef>
+              <a:fillRef idx="2">
+                <a:schemeClr val="accent2"/>
+              </a:fillRef>
+              <a:effectRef idx="1">
+                <a:schemeClr val="accent2"/>
+              </a:effectRef>
+              <a:fontRef idx="minor">
+                <a:schemeClr val="dk1"/>
+              </a:fontRef>
+            </p:style>
+          </p:cxnSp>
+          <p:sp>
+            <p:nvSpPr>
+              <p:cNvPr id="38" name="Rectangle 8">
+                <a:extLst>
+                  <a:ext uri="{FF2B5EF4-FFF2-40B4-BE49-F238E27FC236}">
+                    <a16:creationId xmlns:a16="http://schemas.microsoft.com/office/drawing/2014/main" id="{AF712354-A047-4445-9A49-E11CB796F952}"/>
+                  </a:ext>
+                </a:extLst>
+              </p:cNvPr>
+              <p:cNvSpPr/>
+              <p:nvPr/>
+            </p:nvSpPr>
+            <p:spPr>
+              <a:xfrm>
+                <a:off x="4684718" y="4421285"/>
+                <a:ext cx="1621856" cy="346760"/>
+              </a:xfrm>
+              <a:prstGeom prst="rect">
+                <a:avLst/>
+              </a:prstGeom>
+              <a:ln w="19050"/>
+              <a:effectLst/>
+            </p:spPr>
+            <p:style>
+              <a:lnRef idx="1">
+                <a:schemeClr val="accent6"/>
+              </a:lnRef>
+              <a:fillRef idx="2">
+                <a:schemeClr val="accent6"/>
+              </a:fillRef>
+              <a:effectRef idx="1">
+                <a:schemeClr val="accent6"/>
+              </a:effectRef>
+              <a:fontRef idx="minor">
+                <a:schemeClr val="dk1"/>
+              </a:fontRef>
+            </p:style>
+            <p:txBody>
+              <a:bodyPr rtlCol="0" anchor="ctr"/>
+              <a:lstStyle/>
+              <a:p>
+                <a:pPr algn="ctr"/>
+                <a:r>
+                  <a:rPr lang="en-US" sz="1050" b="1" dirty="0" err="1">
+                    <a:solidFill>
+                      <a:schemeClr val="accent6">
+                        <a:lumMod val="75000"/>
+                      </a:schemeClr>
+                    </a:solidFill>
+                  </a:rPr>
+                  <a:t>JsonSerializable</a:t>
+                </a:r>
+                <a:br>
+                  <a:rPr lang="en-US" sz="1050" b="1" dirty="0">
+                    <a:solidFill>
+                      <a:schemeClr val="accent6">
+                        <a:lumMod val="75000"/>
+                      </a:schemeClr>
+                    </a:solidFill>
+                  </a:rPr>
+                </a:br>
+                <a:r>
+                  <a:rPr lang="en-US" sz="1050" b="1" dirty="0" err="1">
+                    <a:solidFill>
+                      <a:schemeClr val="accent6">
+                        <a:lumMod val="75000"/>
+                      </a:schemeClr>
+                    </a:solidFill>
+                  </a:rPr>
+                  <a:t>RequirementCategoryList</a:t>
+                </a:r>
+                <a:endParaRPr lang="en-SG" sz="1050" b="1" dirty="0">
+                  <a:solidFill>
+                    <a:schemeClr val="accent6">
+                      <a:lumMod val="75000"/>
+                    </a:schemeClr>
+                  </a:solidFill>
+                </a:endParaRPr>
+              </a:p>
+            </p:txBody>
+          </p:sp>
+          <p:sp>
+            <p:nvSpPr>
+              <p:cNvPr id="39" name="Rectangle 8">
+                <a:extLst>
+                  <a:ext uri="{FF2B5EF4-FFF2-40B4-BE49-F238E27FC236}">
+                    <a16:creationId xmlns:a16="http://schemas.microsoft.com/office/drawing/2014/main" id="{24867C62-854D-4D85-B324-1E7EA74C8742}"/>
+                  </a:ext>
+                </a:extLst>
+              </p:cNvPr>
+              <p:cNvSpPr/>
+              <p:nvPr/>
+            </p:nvSpPr>
+            <p:spPr>
+              <a:xfrm>
+                <a:off x="6939319" y="4375869"/>
+                <a:ext cx="1450068" cy="346760"/>
+              </a:xfrm>
+              <a:prstGeom prst="rect">
+                <a:avLst/>
+              </a:prstGeom>
+              <a:ln w="19050"/>
+              <a:effectLst/>
+            </p:spPr>
+            <p:style>
+              <a:lnRef idx="1">
+                <a:schemeClr val="accent6"/>
+              </a:lnRef>
+              <a:fillRef idx="2">
+                <a:schemeClr val="accent6"/>
+              </a:fillRef>
+              <a:effectRef idx="1">
+                <a:schemeClr val="accent6"/>
+              </a:effectRef>
+              <a:fontRef idx="minor">
+                <a:schemeClr val="dk1"/>
+              </a:fontRef>
+            </p:style>
+            <p:txBody>
+              <a:bodyPr rtlCol="0" anchor="ctr"/>
+              <a:lstStyle/>
+              <a:p>
+                <a:pPr algn="ctr"/>
+                <a:r>
+                  <a:rPr lang="en-US" sz="1050" b="1" dirty="0" err="1">
+                    <a:solidFill>
+                      <a:schemeClr val="accent6">
+                        <a:lumMod val="75000"/>
+                      </a:schemeClr>
+                    </a:solidFill>
+                  </a:rPr>
+                  <a:t>JsonSerializable</a:t>
+                </a:r>
+                <a:br>
+                  <a:rPr lang="en-US" sz="1050" b="1" dirty="0">
+                    <a:solidFill>
+                      <a:schemeClr val="accent6">
+                        <a:lumMod val="75000"/>
+                      </a:schemeClr>
+                    </a:solidFill>
+                  </a:rPr>
+                </a:br>
+                <a:r>
+                  <a:rPr lang="en-US" sz="1050" b="1" dirty="0" err="1">
+                    <a:solidFill>
+                      <a:schemeClr val="accent6">
+                        <a:lumMod val="75000"/>
+                      </a:schemeClr>
+                    </a:solidFill>
+                  </a:rPr>
+                  <a:t>ModuleList</a:t>
+                </a:r>
+                <a:endParaRPr lang="en-SG" sz="1050" b="1" dirty="0">
+                  <a:solidFill>
+                    <a:schemeClr val="accent6">
+                      <a:lumMod val="75000"/>
+                    </a:schemeClr>
+                  </a:solidFill>
+                </a:endParaRPr>
+              </a:p>
+            </p:txBody>
+          </p:sp>
+          <p:sp>
+            <p:nvSpPr>
+              <p:cNvPr id="40" name="Rectangle 8">
+                <a:extLst>
+                  <a:ext uri="{FF2B5EF4-FFF2-40B4-BE49-F238E27FC236}">
+                    <a16:creationId xmlns:a16="http://schemas.microsoft.com/office/drawing/2014/main" id="{62F39C93-A0F1-43E2-8031-64CE109DC333}"/>
+                  </a:ext>
+                </a:extLst>
+              </p:cNvPr>
+              <p:cNvSpPr/>
+              <p:nvPr/>
+            </p:nvSpPr>
+            <p:spPr>
+              <a:xfrm>
+                <a:off x="2821741" y="4350002"/>
+                <a:ext cx="1200707" cy="346760"/>
+              </a:xfrm>
+              <a:prstGeom prst="rect">
+                <a:avLst/>
+              </a:prstGeom>
+              <a:ln w="19050"/>
+              <a:effectLst/>
+            </p:spPr>
+            <p:style>
+              <a:lnRef idx="1">
+                <a:schemeClr val="accent6"/>
+              </a:lnRef>
+              <a:fillRef idx="2">
+                <a:schemeClr val="accent6"/>
+              </a:fillRef>
+              <a:effectRef idx="1">
+                <a:schemeClr val="accent6"/>
+              </a:effectRef>
+              <a:fontRef idx="minor">
+                <a:schemeClr val="dk1"/>
+              </a:fontRef>
+            </p:style>
+            <p:txBody>
+              <a:bodyPr rtlCol="0" anchor="ctr"/>
+              <a:lstStyle/>
+              <a:p>
+                <a:pPr algn="ctr"/>
+                <a:r>
+                  <a:rPr lang="en-US" sz="1050" b="1" dirty="0" err="1">
+                    <a:solidFill>
+                      <a:schemeClr val="accent6">
+                        <a:lumMod val="75000"/>
+                      </a:schemeClr>
+                    </a:solidFill>
+                  </a:rPr>
+                  <a:t>JsonSerializable</a:t>
+                </a:r>
+                <a:br>
+                  <a:rPr lang="en-US" sz="1050" b="1" dirty="0">
+                    <a:solidFill>
+                      <a:schemeClr val="accent6">
+                        <a:lumMod val="75000"/>
+                      </a:schemeClr>
+                    </a:solidFill>
+                  </a:rPr>
+                </a:br>
+                <a:r>
+                  <a:rPr lang="en-US" sz="1050" b="1" dirty="0" err="1">
+                    <a:solidFill>
+                      <a:schemeClr val="accent6">
+                        <a:lumMod val="75000"/>
+                      </a:schemeClr>
+                    </a:solidFill>
+                  </a:rPr>
+                  <a:t>DegreePlannerList</a:t>
+                </a:r>
+                <a:endParaRPr lang="en-SG" sz="1050" b="1" dirty="0">
+                  <a:solidFill>
+                    <a:schemeClr val="accent6">
+                      <a:lumMod val="75000"/>
+                    </a:schemeClr>
+                  </a:solidFill>
+                </a:endParaRPr>
+              </a:p>
+            </p:txBody>
+          </p:sp>
+          <p:cxnSp>
+            <p:nvCxnSpPr>
+              <p:cNvPr id="43" name="Elbow Connector 122">
+                <a:extLst>
+                  <a:ext uri="{FF2B5EF4-FFF2-40B4-BE49-F238E27FC236}">
+                    <a16:creationId xmlns:a16="http://schemas.microsoft.com/office/drawing/2014/main" id="{8594D4BB-BD8F-4379-871A-5BC61B299381}"/>
+                  </a:ext>
+                </a:extLst>
+              </p:cNvPr>
+              <p:cNvCxnSpPr>
+                <a:cxnSpLocks/>
+                <a:stCxn id="66" idx="2"/>
+                <a:endCxn id="40" idx="0"/>
+              </p:cNvCxnSpPr>
+              <p:nvPr/>
+            </p:nvCxnSpPr>
+            <p:spPr>
+              <a:xfrm rot="5400000">
+                <a:off x="4346414" y="3200769"/>
+                <a:ext cx="224914" cy="2073552"/>
+              </a:xfrm>
+              <a:prstGeom prst="bentConnector3">
+                <a:avLst>
+                  <a:gd name="adj1" fmla="val 50000"/>
+                </a:avLst>
+              </a:prstGeom>
+              <a:ln w="19050">
+                <a:solidFill>
+                  <a:schemeClr val="accent6">
+                    <a:lumMod val="75000"/>
+                  </a:schemeClr>
+                </a:solidFill>
+                <a:prstDash val="sysDot"/>
+                <a:headEnd type="none" w="med" len="med"/>
+                <a:tailEnd type="arrow" w="med" len="med"/>
+              </a:ln>
+              <a:effectLst/>
+            </p:spPr>
+            <p:style>
+              <a:lnRef idx="1">
+                <a:schemeClr val="accent2"/>
+              </a:lnRef>
+              <a:fillRef idx="2">
+                <a:schemeClr val="accent2"/>
+              </a:fillRef>
+              <a:effectRef idx="1">
+                <a:schemeClr val="accent2"/>
+              </a:effectRef>
+              <a:fontRef idx="minor">
+                <a:schemeClr val="dk1"/>
+              </a:fontRef>
+            </p:style>
+          </p:cxnSp>
+          <p:cxnSp>
+            <p:nvCxnSpPr>
+              <p:cNvPr id="46" name="Elbow Connector 122">
+                <a:extLst>
+                  <a:ext uri="{FF2B5EF4-FFF2-40B4-BE49-F238E27FC236}">
+                    <a16:creationId xmlns:a16="http://schemas.microsoft.com/office/drawing/2014/main" id="{DA8DB951-9AC5-4F09-91E1-577DD8AD2FF4}"/>
+                  </a:ext>
+                </a:extLst>
+              </p:cNvPr>
+              <p:cNvCxnSpPr>
+                <a:cxnSpLocks/>
+                <a:stCxn id="66" idx="2"/>
+                <a:endCxn id="39" idx="0"/>
+              </p:cNvCxnSpPr>
+              <p:nvPr/>
+            </p:nvCxnSpPr>
+            <p:spPr>
+              <a:xfrm rot="16200000" flipH="1">
+                <a:off x="6454610" y="3166125"/>
+                <a:ext cx="250781" cy="2168706"/>
+              </a:xfrm>
+              <a:prstGeom prst="bentConnector3">
+                <a:avLst>
+                  <a:gd name="adj1" fmla="val 50000"/>
+                </a:avLst>
+              </a:prstGeom>
+              <a:ln w="19050">
+                <a:solidFill>
+                  <a:schemeClr val="accent6">
+                    <a:lumMod val="75000"/>
+                  </a:schemeClr>
+                </a:solidFill>
+                <a:prstDash val="sysDot"/>
+                <a:headEnd type="none" w="med" len="med"/>
+                <a:tailEnd type="arrow" w="med" len="med"/>
+              </a:ln>
+              <a:effectLst/>
+            </p:spPr>
+            <p:style>
+              <a:lnRef idx="1">
+                <a:schemeClr val="accent2"/>
+              </a:lnRef>
+              <a:fillRef idx="2">
+                <a:schemeClr val="accent2"/>
+              </a:fillRef>
+              <a:effectRef idx="1">
+                <a:schemeClr val="accent2"/>
+              </a:effectRef>
+              <a:fontRef idx="minor">
+                <a:schemeClr val="dk1"/>
+              </a:fontRef>
+            </p:style>
+          </p:cxnSp>
+          <p:sp>
+            <p:nvSpPr>
+              <p:cNvPr id="49" name="Rectangle 8">
+                <a:extLst>
+                  <a:ext uri="{FF2B5EF4-FFF2-40B4-BE49-F238E27FC236}">
+                    <a16:creationId xmlns:a16="http://schemas.microsoft.com/office/drawing/2014/main" id="{1EE6BF26-A055-4F50-918D-14F1091D7BC7}"/>
+                  </a:ext>
+                </a:extLst>
+              </p:cNvPr>
+              <p:cNvSpPr/>
+              <p:nvPr/>
+            </p:nvSpPr>
+            <p:spPr>
+              <a:xfrm>
+                <a:off x="2835494" y="4944678"/>
+                <a:ext cx="1200707" cy="346760"/>
+              </a:xfrm>
+              <a:prstGeom prst="rect">
+                <a:avLst/>
+              </a:prstGeom>
+              <a:ln w="19050"/>
+              <a:effectLst/>
+            </p:spPr>
+            <p:style>
+              <a:lnRef idx="1">
+                <a:schemeClr val="accent6"/>
+              </a:lnRef>
+              <a:fillRef idx="2">
+                <a:schemeClr val="accent6"/>
+              </a:fillRef>
+              <a:effectRef idx="1">
+                <a:schemeClr val="accent6"/>
+              </a:effectRef>
+              <a:fontRef idx="minor">
+                <a:schemeClr val="dk1"/>
+              </a:fontRef>
+            </p:style>
+            <p:txBody>
+              <a:bodyPr rtlCol="0" anchor="ctr"/>
+              <a:lstStyle/>
+              <a:p>
+                <a:pPr algn="ctr"/>
+                <a:r>
+                  <a:rPr lang="en-US" sz="1050" b="1" dirty="0" err="1">
+                    <a:solidFill>
+                      <a:schemeClr val="accent6">
+                        <a:lumMod val="75000"/>
+                      </a:schemeClr>
+                    </a:solidFill>
+                  </a:rPr>
+                  <a:t>JsonAdapted</a:t>
+                </a:r>
+                <a:br>
+                  <a:rPr lang="en-US" sz="1050" b="1" dirty="0">
+                    <a:solidFill>
+                      <a:schemeClr val="accent6">
+                        <a:lumMod val="75000"/>
+                      </a:schemeClr>
+                    </a:solidFill>
+                  </a:rPr>
+                </a:br>
+                <a:r>
+                  <a:rPr lang="en-US" sz="1050" b="1" dirty="0" err="1">
+                    <a:solidFill>
+                      <a:schemeClr val="accent6">
+                        <a:lumMod val="75000"/>
+                      </a:schemeClr>
+                    </a:solidFill>
+                  </a:rPr>
+                  <a:t>DegreePlanner</a:t>
+                </a:r>
+                <a:endParaRPr lang="en-SG" sz="1050" b="1" dirty="0">
+                  <a:solidFill>
+                    <a:schemeClr val="accent6">
+                      <a:lumMod val="75000"/>
+                    </a:schemeClr>
+                  </a:solidFill>
+                </a:endParaRPr>
+              </a:p>
+            </p:txBody>
+          </p:sp>
+          <p:sp>
+            <p:nvSpPr>
+              <p:cNvPr id="51" name="Rectangle 8">
+                <a:extLst>
+                  <a:ext uri="{FF2B5EF4-FFF2-40B4-BE49-F238E27FC236}">
+                    <a16:creationId xmlns:a16="http://schemas.microsoft.com/office/drawing/2014/main" id="{E29B6698-1D0F-4750-BD03-ACC5B240E399}"/>
+                  </a:ext>
+                </a:extLst>
+              </p:cNvPr>
+              <p:cNvSpPr/>
+              <p:nvPr/>
+            </p:nvSpPr>
+            <p:spPr>
+              <a:xfrm>
+                <a:off x="4898054" y="4938883"/>
+                <a:ext cx="1200707" cy="346760"/>
+              </a:xfrm>
+              <a:prstGeom prst="rect">
+                <a:avLst/>
+              </a:prstGeom>
+              <a:ln w="19050"/>
+              <a:effectLst/>
+            </p:spPr>
+            <p:style>
+              <a:lnRef idx="1">
+                <a:schemeClr val="accent6"/>
+              </a:lnRef>
+              <a:fillRef idx="2">
+                <a:schemeClr val="accent6"/>
+              </a:fillRef>
+              <a:effectRef idx="1">
+                <a:schemeClr val="accent6"/>
+              </a:effectRef>
+              <a:fontRef idx="minor">
+                <a:schemeClr val="dk1"/>
+              </a:fontRef>
+            </p:style>
+            <p:txBody>
+              <a:bodyPr rtlCol="0" anchor="ctr"/>
+              <a:lstStyle/>
+              <a:p>
+                <a:pPr algn="ctr"/>
+                <a:r>
+                  <a:rPr lang="en-US" sz="1050" b="1" dirty="0" err="1">
+                    <a:solidFill>
+                      <a:schemeClr val="accent6">
+                        <a:lumMod val="75000"/>
+                      </a:schemeClr>
+                    </a:solidFill>
+                  </a:rPr>
+                  <a:t>JsonAdapted</a:t>
+                </a:r>
+                <a:br>
+                  <a:rPr lang="en-US" sz="1050" b="1" dirty="0">
+                    <a:solidFill>
+                      <a:schemeClr val="accent6">
+                        <a:lumMod val="75000"/>
+                      </a:schemeClr>
+                    </a:solidFill>
+                  </a:rPr>
+                </a:br>
+                <a:r>
+                  <a:rPr lang="en-US" sz="1050" b="1" dirty="0" err="1">
+                    <a:solidFill>
+                      <a:schemeClr val="accent6">
+                        <a:lumMod val="75000"/>
+                      </a:schemeClr>
+                    </a:solidFill>
+                  </a:rPr>
+                  <a:t>RequirementList</a:t>
+                </a:r>
+                <a:endParaRPr lang="en-SG" sz="1050" b="1" dirty="0">
+                  <a:solidFill>
+                    <a:schemeClr val="accent6">
+                      <a:lumMod val="75000"/>
+                    </a:schemeClr>
+                  </a:solidFill>
+                </a:endParaRPr>
+              </a:p>
+            </p:txBody>
+          </p:sp>
+          <p:sp>
+            <p:nvSpPr>
+              <p:cNvPr id="55" name="Rectangle 8">
+                <a:extLst>
+                  <a:ext uri="{FF2B5EF4-FFF2-40B4-BE49-F238E27FC236}">
+                    <a16:creationId xmlns:a16="http://schemas.microsoft.com/office/drawing/2014/main" id="{46D0CB68-F420-458B-BED9-15DB056FEBC7}"/>
+                  </a:ext>
+                </a:extLst>
+              </p:cNvPr>
+              <p:cNvSpPr/>
+              <p:nvPr/>
+            </p:nvSpPr>
+            <p:spPr>
+              <a:xfrm>
+                <a:off x="6957853" y="4934905"/>
+                <a:ext cx="1420771" cy="346760"/>
+              </a:xfrm>
+              <a:prstGeom prst="rect">
+                <a:avLst/>
+              </a:prstGeom>
+              <a:ln w="19050"/>
+              <a:effectLst/>
+            </p:spPr>
+            <p:style>
+              <a:lnRef idx="1">
+                <a:schemeClr val="accent6"/>
+              </a:lnRef>
+              <a:fillRef idx="2">
+                <a:schemeClr val="accent6"/>
+              </a:fillRef>
+              <a:effectRef idx="1">
+                <a:schemeClr val="accent6"/>
+              </a:effectRef>
+              <a:fontRef idx="minor">
+                <a:schemeClr val="dk1"/>
+              </a:fontRef>
+            </p:style>
+            <p:txBody>
+              <a:bodyPr rtlCol="0" anchor="ctr"/>
+              <a:lstStyle/>
+              <a:p>
+                <a:pPr algn="ctr"/>
+                <a:r>
+                  <a:rPr lang="en-US" sz="1030" b="1" dirty="0" err="1">
+                    <a:solidFill>
+                      <a:schemeClr val="accent6">
+                        <a:lumMod val="75000"/>
+                      </a:schemeClr>
+                    </a:solidFill>
+                  </a:rPr>
+                  <a:t>JsonAdaptedModule</a:t>
+                </a:r>
+                <a:endParaRPr lang="en-SG" sz="1030" b="1" dirty="0">
+                  <a:solidFill>
+                    <a:schemeClr val="accent6">
+                      <a:lumMod val="75000"/>
+                    </a:schemeClr>
+                  </a:solidFill>
+                </a:endParaRPr>
+              </a:p>
+            </p:txBody>
+          </p:sp>
+          <p:cxnSp>
+            <p:nvCxnSpPr>
+              <p:cNvPr id="57" name="Elbow Connector 122">
+                <a:extLst>
+                  <a:ext uri="{FF2B5EF4-FFF2-40B4-BE49-F238E27FC236}">
+                    <a16:creationId xmlns:a16="http://schemas.microsoft.com/office/drawing/2014/main" id="{819F60E2-ADB0-4159-92FC-FC45338654CE}"/>
+                  </a:ext>
+                </a:extLst>
+              </p:cNvPr>
+              <p:cNvCxnSpPr>
+                <a:cxnSpLocks/>
+                <a:stCxn id="39" idx="2"/>
+                <a:endCxn id="55" idx="0"/>
+              </p:cNvCxnSpPr>
+              <p:nvPr/>
+            </p:nvCxnSpPr>
+            <p:spPr>
+              <a:xfrm rot="16200000" flipH="1">
+                <a:off x="7560158" y="4826824"/>
+                <a:ext cx="212276" cy="3886"/>
+              </a:xfrm>
+              <a:prstGeom prst="bentConnector3">
+                <a:avLst>
+                  <a:gd name="adj1" fmla="val 50000"/>
+                </a:avLst>
+              </a:prstGeom>
+              <a:ln w="19050">
+                <a:solidFill>
+                  <a:schemeClr val="accent6">
+                    <a:lumMod val="75000"/>
+                  </a:schemeClr>
+                </a:solidFill>
+                <a:prstDash val="sysDot"/>
+                <a:headEnd type="none" w="med" len="med"/>
+                <a:tailEnd type="arrow" w="med" len="med"/>
+              </a:ln>
+              <a:effectLst/>
+            </p:spPr>
+            <p:style>
+              <a:lnRef idx="1">
+                <a:schemeClr val="accent2"/>
+              </a:lnRef>
+              <a:fillRef idx="2">
+                <a:schemeClr val="accent2"/>
+              </a:fillRef>
+              <a:effectRef idx="1">
+                <a:schemeClr val="accent2"/>
+              </a:effectRef>
+              <a:fontRef idx="minor">
+                <a:schemeClr val="dk1"/>
+              </a:fontRef>
+            </p:style>
+          </p:cxnSp>
+          <p:cxnSp>
+            <p:nvCxnSpPr>
+              <p:cNvPr id="59" name="Elbow Connector 122">
+                <a:extLst>
+                  <a:ext uri="{FF2B5EF4-FFF2-40B4-BE49-F238E27FC236}">
+                    <a16:creationId xmlns:a16="http://schemas.microsoft.com/office/drawing/2014/main" id="{497685BC-3EB0-488D-8BF4-255CC76E950F}"/>
+                  </a:ext>
+                </a:extLst>
+              </p:cNvPr>
+              <p:cNvCxnSpPr>
+                <a:cxnSpLocks/>
+                <a:stCxn id="38" idx="2"/>
+                <a:endCxn id="51" idx="0"/>
+              </p:cNvCxnSpPr>
+              <p:nvPr/>
+            </p:nvCxnSpPr>
+            <p:spPr>
+              <a:xfrm rot="16200000" flipH="1">
+                <a:off x="5411608" y="4852083"/>
+                <a:ext cx="170838" cy="2762"/>
+              </a:xfrm>
+              <a:prstGeom prst="bentConnector3">
+                <a:avLst>
+                  <a:gd name="adj1" fmla="val 50000"/>
+                </a:avLst>
+              </a:prstGeom>
+              <a:ln w="19050">
+                <a:solidFill>
+                  <a:schemeClr val="accent6">
+                    <a:lumMod val="75000"/>
+                  </a:schemeClr>
+                </a:solidFill>
+                <a:prstDash val="sysDot"/>
+                <a:headEnd type="none" w="med" len="med"/>
+                <a:tailEnd type="arrow" w="med" len="med"/>
+              </a:ln>
+              <a:effectLst/>
+            </p:spPr>
+            <p:style>
+              <a:lnRef idx="1">
+                <a:schemeClr val="accent2"/>
+              </a:lnRef>
+              <a:fillRef idx="2">
+                <a:schemeClr val="accent2"/>
+              </a:fillRef>
+              <a:effectRef idx="1">
+                <a:schemeClr val="accent2"/>
+              </a:effectRef>
+              <a:fontRef idx="minor">
+                <a:schemeClr val="dk1"/>
+              </a:fontRef>
+            </p:style>
+          </p:cxnSp>
+          <p:cxnSp>
+            <p:nvCxnSpPr>
+              <p:cNvPr id="62" name="Elbow Connector 122">
+                <a:extLst>
+                  <a:ext uri="{FF2B5EF4-FFF2-40B4-BE49-F238E27FC236}">
+                    <a16:creationId xmlns:a16="http://schemas.microsoft.com/office/drawing/2014/main" id="{05E1C576-4CF8-4F2D-9E18-E6F7C31A0421}"/>
+                  </a:ext>
+                </a:extLst>
+              </p:cNvPr>
+              <p:cNvCxnSpPr>
+                <a:cxnSpLocks/>
+                <a:stCxn id="40" idx="2"/>
+                <a:endCxn id="49" idx="0"/>
+              </p:cNvCxnSpPr>
+              <p:nvPr/>
+            </p:nvCxnSpPr>
+            <p:spPr>
+              <a:xfrm rot="16200000" flipH="1">
+                <a:off x="3305013" y="4813843"/>
+                <a:ext cx="247916" cy="13753"/>
+              </a:xfrm>
+              <a:prstGeom prst="bentConnector3">
+                <a:avLst>
+                  <a:gd name="adj1" fmla="val 50000"/>
+                </a:avLst>
+              </a:prstGeom>
+              <a:ln w="19050">
+                <a:solidFill>
+                  <a:schemeClr val="accent6">
+                    <a:lumMod val="75000"/>
+                  </a:schemeClr>
+                </a:solidFill>
+                <a:prstDash val="sysDot"/>
+                <a:headEnd type="none" w="med" len="med"/>
+                <a:tailEnd type="arrow" w="med" len="med"/>
+              </a:ln>
+              <a:effectLst/>
+            </p:spPr>
+            <p:style>
+              <a:lnRef idx="1">
+                <a:schemeClr val="accent2"/>
+              </a:lnRef>
+              <a:fillRef idx="2">
+                <a:schemeClr val="accent2"/>
+              </a:fillRef>
+              <a:effectRef idx="1">
+                <a:schemeClr val="accent2"/>
+              </a:effectRef>
+              <a:fontRef idx="minor">
+                <a:schemeClr val="dk1"/>
+              </a:fontRef>
+            </p:style>
+          </p:cxnSp>
+          <p:sp>
+            <p:nvSpPr>
+              <p:cNvPr id="84" name="Rectangle 8">
+                <a:extLst>
+                  <a:ext uri="{FF2B5EF4-FFF2-40B4-BE49-F238E27FC236}">
+                    <a16:creationId xmlns:a16="http://schemas.microsoft.com/office/drawing/2014/main" id="{E37B3C1D-5BD0-47F7-89C9-1E681F13184E}"/>
+                  </a:ext>
+                </a:extLst>
+              </p:cNvPr>
+              <p:cNvSpPr/>
+              <p:nvPr/>
+            </p:nvSpPr>
+            <p:spPr>
+              <a:xfrm>
+                <a:off x="4898054" y="6694645"/>
+                <a:ext cx="1246555" cy="346760"/>
+              </a:xfrm>
+              <a:prstGeom prst="rect">
+                <a:avLst/>
+              </a:prstGeom>
+              <a:ln w="19050"/>
+              <a:effectLst/>
+            </p:spPr>
+            <p:style>
+              <a:lnRef idx="1">
+                <a:schemeClr val="accent6"/>
+              </a:lnRef>
+              <a:fillRef idx="2">
+                <a:schemeClr val="accent6"/>
+              </a:fillRef>
+              <a:effectRef idx="1">
+                <a:schemeClr val="accent6"/>
+              </a:effectRef>
+              <a:fontRef idx="minor">
+                <a:schemeClr val="dk1"/>
+              </a:fontRef>
+            </p:style>
+            <p:txBody>
+              <a:bodyPr rtlCol="0" anchor="ctr"/>
+              <a:lstStyle/>
+              <a:p>
+                <a:pPr algn="ctr"/>
+                <a:r>
+                  <a:rPr lang="en-US" sz="1050" b="1" dirty="0" err="1">
+                    <a:solidFill>
+                      <a:schemeClr val="accent6">
+                        <a:lumMod val="75000"/>
+                      </a:schemeClr>
+                    </a:solidFill>
+                  </a:rPr>
+                  <a:t>JsonAdaptedCode</a:t>
+                </a:r>
+                <a:endParaRPr lang="en-SG" sz="1050" b="1" dirty="0">
+                  <a:solidFill>
+                    <a:schemeClr val="accent6">
+                      <a:lumMod val="75000"/>
+                    </a:schemeClr>
+                  </a:solidFill>
+                </a:endParaRPr>
+              </a:p>
+            </p:txBody>
+          </p:sp>
+          <p:cxnSp>
+            <p:nvCxnSpPr>
+              <p:cNvPr id="85" name="Elbow Connector 122">
+                <a:extLst>
+                  <a:ext uri="{FF2B5EF4-FFF2-40B4-BE49-F238E27FC236}">
+                    <a16:creationId xmlns:a16="http://schemas.microsoft.com/office/drawing/2014/main" id="{9991B445-9091-456C-83A5-57D816B77127}"/>
+                  </a:ext>
+                </a:extLst>
+              </p:cNvPr>
+              <p:cNvCxnSpPr>
+                <a:cxnSpLocks/>
+                <a:stCxn id="51" idx="1"/>
+                <a:endCxn id="84" idx="1"/>
+              </p:cNvCxnSpPr>
+              <p:nvPr/>
+            </p:nvCxnSpPr>
+            <p:spPr>
+              <a:xfrm rot="10800000" flipV="1">
+                <a:off x="4898054" y="5112263"/>
+                <a:ext cx="12700" cy="1755762"/>
+              </a:xfrm>
+              <a:prstGeom prst="bentConnector3">
+                <a:avLst>
+                  <a:gd name="adj1" fmla="val 1800000"/>
+                </a:avLst>
+              </a:prstGeom>
+              <a:ln w="19050">
+                <a:solidFill>
+                  <a:schemeClr val="accent6">
+                    <a:lumMod val="75000"/>
+                  </a:schemeClr>
+                </a:solidFill>
+                <a:prstDash val="sysDot"/>
+                <a:headEnd type="none" w="med" len="med"/>
+                <a:tailEnd type="arrow" w="med" len="med"/>
+              </a:ln>
+              <a:effectLst/>
+            </p:spPr>
+            <p:style>
+              <a:lnRef idx="1">
+                <a:schemeClr val="accent2"/>
+              </a:lnRef>
+              <a:fillRef idx="2">
+                <a:schemeClr val="accent2"/>
+              </a:fillRef>
+              <a:effectRef idx="1">
+                <a:schemeClr val="accent2"/>
+              </a:effectRef>
+              <a:fontRef idx="minor">
+                <a:schemeClr val="dk1"/>
+              </a:fontRef>
+            </p:style>
+          </p:cxnSp>
+          <p:cxnSp>
+            <p:nvCxnSpPr>
+              <p:cNvPr id="88" name="Elbow Connector 122">
+                <a:extLst>
+                  <a:ext uri="{FF2B5EF4-FFF2-40B4-BE49-F238E27FC236}">
+                    <a16:creationId xmlns:a16="http://schemas.microsoft.com/office/drawing/2014/main" id="{C6373681-9F7C-40C9-A415-CF7E05083F3F}"/>
+                  </a:ext>
+                </a:extLst>
+              </p:cNvPr>
+              <p:cNvCxnSpPr>
+                <a:cxnSpLocks/>
+                <a:stCxn id="49" idx="3"/>
+                <a:endCxn id="84" idx="1"/>
+              </p:cNvCxnSpPr>
+              <p:nvPr/>
+            </p:nvCxnSpPr>
+            <p:spPr>
+              <a:xfrm>
+                <a:off x="4036201" y="5118058"/>
+                <a:ext cx="861853" cy="1749967"/>
+              </a:xfrm>
+              <a:prstGeom prst="bentConnector3">
+                <a:avLst>
+                  <a:gd name="adj1" fmla="val 50000"/>
+                </a:avLst>
+              </a:prstGeom>
+              <a:ln w="19050">
+                <a:solidFill>
+                  <a:schemeClr val="accent6">
+                    <a:lumMod val="75000"/>
+                  </a:schemeClr>
+                </a:solidFill>
+                <a:prstDash val="sysDot"/>
+                <a:headEnd type="none" w="med" len="med"/>
+                <a:tailEnd type="arrow" w="med" len="med"/>
+              </a:ln>
+              <a:effectLst/>
+            </p:spPr>
+            <p:style>
+              <a:lnRef idx="1">
+                <a:schemeClr val="accent2"/>
+              </a:lnRef>
+              <a:fillRef idx="2">
+                <a:schemeClr val="accent2"/>
+              </a:fillRef>
+              <a:effectRef idx="1">
+                <a:schemeClr val="accent2"/>
+              </a:effectRef>
+              <a:fontRef idx="minor">
+                <a:schemeClr val="dk1"/>
+              </a:fontRef>
+            </p:style>
+          </p:cxnSp>
+          <p:cxnSp>
+            <p:nvCxnSpPr>
+              <p:cNvPr id="91" name="Elbow Connector 122">
+                <a:extLst>
+                  <a:ext uri="{FF2B5EF4-FFF2-40B4-BE49-F238E27FC236}">
+                    <a16:creationId xmlns:a16="http://schemas.microsoft.com/office/drawing/2014/main" id="{7C266A05-812F-49C9-B251-38C1B1C0751D}"/>
+                  </a:ext>
+                </a:extLst>
+              </p:cNvPr>
+              <p:cNvCxnSpPr>
+                <a:cxnSpLocks/>
+                <a:stCxn id="55" idx="1"/>
+                <a:endCxn id="84" idx="3"/>
+              </p:cNvCxnSpPr>
+              <p:nvPr/>
+            </p:nvCxnSpPr>
+            <p:spPr>
+              <a:xfrm rot="10800000" flipV="1">
+                <a:off x="6144609" y="5108285"/>
+                <a:ext cx="813244" cy="1759740"/>
+              </a:xfrm>
+              <a:prstGeom prst="bentConnector3">
+                <a:avLst>
+                  <a:gd name="adj1" fmla="val 50000"/>
+                </a:avLst>
+              </a:prstGeom>
+              <a:ln w="19050">
+                <a:solidFill>
+                  <a:schemeClr val="accent6">
+                    <a:lumMod val="75000"/>
+                  </a:schemeClr>
+                </a:solidFill>
+                <a:prstDash val="sysDot"/>
+                <a:headEnd type="none" w="med" len="med"/>
+                <a:tailEnd type="arrow" w="med" len="med"/>
+              </a:ln>
+              <a:effectLst/>
+            </p:spPr>
+            <p:style>
+              <a:lnRef idx="1">
+                <a:schemeClr val="accent2"/>
+              </a:lnRef>
+              <a:fillRef idx="2">
+                <a:schemeClr val="accent2"/>
+              </a:fillRef>
+              <a:effectRef idx="1">
+                <a:schemeClr val="accent2"/>
+              </a:effectRef>
+              <a:fontRef idx="minor">
+                <a:schemeClr val="dk1"/>
+              </a:fontRef>
+            </p:style>
+          </p:cxnSp>
+          <p:cxnSp>
+            <p:nvCxnSpPr>
+              <p:cNvPr id="94" name="Elbow Connector 122">
+                <a:extLst>
+                  <a:ext uri="{FF2B5EF4-FFF2-40B4-BE49-F238E27FC236}">
+                    <a16:creationId xmlns:a16="http://schemas.microsoft.com/office/drawing/2014/main" id="{E9CF500D-0F3F-419C-A880-F8CAC840BE7F}"/>
+                  </a:ext>
+                </a:extLst>
+              </p:cNvPr>
+              <p:cNvCxnSpPr>
+                <a:cxnSpLocks/>
+                <a:stCxn id="55" idx="2"/>
+                <a:endCxn id="73" idx="0"/>
+              </p:cNvCxnSpPr>
+              <p:nvPr/>
+            </p:nvCxnSpPr>
+            <p:spPr>
+              <a:xfrm rot="16200000" flipH="1">
+                <a:off x="7550032" y="5399872"/>
+                <a:ext cx="252049" cy="15634"/>
+              </a:xfrm>
+              <a:prstGeom prst="bentConnector3">
+                <a:avLst>
+                  <a:gd name="adj1" fmla="val 50000"/>
+                </a:avLst>
+              </a:prstGeom>
+              <a:ln w="19050">
+                <a:solidFill>
+                  <a:schemeClr val="accent6">
+                    <a:lumMod val="75000"/>
+                  </a:schemeClr>
+                </a:solidFill>
+                <a:prstDash val="sysDot"/>
+                <a:headEnd type="none" w="med" len="med"/>
+                <a:tailEnd type="arrow" w="med" len="med"/>
+              </a:ln>
+              <a:effectLst/>
+            </p:spPr>
+            <p:style>
+              <a:lnRef idx="1">
+                <a:schemeClr val="accent2"/>
+              </a:lnRef>
+              <a:fillRef idx="2">
+                <a:schemeClr val="accent2"/>
+              </a:fillRef>
+              <a:effectRef idx="1">
+                <a:schemeClr val="accent2"/>
+              </a:effectRef>
+              <a:fontRef idx="minor">
+                <a:schemeClr val="dk1"/>
+              </a:fontRef>
+            </p:style>
+          </p:cxnSp>
+        </p:grpSp>
         <p:sp>
           <p:nvSpPr>
-            <p:cNvPr id="118" name="Rectangle 65"/>
+            <p:cNvPr id="41" name="Rectangle 8">
+              <a:extLst>
+                <a:ext uri="{FF2B5EF4-FFF2-40B4-BE49-F238E27FC236}">
+                  <a16:creationId xmlns:a16="http://schemas.microsoft.com/office/drawing/2014/main" id="{70AAFDC6-35BE-4EEC-831E-AFFC629488F4}"/>
+                </a:ext>
+              </a:extLst>
+            </p:cNvPr>
             <p:cNvSpPr/>
             <p:nvPr/>
           </p:nvSpPr>
           <p:spPr>
             <a:xfrm>
-              <a:off x="2643867" y="2086382"/>
-              <a:ext cx="4899934" cy="3930558"/>
-            </a:xfrm>
-            <a:prstGeom prst="roundRect">
-              <a:avLst>
-                <a:gd name="adj" fmla="val 3484"/>
-              </a:avLst>
-            </a:prstGeom>
-            <a:solidFill>
-              <a:schemeClr val="accent6">
-                <a:lumMod val="20000"/>
-                <a:lumOff val="80000"/>
-              </a:schemeClr>
-            </a:solidFill>
-            <a:ln w="19050">
-              <a:noFill/>
-            </a:ln>
-            <a:effectLst/>
-          </p:spPr>
-          <p:style>
-            <a:lnRef idx="1">
-              <a:schemeClr val="accent2"/>
-            </a:lnRef>
-            <a:fillRef idx="2">
-              <a:schemeClr val="accent2"/>
-            </a:fillRef>
-            <a:effectRef idx="1">
-              <a:schemeClr val="accent2"/>
-            </a:effectRef>
-            <a:fontRef idx="minor">
-              <a:schemeClr val="dk1"/>
-            </a:fontRef>
-          </p:style>
-          <p:txBody>
-            <a:bodyPr rtlCol="0" anchor="t"/>
-            <a:lstStyle/>
-            <a:p>
-              <a:r>
-                <a:rPr lang="en-US" sz="1200" b="1" dirty="0">
-                  <a:solidFill>
-                    <a:schemeClr val="accent6">
-                      <a:lumMod val="75000"/>
-                    </a:schemeClr>
-                  </a:solidFill>
-                </a:rPr>
-                <a:t>Storage</a:t>
-              </a:r>
-              <a:endParaRPr lang="en-SG" sz="1200" b="1" dirty="0">
-                <a:solidFill>
-                  <a:schemeClr val="accent6">
-                    <a:lumMod val="75000"/>
-                  </a:schemeClr>
-                </a:solidFill>
-              </a:endParaRPr>
-            </a:p>
-          </p:txBody>
-        </p:sp>
-        <p:sp>
-          <p:nvSpPr>
-            <p:cNvPr id="2" name="Rectangle 8"/>
-            <p:cNvSpPr/>
-            <p:nvPr/>
-          </p:nvSpPr>
-          <p:spPr>
-            <a:xfrm>
-              <a:off x="4355052" y="3105763"/>
-              <a:ext cx="1323049" cy="346760"/>
-            </a:xfrm>
-            <a:prstGeom prst="rect">
-              <a:avLst/>
-            </a:prstGeom>
-            <a:solidFill>
-              <a:schemeClr val="accent6">
-                <a:lumMod val="75000"/>
-              </a:schemeClr>
-            </a:solidFill>
-            <a:ln w="19050">
-              <a:solidFill>
-                <a:schemeClr val="accent6">
-                  <a:lumMod val="75000"/>
-                </a:schemeClr>
-              </a:solidFill>
-            </a:ln>
-            <a:effectLst/>
-          </p:spPr>
-          <p:style>
-            <a:lnRef idx="1">
-              <a:schemeClr val="accent2"/>
-            </a:lnRef>
-            <a:fillRef idx="2">
-              <a:schemeClr val="accent2"/>
-            </a:fillRef>
-            <a:effectRef idx="1">
-              <a:schemeClr val="accent2"/>
-            </a:effectRef>
-            <a:fontRef idx="minor">
-              <a:schemeClr val="dk1"/>
-            </a:fontRef>
-          </p:style>
-          <p:txBody>
-            <a:bodyPr rtlCol="0" anchor="ctr"/>
-            <a:lstStyle/>
-            <a:p>
-              <a:pPr algn="ctr"/>
-              <a:r>
-                <a:rPr lang="en-US" sz="1050" dirty="0">
-                  <a:solidFill>
-                    <a:schemeClr val="bg1"/>
-                  </a:solidFill>
-                </a:rPr>
-                <a:t>&lt;&lt;interface&gt;&gt;</a:t>
-              </a:r>
-              <a:br>
-                <a:rPr lang="en-US" sz="1050" dirty="0">
-                  <a:solidFill>
-                    <a:schemeClr val="bg1"/>
-                  </a:solidFill>
-                </a:rPr>
-              </a:br>
-              <a:r>
-                <a:rPr lang="en-US" sz="1050" dirty="0" err="1">
-                  <a:solidFill>
-                    <a:schemeClr val="bg1"/>
-                  </a:solidFill>
-                </a:rPr>
-                <a:t>AddressBookStorage</a:t>
-              </a:r>
-              <a:endParaRPr lang="en-SG" sz="1050" dirty="0">
-                <a:solidFill>
-                  <a:schemeClr val="bg1"/>
-                </a:solidFill>
-              </a:endParaRPr>
-            </a:p>
-          </p:txBody>
-        </p:sp>
-        <p:sp>
-          <p:nvSpPr>
-            <p:cNvPr id="9" name="Rectangle 62"/>
-            <p:cNvSpPr/>
-            <p:nvPr/>
-          </p:nvSpPr>
-          <p:spPr>
-            <a:xfrm rot="16200000">
-              <a:off x="3161835" y="2816010"/>
-              <a:ext cx="1093635" cy="346760"/>
-            </a:xfrm>
-            <a:prstGeom prst="rect">
-              <a:avLst/>
-            </a:prstGeom>
-            <a:solidFill>
-              <a:schemeClr val="accent6">
-                <a:lumMod val="75000"/>
-              </a:schemeClr>
-            </a:solidFill>
-            <a:ln w="19050">
-              <a:solidFill>
-                <a:schemeClr val="accent6">
-                  <a:lumMod val="75000"/>
-                </a:schemeClr>
-              </a:solidFill>
-            </a:ln>
-            <a:effectLst/>
-          </p:spPr>
-          <p:style>
-            <a:lnRef idx="1">
-              <a:schemeClr val="accent2"/>
-            </a:lnRef>
-            <a:fillRef idx="2">
-              <a:schemeClr val="accent2"/>
-            </a:fillRef>
-            <a:effectRef idx="1">
-              <a:schemeClr val="accent2"/>
-            </a:effectRef>
-            <a:fontRef idx="minor">
-              <a:schemeClr val="dk1"/>
-            </a:fontRef>
-          </p:style>
-          <p:txBody>
-            <a:bodyPr rtlCol="0" anchor="ctr"/>
-            <a:lstStyle/>
-            <a:p>
-              <a:pPr algn="ctr"/>
-              <a:r>
-                <a:rPr lang="en-US" sz="1050" dirty="0" err="1">
-                  <a:solidFill>
-                    <a:schemeClr val="bg1"/>
-                  </a:solidFill>
-                </a:rPr>
-                <a:t>StorageManager</a:t>
-              </a:r>
-              <a:endParaRPr lang="en-SG" sz="1050" dirty="0">
-                <a:solidFill>
-                  <a:schemeClr val="bg1"/>
-                </a:solidFill>
-              </a:endParaRPr>
-            </a:p>
-          </p:txBody>
-        </p:sp>
-        <p:sp>
-          <p:nvSpPr>
-            <p:cNvPr id="119" name="Rectangle 62"/>
-            <p:cNvSpPr/>
-            <p:nvPr/>
-          </p:nvSpPr>
-          <p:spPr>
-            <a:xfrm rot="16200000">
-              <a:off x="2434074" y="2808525"/>
-              <a:ext cx="1093635" cy="346760"/>
-            </a:xfrm>
-            <a:prstGeom prst="rect">
-              <a:avLst/>
-            </a:prstGeom>
-            <a:solidFill>
-              <a:schemeClr val="accent6">
-                <a:lumMod val="75000"/>
-              </a:schemeClr>
-            </a:solidFill>
-            <a:ln w="19050">
-              <a:solidFill>
-                <a:schemeClr val="accent6">
-                  <a:lumMod val="75000"/>
-                </a:schemeClr>
-              </a:solidFill>
-            </a:ln>
-            <a:effectLst/>
-          </p:spPr>
-          <p:style>
-            <a:lnRef idx="1">
-              <a:schemeClr val="accent2"/>
-            </a:lnRef>
-            <a:fillRef idx="2">
-              <a:schemeClr val="accent2"/>
-            </a:fillRef>
-            <a:effectRef idx="1">
-              <a:schemeClr val="accent2"/>
-            </a:effectRef>
-            <a:fontRef idx="minor">
-              <a:schemeClr val="dk1"/>
-            </a:fontRef>
-          </p:style>
-          <p:txBody>
-            <a:bodyPr rtlCol="0" anchor="ctr"/>
-            <a:lstStyle/>
-            <a:p>
-              <a:pPr algn="ctr"/>
-              <a:r>
-                <a:rPr lang="en-US" sz="1050" dirty="0">
-                  <a:solidFill>
-                    <a:schemeClr val="bg1"/>
-                  </a:solidFill>
-                </a:rPr>
-                <a:t>&lt;&lt;interface&gt;&gt;</a:t>
-              </a:r>
-            </a:p>
-            <a:p>
-              <a:pPr algn="ctr"/>
-              <a:r>
-                <a:rPr lang="en-US" sz="1050" dirty="0">
-                  <a:solidFill>
-                    <a:schemeClr val="bg1"/>
-                  </a:solidFill>
-                </a:rPr>
-                <a:t>Storage</a:t>
-              </a:r>
-              <a:endParaRPr lang="en-SG" sz="1050" dirty="0">
-                <a:solidFill>
-                  <a:schemeClr val="bg1"/>
-                </a:solidFill>
-              </a:endParaRPr>
-            </a:p>
-          </p:txBody>
-        </p:sp>
-        <p:sp>
-          <p:nvSpPr>
-            <p:cNvPr id="120" name="Isosceles Triangle 102"/>
-            <p:cNvSpPr/>
-            <p:nvPr/>
-          </p:nvSpPr>
-          <p:spPr>
-            <a:xfrm rot="16200000">
-              <a:off x="3104782" y="2899614"/>
-              <a:ext cx="270504" cy="175523"/>
-            </a:xfrm>
-            <a:prstGeom prst="triangle">
-              <a:avLst/>
-            </a:prstGeom>
-            <a:solidFill>
-              <a:schemeClr val="accent6">
-                <a:lumMod val="75000"/>
-              </a:schemeClr>
-            </a:solidFill>
-            <a:ln w="19050">
-              <a:solidFill>
-                <a:schemeClr val="accent6">
-                  <a:lumMod val="75000"/>
-                </a:schemeClr>
-              </a:solidFill>
-            </a:ln>
-            <a:effectLst/>
-          </p:spPr>
-          <p:style>
-            <a:lnRef idx="1">
-              <a:schemeClr val="accent2"/>
-            </a:lnRef>
-            <a:fillRef idx="2">
-              <a:schemeClr val="accent2"/>
-            </a:fillRef>
-            <a:effectRef idx="1">
-              <a:schemeClr val="accent2"/>
-            </a:effectRef>
-            <a:fontRef idx="minor">
-              <a:schemeClr val="dk1"/>
-            </a:fontRef>
-          </p:style>
-          <p:txBody>
-            <a:bodyPr rtlCol="0" anchor="ctr"/>
-            <a:lstStyle/>
-            <a:p>
-              <a:pPr algn="ctr"/>
-              <a:endParaRPr lang="en-SG" sz="1050">
-                <a:solidFill>
-                  <a:schemeClr val="bg1"/>
-                </a:solidFill>
-              </a:endParaRPr>
-            </a:p>
-          </p:txBody>
-        </p:sp>
-        <p:cxnSp>
-          <p:nvCxnSpPr>
-            <p:cNvPr id="58" name="Straight Arrow Connector 57"/>
-            <p:cNvCxnSpPr>
-              <a:stCxn id="42" idx="3"/>
-              <a:endCxn id="2" idx="1"/>
-            </p:cNvCxnSpPr>
-            <p:nvPr/>
-          </p:nvCxnSpPr>
-          <p:spPr>
-            <a:xfrm>
-              <a:off x="4134242" y="3273859"/>
-              <a:ext cx="220810" cy="5284"/>
-            </a:xfrm>
-            <a:prstGeom prst="straightConnector1">
-              <a:avLst/>
-            </a:prstGeom>
-            <a:ln w="19050">
-              <a:solidFill>
-                <a:schemeClr val="accent6">
-                  <a:lumMod val="75000"/>
-                </a:schemeClr>
-              </a:solidFill>
-              <a:headEnd type="none" w="med" len="med"/>
-              <a:tailEnd type="arrow" w="med" len="med"/>
-            </a:ln>
-            <a:effectLst/>
-          </p:spPr>
-          <p:style>
-            <a:lnRef idx="1">
-              <a:schemeClr val="accent2"/>
-            </a:lnRef>
-            <a:fillRef idx="2">
-              <a:schemeClr val="accent2"/>
-            </a:fillRef>
-            <a:effectRef idx="1">
-              <a:schemeClr val="accent2"/>
-            </a:effectRef>
-            <a:fontRef idx="minor">
-              <a:schemeClr val="dk1"/>
-            </a:fontRef>
-          </p:style>
-        </p:cxnSp>
-        <p:cxnSp>
-          <p:nvCxnSpPr>
-            <p:cNvPr id="75" name="Elbow Connector 122"/>
-            <p:cNvCxnSpPr/>
-            <p:nvPr/>
-          </p:nvCxnSpPr>
-          <p:spPr>
-            <a:xfrm>
-              <a:off x="2387963" y="2987376"/>
-              <a:ext cx="419548" cy="2860"/>
-            </a:xfrm>
-            <a:prstGeom prst="bentConnector3">
-              <a:avLst>
-                <a:gd name="adj1" fmla="val 50000"/>
-              </a:avLst>
-            </a:prstGeom>
-            <a:ln w="19050">
-              <a:solidFill>
-                <a:schemeClr val="bg1">
-                  <a:lumMod val="75000"/>
-                </a:schemeClr>
-              </a:solidFill>
-              <a:prstDash val="sysDot"/>
-              <a:headEnd type="none" w="med" len="med"/>
-              <a:tailEnd type="arrow" w="med" len="med"/>
-            </a:ln>
-            <a:effectLst/>
-          </p:spPr>
-          <p:style>
-            <a:lnRef idx="1">
-              <a:schemeClr val="accent2"/>
-            </a:lnRef>
-            <a:fillRef idx="2">
-              <a:schemeClr val="accent2"/>
-            </a:fillRef>
-            <a:effectRef idx="1">
-              <a:schemeClr val="accent2"/>
-            </a:effectRef>
-            <a:fontRef idx="minor">
-              <a:schemeClr val="dk1"/>
-            </a:fontRef>
-          </p:style>
-        </p:cxnSp>
-        <p:cxnSp>
-          <p:nvCxnSpPr>
-            <p:cNvPr id="21" name="Straight Connector 20"/>
-            <p:cNvCxnSpPr>
-              <a:stCxn id="120" idx="3"/>
-            </p:cNvCxnSpPr>
-            <p:nvPr/>
-          </p:nvCxnSpPr>
-          <p:spPr>
-            <a:xfrm flipV="1">
-              <a:off x="3327796" y="2987375"/>
-              <a:ext cx="216105" cy="1"/>
-            </a:xfrm>
-            <a:prstGeom prst="line">
-              <a:avLst/>
-            </a:prstGeom>
-            <a:ln w="19050">
-              <a:solidFill>
-                <a:schemeClr val="accent6">
-                  <a:lumMod val="75000"/>
-                </a:schemeClr>
-              </a:solidFill>
-              <a:prstDash val="sysDot"/>
-              <a:headEnd type="none" w="med" len="med"/>
-              <a:tailEnd type="none" w="med" len="med"/>
-            </a:ln>
-            <a:effectLst/>
-          </p:spPr>
-          <p:style>
-            <a:lnRef idx="1">
-              <a:schemeClr val="accent2"/>
-            </a:lnRef>
-            <a:fillRef idx="2">
-              <a:schemeClr val="accent2"/>
-            </a:fillRef>
-            <a:effectRef idx="1">
-              <a:schemeClr val="accent2"/>
-            </a:effectRef>
-            <a:fontRef idx="minor">
-              <a:schemeClr val="dk1"/>
-            </a:fontRef>
-          </p:style>
-        </p:cxnSp>
-        <p:sp>
-          <p:nvSpPr>
-            <p:cNvPr id="42" name="Flowchart: Decision 96"/>
-            <p:cNvSpPr/>
-            <p:nvPr/>
-          </p:nvSpPr>
-          <p:spPr>
-            <a:xfrm>
-              <a:off x="3898194" y="3187169"/>
-              <a:ext cx="236048" cy="173380"/>
-            </a:xfrm>
-            <a:prstGeom prst="flowChartDecision">
-              <a:avLst/>
-            </a:prstGeom>
-            <a:noFill/>
-            <a:ln w="19050">
-              <a:solidFill>
-                <a:schemeClr val="accent6">
-                  <a:lumMod val="75000"/>
-                </a:schemeClr>
-              </a:solidFill>
-            </a:ln>
-            <a:effectLst/>
-          </p:spPr>
-          <p:style>
-            <a:lnRef idx="1">
-              <a:schemeClr val="accent2"/>
-            </a:lnRef>
-            <a:fillRef idx="2">
-              <a:schemeClr val="accent2"/>
-            </a:fillRef>
-            <a:effectRef idx="1">
-              <a:schemeClr val="accent2"/>
-            </a:effectRef>
-            <a:fontRef idx="minor">
-              <a:schemeClr val="dk1"/>
-            </a:fontRef>
-          </p:style>
-          <p:txBody>
-            <a:bodyPr rtlCol="0" anchor="ctr"/>
-            <a:lstStyle/>
-            <a:p>
-              <a:pPr algn="ctr"/>
-              <a:endParaRPr lang="en-US" sz="1050">
-                <a:solidFill>
-                  <a:schemeClr val="bg1"/>
-                </a:solidFill>
-              </a:endParaRPr>
-            </a:p>
-          </p:txBody>
-        </p:sp>
-        <p:cxnSp>
-          <p:nvCxnSpPr>
-            <p:cNvPr id="97" name="Elbow Connector 63"/>
-            <p:cNvCxnSpPr>
-              <a:stCxn id="99" idx="3"/>
-              <a:endCxn id="50" idx="1"/>
-            </p:cNvCxnSpPr>
-            <p:nvPr/>
-          </p:nvCxnSpPr>
-          <p:spPr>
-            <a:xfrm flipV="1">
-              <a:off x="5875913" y="3279143"/>
-              <a:ext cx="223324" cy="1"/>
-            </a:xfrm>
-            <a:prstGeom prst="bentConnector3">
-              <a:avLst>
-                <a:gd name="adj1" fmla="val 50000"/>
-              </a:avLst>
-            </a:prstGeom>
-            <a:ln w="19050">
-              <a:solidFill>
-                <a:schemeClr val="accent6">
-                  <a:lumMod val="75000"/>
-                </a:schemeClr>
-              </a:solidFill>
-              <a:prstDash val="sysDot"/>
-              <a:headEnd type="none" w="med" len="med"/>
-              <a:tailEnd type="none" w="med" len="med"/>
-            </a:ln>
-            <a:effectLst/>
-          </p:spPr>
-          <p:style>
-            <a:lnRef idx="1">
-              <a:schemeClr val="accent2"/>
-            </a:lnRef>
-            <a:fillRef idx="2">
-              <a:schemeClr val="accent2"/>
-            </a:fillRef>
-            <a:effectRef idx="1">
-              <a:schemeClr val="accent2"/>
-            </a:effectRef>
-            <a:fontRef idx="minor">
-              <a:schemeClr val="dk1"/>
-            </a:fontRef>
-          </p:style>
-        </p:cxnSp>
-        <p:sp>
-          <p:nvSpPr>
-            <p:cNvPr id="99" name="Isosceles Triangle 102"/>
-            <p:cNvSpPr/>
-            <p:nvPr/>
-          </p:nvSpPr>
-          <p:spPr>
-            <a:xfrm rot="5400000" flipV="1">
-              <a:off x="5652899" y="3191382"/>
-              <a:ext cx="270504" cy="175523"/>
-            </a:xfrm>
-            <a:prstGeom prst="triangle">
-              <a:avLst/>
-            </a:prstGeom>
-            <a:solidFill>
-              <a:schemeClr val="accent6">
-                <a:lumMod val="75000"/>
-              </a:schemeClr>
-            </a:solidFill>
-            <a:ln w="19050">
-              <a:solidFill>
-                <a:schemeClr val="accent6">
-                  <a:lumMod val="75000"/>
-                </a:schemeClr>
-              </a:solidFill>
-            </a:ln>
-            <a:effectLst/>
-          </p:spPr>
-          <p:style>
-            <a:lnRef idx="1">
-              <a:schemeClr val="accent2"/>
-            </a:lnRef>
-            <a:fillRef idx="2">
-              <a:schemeClr val="accent2"/>
-            </a:fillRef>
-            <a:effectRef idx="1">
-              <a:schemeClr val="accent2"/>
-            </a:effectRef>
-            <a:fontRef idx="minor">
-              <a:schemeClr val="dk1"/>
-            </a:fontRef>
-          </p:style>
-          <p:txBody>
-            <a:bodyPr rtlCol="0" anchor="ctr"/>
-            <a:lstStyle/>
-            <a:p>
-              <a:pPr algn="ctr"/>
-              <a:endParaRPr lang="en-SG" sz="1050">
-                <a:solidFill>
-                  <a:schemeClr val="bg1"/>
-                </a:solidFill>
-              </a:endParaRPr>
-            </a:p>
-          </p:txBody>
-        </p:sp>
-        <p:cxnSp>
-          <p:nvCxnSpPr>
-            <p:cNvPr id="124" name="Elbow Connector 122"/>
-            <p:cNvCxnSpPr>
-              <a:cxnSpLocks/>
-              <a:stCxn id="50" idx="2"/>
-              <a:endCxn id="66" idx="0"/>
-            </p:cNvCxnSpPr>
-            <p:nvPr/>
-          </p:nvCxnSpPr>
-          <p:spPr>
-            <a:xfrm rot="5400000">
-              <a:off x="5750187" y="2776297"/>
-              <a:ext cx="257743" cy="1610195"/>
-            </a:xfrm>
-            <a:prstGeom prst="bentConnector3">
-              <a:avLst>
-                <a:gd name="adj1" fmla="val 50000"/>
-              </a:avLst>
-            </a:prstGeom>
-            <a:ln w="19050">
-              <a:solidFill>
-                <a:schemeClr val="accent6">
-                  <a:lumMod val="75000"/>
-                </a:schemeClr>
-              </a:solidFill>
-              <a:prstDash val="sysDot"/>
-              <a:headEnd type="none" w="med" len="med"/>
-              <a:tailEnd type="arrow" w="med" len="med"/>
-            </a:ln>
-            <a:effectLst/>
-          </p:spPr>
-          <p:style>
-            <a:lnRef idx="1">
-              <a:schemeClr val="accent2"/>
-            </a:lnRef>
-            <a:fillRef idx="2">
-              <a:schemeClr val="accent2"/>
-            </a:fillRef>
-            <a:effectRef idx="1">
-              <a:schemeClr val="accent2"/>
-            </a:effectRef>
-            <a:fontRef idx="minor">
-              <a:schemeClr val="dk1"/>
-            </a:fontRef>
-          </p:style>
-        </p:cxnSp>
-        <p:sp>
-          <p:nvSpPr>
-            <p:cNvPr id="50" name="Rectangle 8"/>
-            <p:cNvSpPr/>
-            <p:nvPr/>
-          </p:nvSpPr>
-          <p:spPr>
-            <a:xfrm>
-              <a:off x="6099237" y="3105763"/>
-              <a:ext cx="1169835" cy="346760"/>
-            </a:xfrm>
-            <a:prstGeom prst="rect">
-              <a:avLst/>
-            </a:prstGeom>
-            <a:ln w="19050"/>
-            <a:effectLst/>
-          </p:spPr>
-          <p:style>
-            <a:lnRef idx="1">
-              <a:schemeClr val="accent6"/>
-            </a:lnRef>
-            <a:fillRef idx="2">
-              <a:schemeClr val="accent6"/>
-            </a:fillRef>
-            <a:effectRef idx="1">
-              <a:schemeClr val="accent6"/>
-            </a:effectRef>
-            <a:fontRef idx="minor">
-              <a:schemeClr val="dk1"/>
-            </a:fontRef>
-          </p:style>
-          <p:txBody>
-            <a:bodyPr rtlCol="0" anchor="ctr"/>
-            <a:lstStyle/>
-            <a:p>
-              <a:pPr algn="ctr"/>
-              <a:r>
-                <a:rPr lang="en-US" sz="1050" b="1" dirty="0" err="1">
-                  <a:solidFill>
-                    <a:schemeClr val="accent6">
-                      <a:lumMod val="75000"/>
-                    </a:schemeClr>
-                  </a:solidFill>
-                </a:rPr>
-                <a:t>JsonAddressBook</a:t>
-              </a:r>
-              <a:br>
-                <a:rPr lang="en-US" sz="1050" b="1" dirty="0">
-                  <a:solidFill>
-                    <a:schemeClr val="accent6">
-                      <a:lumMod val="75000"/>
-                    </a:schemeClr>
-                  </a:solidFill>
-                </a:rPr>
-              </a:br>
-              <a:r>
-                <a:rPr lang="en-US" sz="1050" b="1" dirty="0">
-                  <a:solidFill>
-                    <a:schemeClr val="accent6">
-                      <a:lumMod val="75000"/>
-                    </a:schemeClr>
-                  </a:solidFill>
-                </a:rPr>
-                <a:t>Storage</a:t>
-              </a:r>
-              <a:endParaRPr lang="en-SG" sz="1050" b="1" dirty="0">
-                <a:solidFill>
-                  <a:schemeClr val="accent6">
-                    <a:lumMod val="75000"/>
-                  </a:schemeClr>
-                </a:solidFill>
-              </a:endParaRPr>
-            </a:p>
-          </p:txBody>
-        </p:sp>
-        <p:sp>
-          <p:nvSpPr>
-            <p:cNvPr id="52" name="Rectangle 8"/>
-            <p:cNvSpPr/>
-            <p:nvPr/>
-          </p:nvSpPr>
-          <p:spPr>
-            <a:xfrm>
-              <a:off x="4351815" y="2505363"/>
-              <a:ext cx="1323049" cy="346760"/>
-            </a:xfrm>
-            <a:prstGeom prst="rect">
-              <a:avLst/>
-            </a:prstGeom>
-            <a:solidFill>
-              <a:schemeClr val="accent6">
-                <a:lumMod val="75000"/>
-              </a:schemeClr>
-            </a:solidFill>
-            <a:ln w="19050">
-              <a:solidFill>
-                <a:schemeClr val="accent6">
-                  <a:lumMod val="75000"/>
-                </a:schemeClr>
-              </a:solidFill>
-            </a:ln>
-            <a:effectLst/>
-          </p:spPr>
-          <p:style>
-            <a:lnRef idx="1">
-              <a:schemeClr val="accent2"/>
-            </a:lnRef>
-            <a:fillRef idx="2">
-              <a:schemeClr val="accent2"/>
-            </a:fillRef>
-            <a:effectRef idx="1">
-              <a:schemeClr val="accent2"/>
-            </a:effectRef>
-            <a:fontRef idx="minor">
-              <a:schemeClr val="dk1"/>
-            </a:fontRef>
-          </p:style>
-          <p:txBody>
-            <a:bodyPr rtlCol="0" anchor="ctr"/>
-            <a:lstStyle/>
-            <a:p>
-              <a:pPr algn="ctr"/>
-              <a:r>
-                <a:rPr lang="en-US" sz="1050" dirty="0">
-                  <a:solidFill>
-                    <a:schemeClr val="bg1"/>
-                  </a:solidFill>
-                </a:rPr>
-                <a:t>&lt;&lt;interface&gt;&gt;</a:t>
-              </a:r>
-              <a:br>
-                <a:rPr lang="en-US" sz="1050" dirty="0">
-                  <a:solidFill>
-                    <a:schemeClr val="bg1"/>
-                  </a:solidFill>
-                </a:rPr>
-              </a:br>
-              <a:r>
-                <a:rPr lang="en-US" sz="1050" dirty="0" err="1">
-                  <a:solidFill>
-                    <a:schemeClr val="bg1"/>
-                  </a:solidFill>
-                </a:rPr>
-                <a:t>UserPrefsStorage</a:t>
-              </a:r>
-              <a:endParaRPr lang="en-SG" sz="1050" dirty="0">
-                <a:solidFill>
-                  <a:schemeClr val="bg1"/>
-                </a:solidFill>
-              </a:endParaRPr>
-            </a:p>
-          </p:txBody>
-        </p:sp>
-        <p:cxnSp>
-          <p:nvCxnSpPr>
-            <p:cNvPr id="54" name="Straight Arrow Connector 53"/>
-            <p:cNvCxnSpPr>
-              <a:stCxn id="56" idx="3"/>
-              <a:endCxn id="52" idx="1"/>
-            </p:cNvCxnSpPr>
-            <p:nvPr/>
-          </p:nvCxnSpPr>
-          <p:spPr>
-            <a:xfrm>
-              <a:off x="4131005" y="2673459"/>
-              <a:ext cx="220810" cy="5284"/>
-            </a:xfrm>
-            <a:prstGeom prst="straightConnector1">
-              <a:avLst/>
-            </a:prstGeom>
-            <a:ln w="19050">
-              <a:solidFill>
-                <a:schemeClr val="accent6">
-                  <a:lumMod val="75000"/>
-                </a:schemeClr>
-              </a:solidFill>
-              <a:headEnd type="none" w="med" len="med"/>
-              <a:tailEnd type="arrow" w="med" len="med"/>
-            </a:ln>
-            <a:effectLst/>
-          </p:spPr>
-          <p:style>
-            <a:lnRef idx="1">
-              <a:schemeClr val="accent2"/>
-            </a:lnRef>
-            <a:fillRef idx="2">
-              <a:schemeClr val="accent2"/>
-            </a:fillRef>
-            <a:effectRef idx="1">
-              <a:schemeClr val="accent2"/>
-            </a:effectRef>
-            <a:fontRef idx="minor">
-              <a:schemeClr val="dk1"/>
-            </a:fontRef>
-          </p:style>
-        </p:cxnSp>
-        <p:sp>
-          <p:nvSpPr>
-            <p:cNvPr id="56" name="Flowchart: Decision 96"/>
-            <p:cNvSpPr/>
-            <p:nvPr/>
-          </p:nvSpPr>
-          <p:spPr>
-            <a:xfrm>
-              <a:off x="3894957" y="2586769"/>
-              <a:ext cx="236048" cy="173380"/>
-            </a:xfrm>
-            <a:prstGeom prst="flowChartDecision">
-              <a:avLst/>
-            </a:prstGeom>
-            <a:noFill/>
-            <a:ln w="19050">
-              <a:solidFill>
-                <a:schemeClr val="accent6">
-                  <a:lumMod val="75000"/>
-                </a:schemeClr>
-              </a:solidFill>
-            </a:ln>
-            <a:effectLst/>
-          </p:spPr>
-          <p:style>
-            <a:lnRef idx="1">
-              <a:schemeClr val="accent2"/>
-            </a:lnRef>
-            <a:fillRef idx="2">
-              <a:schemeClr val="accent2"/>
-            </a:fillRef>
-            <a:effectRef idx="1">
-              <a:schemeClr val="accent2"/>
-            </a:effectRef>
-            <a:fontRef idx="minor">
-              <a:schemeClr val="dk1"/>
-            </a:fontRef>
-          </p:style>
-          <p:txBody>
-            <a:bodyPr rtlCol="0" anchor="ctr"/>
-            <a:lstStyle/>
-            <a:p>
-              <a:pPr algn="ctr"/>
-              <a:endParaRPr lang="en-US" sz="1050">
-                <a:solidFill>
-                  <a:schemeClr val="bg1"/>
-                </a:solidFill>
-              </a:endParaRPr>
-            </a:p>
-          </p:txBody>
-        </p:sp>
-        <p:cxnSp>
-          <p:nvCxnSpPr>
-            <p:cNvPr id="60" name="Elbow Connector 63"/>
-            <p:cNvCxnSpPr>
-              <a:stCxn id="61" idx="3"/>
-              <a:endCxn id="65" idx="1"/>
-            </p:cNvCxnSpPr>
-            <p:nvPr/>
-          </p:nvCxnSpPr>
-          <p:spPr>
-            <a:xfrm flipV="1">
-              <a:off x="5872676" y="2678743"/>
-              <a:ext cx="223324" cy="1"/>
-            </a:xfrm>
-            <a:prstGeom prst="bentConnector3">
-              <a:avLst>
-                <a:gd name="adj1" fmla="val 50000"/>
-              </a:avLst>
-            </a:prstGeom>
-            <a:ln w="19050">
-              <a:solidFill>
-                <a:schemeClr val="accent6">
-                  <a:lumMod val="75000"/>
-                </a:schemeClr>
-              </a:solidFill>
-              <a:prstDash val="sysDot"/>
-              <a:headEnd type="none" w="med" len="med"/>
-              <a:tailEnd type="none" w="med" len="med"/>
-            </a:ln>
-            <a:effectLst/>
-          </p:spPr>
-          <p:style>
-            <a:lnRef idx="1">
-              <a:schemeClr val="accent2"/>
-            </a:lnRef>
-            <a:fillRef idx="2">
-              <a:schemeClr val="accent2"/>
-            </a:fillRef>
-            <a:effectRef idx="1">
-              <a:schemeClr val="accent2"/>
-            </a:effectRef>
-            <a:fontRef idx="minor">
-              <a:schemeClr val="dk1"/>
-            </a:fontRef>
-          </p:style>
-        </p:cxnSp>
-        <p:sp>
-          <p:nvSpPr>
-            <p:cNvPr id="61" name="Isosceles Triangle 102"/>
-            <p:cNvSpPr/>
-            <p:nvPr/>
-          </p:nvSpPr>
-          <p:spPr>
-            <a:xfrm rot="5400000" flipV="1">
-              <a:off x="5649662" y="2590982"/>
-              <a:ext cx="270504" cy="175523"/>
-            </a:xfrm>
-            <a:prstGeom prst="triangle">
-              <a:avLst/>
-            </a:prstGeom>
-            <a:solidFill>
-              <a:schemeClr val="accent6">
-                <a:lumMod val="75000"/>
-              </a:schemeClr>
-            </a:solidFill>
-            <a:ln w="19050">
-              <a:solidFill>
-                <a:schemeClr val="accent6">
-                  <a:lumMod val="75000"/>
-                </a:schemeClr>
-              </a:solidFill>
-            </a:ln>
-            <a:effectLst/>
-          </p:spPr>
-          <p:style>
-            <a:lnRef idx="1">
-              <a:schemeClr val="accent2"/>
-            </a:lnRef>
-            <a:fillRef idx="2">
-              <a:schemeClr val="accent2"/>
-            </a:fillRef>
-            <a:effectRef idx="1">
-              <a:schemeClr val="accent2"/>
-            </a:effectRef>
-            <a:fontRef idx="minor">
-              <a:schemeClr val="dk1"/>
-            </a:fontRef>
-          </p:style>
-          <p:txBody>
-            <a:bodyPr rtlCol="0" anchor="ctr"/>
-            <a:lstStyle/>
-            <a:p>
-              <a:pPr algn="ctr"/>
-              <a:endParaRPr lang="en-SG" sz="1050">
-                <a:solidFill>
-                  <a:schemeClr val="bg1"/>
-                </a:solidFill>
-              </a:endParaRPr>
-            </a:p>
-          </p:txBody>
-        </p:sp>
-        <p:sp>
-          <p:nvSpPr>
-            <p:cNvPr id="65" name="Rectangle 8"/>
-            <p:cNvSpPr/>
-            <p:nvPr/>
-          </p:nvSpPr>
-          <p:spPr>
-            <a:xfrm>
-              <a:off x="6096000" y="2505363"/>
-              <a:ext cx="1093635" cy="346760"/>
-            </a:xfrm>
-            <a:prstGeom prst="rect">
-              <a:avLst/>
-            </a:prstGeom>
-            <a:solidFill>
-              <a:schemeClr val="accent6">
-                <a:lumMod val="75000"/>
-              </a:schemeClr>
-            </a:solidFill>
-            <a:ln w="19050">
-              <a:solidFill>
-                <a:schemeClr val="accent6">
-                  <a:lumMod val="75000"/>
-                </a:schemeClr>
-              </a:solidFill>
-            </a:ln>
-            <a:effectLst/>
-          </p:spPr>
-          <p:style>
-            <a:lnRef idx="1">
-              <a:schemeClr val="accent2"/>
-            </a:lnRef>
-            <a:fillRef idx="2">
-              <a:schemeClr val="accent2"/>
-            </a:fillRef>
-            <a:effectRef idx="1">
-              <a:schemeClr val="accent2"/>
-            </a:effectRef>
-            <a:fontRef idx="minor">
-              <a:schemeClr val="dk1"/>
-            </a:fontRef>
-          </p:style>
-          <p:txBody>
-            <a:bodyPr rtlCol="0" anchor="ctr"/>
-            <a:lstStyle/>
-            <a:p>
-              <a:pPr algn="ctr"/>
-              <a:r>
-                <a:rPr lang="en-US" sz="1050" dirty="0" err="1">
-                  <a:solidFill>
-                    <a:schemeClr val="bg1"/>
-                  </a:solidFill>
-                </a:rPr>
-                <a:t>JsonUserPrefs</a:t>
-              </a:r>
-              <a:br>
-                <a:rPr lang="en-US" sz="1050" dirty="0">
-                  <a:solidFill>
-                    <a:schemeClr val="bg1"/>
-                  </a:solidFill>
-                </a:rPr>
-              </a:br>
-              <a:r>
-                <a:rPr lang="en-US" sz="1050" dirty="0">
-                  <a:solidFill>
-                    <a:schemeClr val="bg1"/>
-                  </a:solidFill>
-                </a:rPr>
-                <a:t>Storage</a:t>
-              </a:r>
-              <a:endParaRPr lang="en-SG" sz="1050" dirty="0">
-                <a:solidFill>
-                  <a:schemeClr val="bg1"/>
-                </a:solidFill>
-              </a:endParaRPr>
-            </a:p>
-          </p:txBody>
-        </p:sp>
-        <p:sp>
-          <p:nvSpPr>
-            <p:cNvPr id="66" name="Rectangle 8"/>
-            <p:cNvSpPr/>
-            <p:nvPr/>
-          </p:nvSpPr>
-          <p:spPr>
-            <a:xfrm>
-              <a:off x="4473606" y="3710266"/>
-              <a:ext cx="1200707" cy="346760"/>
-            </a:xfrm>
-            <a:prstGeom prst="rect">
-              <a:avLst/>
-            </a:prstGeom>
-            <a:ln w="19050"/>
-            <a:effectLst/>
-          </p:spPr>
-          <p:style>
-            <a:lnRef idx="1">
-              <a:schemeClr val="accent6"/>
-            </a:lnRef>
-            <a:fillRef idx="2">
-              <a:schemeClr val="accent6"/>
-            </a:fillRef>
-            <a:effectRef idx="1">
-              <a:schemeClr val="accent6"/>
-            </a:effectRef>
-            <a:fontRef idx="minor">
-              <a:schemeClr val="dk1"/>
-            </a:fontRef>
-          </p:style>
-          <p:txBody>
-            <a:bodyPr rtlCol="0" anchor="ctr"/>
-            <a:lstStyle/>
-            <a:p>
-              <a:pPr algn="ctr"/>
-              <a:r>
-                <a:rPr lang="en-US" sz="1050" b="1" dirty="0" err="1">
-                  <a:solidFill>
-                    <a:schemeClr val="accent6">
-                      <a:lumMod val="75000"/>
-                    </a:schemeClr>
-                  </a:solidFill>
-                </a:rPr>
-                <a:t>JsonSerializable</a:t>
-              </a:r>
-              <a:br>
-                <a:rPr lang="en-US" sz="1050" b="1" dirty="0">
-                  <a:solidFill>
-                    <a:schemeClr val="accent6">
-                      <a:lumMod val="75000"/>
-                    </a:schemeClr>
-                  </a:solidFill>
-                </a:rPr>
-              </a:br>
-              <a:r>
-                <a:rPr lang="en-US" sz="1050" b="1" dirty="0" err="1">
-                  <a:solidFill>
-                    <a:schemeClr val="accent6">
-                      <a:lumMod val="75000"/>
-                    </a:schemeClr>
-                  </a:solidFill>
-                </a:rPr>
-                <a:t>AddressBook</a:t>
-              </a:r>
-              <a:endParaRPr lang="en-SG" sz="1050" b="1" dirty="0">
-                <a:solidFill>
-                  <a:schemeClr val="accent6">
-                    <a:lumMod val="75000"/>
-                  </a:schemeClr>
-                </a:solidFill>
-              </a:endParaRPr>
-            </a:p>
-          </p:txBody>
-        </p:sp>
-        <p:sp>
-          <p:nvSpPr>
-            <p:cNvPr id="73" name="Rectangle 8"/>
-            <p:cNvSpPr/>
-            <p:nvPr/>
-          </p:nvSpPr>
-          <p:spPr>
-            <a:xfrm>
-              <a:off x="6060660" y="5511067"/>
+              <a:off x="2329253" y="3710445"/>
               <a:ext cx="1331655" cy="346760"/>
             </a:xfrm>
             <a:prstGeom prst="rect">
@@ -4670,7 +5814,7 @@
                     </a:schemeClr>
                   </a:solidFill>
                 </a:rPr>
-                <a:t>JsonAdaptedTag</a:t>
+                <a:t>JsonAdaptedYear</a:t>
               </a:r>
               <a:endParaRPr lang="en-SG" sz="1050" b="1" dirty="0">
                 <a:solidFill>
@@ -4682,65 +5826,12 @@
             </a:p>
           </p:txBody>
         </p:sp>
-        <p:cxnSp>
-          <p:nvCxnSpPr>
-            <p:cNvPr id="37" name="Elbow Connector 122">
+        <p:sp>
+          <p:nvSpPr>
+            <p:cNvPr id="44" name="Rectangle 8">
               <a:extLst>
                 <a:ext uri="{FF2B5EF4-FFF2-40B4-BE49-F238E27FC236}">
-                  <a16:creationId xmlns:a16="http://schemas.microsoft.com/office/drawing/2014/main" id="{6C6BD4DE-078B-4478-A2A0-BF45F863C92D}"/>
-                </a:ext>
-              </a:extLst>
-            </p:cNvPr>
-            <p:cNvCxnSpPr>
-              <a:cxnSpLocks/>
-              <a:stCxn id="66" idx="2"/>
-              <a:endCxn id="38" idx="0"/>
-            </p:cNvCxnSpPr>
-            <p:nvPr/>
-          </p:nvCxnSpPr>
-          <p:spPr>
-            <a:xfrm rot="5400000">
-              <a:off x="4925862" y="4205124"/>
-              <a:ext cx="296197" cy="1"/>
-            </a:xfrm>
-            <a:prstGeom prst="bentConnector3">
-              <a:avLst>
-                <a:gd name="adj1" fmla="val 50000"/>
-              </a:avLst>
-            </a:prstGeom>
-            <a:ln w="19050">
-              <a:solidFill>
-                <a:schemeClr val="accent6">
-                  <a:lumMod val="75000"/>
-                </a:schemeClr>
-              </a:solidFill>
-              <a:prstDash val="sysDot"/>
-              <a:headEnd type="none" w="med" len="med"/>
-              <a:tailEnd type="arrow" w="med" len="med"/>
-            </a:ln>
-            <a:effectLst/>
-          </p:spPr>
-          <p:style>
-            <a:lnRef idx="1">
-              <a:schemeClr val="accent2"/>
-            </a:lnRef>
-            <a:fillRef idx="2">
-              <a:schemeClr val="accent2"/>
-            </a:fillRef>
-            <a:effectRef idx="1">
-              <a:schemeClr val="accent2"/>
-            </a:effectRef>
-            <a:fontRef idx="minor">
-              <a:schemeClr val="dk1"/>
-            </a:fontRef>
-          </p:style>
-        </p:cxnSp>
-        <p:sp>
-          <p:nvSpPr>
-            <p:cNvPr id="38" name="Rectangle 8">
-              <a:extLst>
-                <a:ext uri="{FF2B5EF4-FFF2-40B4-BE49-F238E27FC236}">
-                  <a16:creationId xmlns:a16="http://schemas.microsoft.com/office/drawing/2014/main" id="{AF712354-A047-4445-9A49-E11CB796F952}"/>
+                  <a16:creationId xmlns:a16="http://schemas.microsoft.com/office/drawing/2014/main" id="{7F3ED9A4-046B-4665-9FDA-59D29E2171F8}"/>
                 </a:ext>
               </a:extLst>
             </p:cNvPr>
@@ -4749,8 +5840,8 @@
           </p:nvSpPr>
           <p:spPr>
             <a:xfrm>
-              <a:off x="4263031" y="4353223"/>
-              <a:ext cx="1621856" cy="346760"/>
+              <a:off x="4410114" y="3712246"/>
+              <a:ext cx="1242135" cy="346760"/>
             </a:xfrm>
             <a:prstGeom prst="rect">
               <a:avLst/>
@@ -4785,188 +5876,7 @@
                     </a:schemeClr>
                   </a:solidFill>
                 </a:rPr>
-                <a:t>JsonSerializable</a:t>
-              </a:r>
-              <a:br>
-                <a:rPr lang="en-US" sz="1050" b="1" dirty="0">
-                  <a:solidFill>
-                    <a:schemeClr val="accent6">
-                      <a:lumMod val="75000"/>
-                    </a:schemeClr>
-                  </a:solidFill>
-                </a:rPr>
-              </a:br>
-              <a:r>
-                <a:rPr lang="en-US" sz="1050" b="1" dirty="0" err="1">
-                  <a:solidFill>
-                    <a:schemeClr val="accent6">
-                      <a:lumMod val="75000"/>
-                    </a:schemeClr>
-                  </a:solidFill>
-                </a:rPr>
-                <a:t>RequirementCategoryList</a:t>
-              </a:r>
-              <a:endParaRPr lang="en-SG" sz="1050" b="1" dirty="0">
-                <a:solidFill>
-                  <a:schemeClr val="accent6">
-                    <a:lumMod val="75000"/>
-                  </a:schemeClr>
-                </a:solidFill>
-              </a:endParaRPr>
-            </a:p>
-          </p:txBody>
-        </p:sp>
-        <p:sp>
-          <p:nvSpPr>
-            <p:cNvPr id="39" name="Rectangle 8">
-              <a:extLst>
-                <a:ext uri="{FF2B5EF4-FFF2-40B4-BE49-F238E27FC236}">
-                  <a16:creationId xmlns:a16="http://schemas.microsoft.com/office/drawing/2014/main" id="{24867C62-854D-4D85-B324-1E7EA74C8742}"/>
-                </a:ext>
-              </a:extLst>
-            </p:cNvPr>
-            <p:cNvSpPr/>
-            <p:nvPr/>
-          </p:nvSpPr>
-          <p:spPr>
-            <a:xfrm>
-              <a:off x="6125470" y="4353222"/>
-              <a:ext cx="1200707" cy="346760"/>
-            </a:xfrm>
-            <a:prstGeom prst="rect">
-              <a:avLst/>
-            </a:prstGeom>
-            <a:ln w="19050"/>
-            <a:effectLst/>
-          </p:spPr>
-          <p:style>
-            <a:lnRef idx="1">
-              <a:schemeClr val="accent6"/>
-            </a:lnRef>
-            <a:fillRef idx="2">
-              <a:schemeClr val="accent6"/>
-            </a:fillRef>
-            <a:effectRef idx="1">
-              <a:schemeClr val="accent6"/>
-            </a:effectRef>
-            <a:fontRef idx="minor">
-              <a:schemeClr val="dk1"/>
-            </a:fontRef>
-          </p:style>
-          <p:txBody>
-            <a:bodyPr rtlCol="0" anchor="ctr"/>
-            <a:lstStyle/>
-            <a:p>
-              <a:pPr algn="ctr"/>
-              <a:r>
-                <a:rPr lang="en-US" sz="1050" b="1" dirty="0" err="1">
-                  <a:solidFill>
-                    <a:schemeClr val="accent6">
-                      <a:lumMod val="75000"/>
-                    </a:schemeClr>
-                  </a:solidFill>
-                </a:rPr>
-                <a:t>JsonSerializable</a:t>
-              </a:r>
-              <a:br>
-                <a:rPr lang="en-US" sz="1050" b="1" dirty="0">
-                  <a:solidFill>
-                    <a:schemeClr val="accent6">
-                      <a:lumMod val="75000"/>
-                    </a:schemeClr>
-                  </a:solidFill>
-                </a:rPr>
-              </a:br>
-              <a:r>
-                <a:rPr lang="en-US" sz="1050" b="1" dirty="0" err="1">
-                  <a:solidFill>
-                    <a:schemeClr val="accent6">
-                      <a:lumMod val="75000"/>
-                    </a:schemeClr>
-                  </a:solidFill>
-                </a:rPr>
-                <a:t>ModuleList</a:t>
-              </a:r>
-              <a:endParaRPr lang="en-SG" sz="1050" b="1" dirty="0">
-                <a:solidFill>
-                  <a:schemeClr val="accent6">
-                    <a:lumMod val="75000"/>
-                  </a:schemeClr>
-                </a:solidFill>
-              </a:endParaRPr>
-            </a:p>
-          </p:txBody>
-        </p:sp>
-        <p:sp>
-          <p:nvSpPr>
-            <p:cNvPr id="40" name="Rectangle 8">
-              <a:extLst>
-                <a:ext uri="{FF2B5EF4-FFF2-40B4-BE49-F238E27FC236}">
-                  <a16:creationId xmlns:a16="http://schemas.microsoft.com/office/drawing/2014/main" id="{62F39C93-A0F1-43E2-8031-64CE109DC333}"/>
-                </a:ext>
-              </a:extLst>
-            </p:cNvPr>
-            <p:cNvSpPr/>
-            <p:nvPr/>
-          </p:nvSpPr>
-          <p:spPr>
-            <a:xfrm>
-              <a:off x="2821741" y="4350002"/>
-              <a:ext cx="1200707" cy="346760"/>
-            </a:xfrm>
-            <a:prstGeom prst="rect">
-              <a:avLst/>
-            </a:prstGeom>
-            <a:ln w="19050"/>
-            <a:effectLst/>
-          </p:spPr>
-          <p:style>
-            <a:lnRef idx="1">
-              <a:schemeClr val="accent6"/>
-            </a:lnRef>
-            <a:fillRef idx="2">
-              <a:schemeClr val="accent6"/>
-            </a:fillRef>
-            <a:effectRef idx="1">
-              <a:schemeClr val="accent6"/>
-            </a:effectRef>
-            <a:fontRef idx="minor">
-              <a:schemeClr val="dk1"/>
-            </a:fontRef>
-          </p:style>
-          <p:txBody>
-            <a:bodyPr rtlCol="0" anchor="ctr"/>
-            <a:lstStyle/>
-            <a:p>
-              <a:pPr algn="ctr"/>
-              <a:r>
-                <a:rPr lang="en-US" sz="1050" b="1" dirty="0" err="1">
-                  <a:solidFill>
-                    <a:schemeClr val="accent6">
-                      <a:lumMod val="75000"/>
-                    </a:schemeClr>
-                  </a:solidFill>
-                </a:rPr>
-                <a:t>JsonSerializable</a:t>
-              </a:r>
-              <a:br>
-                <a:rPr lang="en-US" sz="1050" b="1" dirty="0">
-                  <a:solidFill>
-                    <a:schemeClr val="accent6">
-                      <a:lumMod val="75000"/>
-                    </a:schemeClr>
-                  </a:solidFill>
-                </a:rPr>
-              </a:br>
-              <a:r>
-                <a:rPr lang="en-US" sz="1050" b="1" dirty="0" err="1">
-                  <a:solidFill>
-                    <a:schemeClr val="accent6">
-                      <a:lumMod val="75000"/>
-                    </a:schemeClr>
-                  </a:solidFill>
-                </a:rPr>
-                <a:t>DegreePlannerList</a:t>
+                <a:t>JsonAdaptedName</a:t>
               </a:r>
               <a:endParaRPr lang="en-SG" sz="1050" b="1" dirty="0">
                 <a:solidFill>
@@ -4980,24 +5890,23 @@
         </p:sp>
         <p:cxnSp>
           <p:nvCxnSpPr>
-            <p:cNvPr id="43" name="Elbow Connector 122">
+            <p:cNvPr id="45" name="Elbow Connector 122">
               <a:extLst>
                 <a:ext uri="{FF2B5EF4-FFF2-40B4-BE49-F238E27FC236}">
-                  <a16:creationId xmlns:a16="http://schemas.microsoft.com/office/drawing/2014/main" id="{8594D4BB-BD8F-4379-871A-5BC61B299381}"/>
+                  <a16:creationId xmlns:a16="http://schemas.microsoft.com/office/drawing/2014/main" id="{AFCA9F69-B8E9-4F42-920D-E8D616DF5B48}"/>
                 </a:ext>
               </a:extLst>
             </p:cNvPr>
             <p:cNvCxnSpPr>
               <a:cxnSpLocks/>
-              <a:stCxn id="66" idx="2"/>
-              <a:endCxn id="40" idx="0"/>
+              <a:stCxn id="49" idx="2"/>
             </p:cNvCxnSpPr>
             <p:nvPr/>
           </p:nvCxnSpPr>
           <p:spPr>
-            <a:xfrm rot="5400000">
-              <a:off x="4101540" y="3377582"/>
-              <a:ext cx="292976" cy="1651865"/>
+            <a:xfrm rot="16200000" flipH="1">
+              <a:off x="2814504" y="3553083"/>
+              <a:ext cx="285938" cy="10298"/>
             </a:xfrm>
             <a:prstGeom prst="bentConnector3">
               <a:avLst>
@@ -5033,28 +5942,28 @@
         </p:cxnSp>
         <p:cxnSp>
           <p:nvCxnSpPr>
-            <p:cNvPr id="46" name="Elbow Connector 122">
+            <p:cNvPr id="47" name="Elbow Connector 122">
               <a:extLst>
                 <a:ext uri="{FF2B5EF4-FFF2-40B4-BE49-F238E27FC236}">
-                  <a16:creationId xmlns:a16="http://schemas.microsoft.com/office/drawing/2014/main" id="{DA8DB951-9AC5-4F09-91E1-577DD8AD2FF4}"/>
+                  <a16:creationId xmlns:a16="http://schemas.microsoft.com/office/drawing/2014/main" id="{4436C3B5-1043-4052-94C4-0792051CE4B5}"/>
                 </a:ext>
               </a:extLst>
             </p:cNvPr>
             <p:cNvCxnSpPr>
               <a:cxnSpLocks/>
-              <a:stCxn id="66" idx="2"/>
-              <a:endCxn id="39" idx="0"/>
+              <a:stCxn id="49" idx="1"/>
+              <a:endCxn id="63" idx="1"/>
             </p:cNvCxnSpPr>
             <p:nvPr/>
           </p:nvCxnSpPr>
           <p:spPr>
-            <a:xfrm rot="16200000" flipH="1">
-              <a:off x="5751794" y="3379192"/>
-              <a:ext cx="296196" cy="1651864"/>
+            <a:xfrm rot="10800000" flipV="1">
+              <a:off x="2329254" y="3241883"/>
+              <a:ext cx="22717" cy="1194526"/>
             </a:xfrm>
             <a:prstGeom prst="bentConnector3">
               <a:avLst>
-                <a:gd name="adj1" fmla="val 50000"/>
+                <a:gd name="adj1" fmla="val 1106295"/>
               </a:avLst>
             </a:prstGeom>
             <a:ln w="19050">
@@ -5086,10 +5995,10 @@
         </p:cxnSp>
         <p:sp>
           <p:nvSpPr>
-            <p:cNvPr id="49" name="Rectangle 8">
+            <p:cNvPr id="63" name="Rectangle 8">
               <a:extLst>
                 <a:ext uri="{FF2B5EF4-FFF2-40B4-BE49-F238E27FC236}">
-                  <a16:creationId xmlns:a16="http://schemas.microsoft.com/office/drawing/2014/main" id="{1EE6BF26-A055-4F50-918D-14F1091D7BC7}"/>
+                  <a16:creationId xmlns:a16="http://schemas.microsoft.com/office/drawing/2014/main" id="{5C77A2B3-4B40-4560-A444-69644CD0671E}"/>
                 </a:ext>
               </a:extLst>
             </p:cNvPr>
@@ -5098,8 +6007,8 @@
           </p:nvSpPr>
           <p:spPr>
             <a:xfrm>
-              <a:off x="2827492" y="4870821"/>
-              <a:ext cx="1200707" cy="346760"/>
+              <a:off x="2329253" y="4263029"/>
+              <a:ext cx="1331655" cy="346760"/>
             </a:xfrm>
             <a:prstGeom prst="rect">
               <a:avLst/>
@@ -5146,14 +6055,14 @@
                 </a:rPr>
               </a:br>
               <a:r>
-                <a:rPr lang="en-US" sz="1050" b="1" dirty="0" err="1">
+                <a:rPr lang="en-US" sz="1050" b="1" dirty="0">
                   <a:solidFill>
                     <a:schemeClr val="accent6">
                       <a:lumMod val="75000"/>
                     </a:schemeClr>
                   </a:solidFill>
                 </a:rPr>
-                <a:t>DegreePlanner</a:t>
+                <a:t>Semester</a:t>
               </a:r>
               <a:endParaRPr lang="en-SG" sz="1050" b="1" dirty="0">
                 <a:solidFill>
@@ -5167,10 +6076,10 @@
         </p:sp>
         <p:sp>
           <p:nvSpPr>
-            <p:cNvPr id="51" name="Rectangle 8">
+            <p:cNvPr id="104" name="Rectangle 8">
               <a:extLst>
                 <a:ext uri="{FF2B5EF4-FFF2-40B4-BE49-F238E27FC236}">
-                  <a16:creationId xmlns:a16="http://schemas.microsoft.com/office/drawing/2014/main" id="{E29B6698-1D0F-4750-BD03-ACC5B240E399}"/>
+                  <a16:creationId xmlns:a16="http://schemas.microsoft.com/office/drawing/2014/main" id="{9E553998-74F8-45F7-9B92-604DE3FB1CCC}"/>
                 </a:ext>
               </a:extLst>
             </p:cNvPr>
@@ -5179,8 +6088,8 @@
           </p:nvSpPr>
           <p:spPr>
             <a:xfrm>
-              <a:off x="4476367" y="4870821"/>
-              <a:ext cx="1200707" cy="346760"/>
+              <a:off x="4416464" y="4269688"/>
+              <a:ext cx="1255387" cy="346760"/>
             </a:xfrm>
             <a:prstGeom prst="rect">
               <a:avLst/>
@@ -5215,26 +6124,7 @@
                     </a:schemeClr>
                   </a:solidFill>
                 </a:rPr>
-                <a:t>JsonAdapted</a:t>
-              </a:r>
-              <a:br>
-                <a:rPr lang="en-US" sz="1050" b="1" dirty="0">
-                  <a:solidFill>
-                    <a:schemeClr val="accent6">
-                      <a:lumMod val="75000"/>
-                    </a:schemeClr>
-                  </a:solidFill>
-                </a:rPr>
-              </a:br>
-              <a:r>
-                <a:rPr lang="en-US" sz="1050" b="1" dirty="0" err="1">
-                  <a:solidFill>
-                    <a:schemeClr val="accent6">
-                      <a:lumMod val="75000"/>
-                    </a:schemeClr>
-                  </a:solidFill>
-                </a:rPr>
-                <a:t>RequirementList</a:t>
+                <a:t>JsonAdaptedCredit</a:t>
               </a:r>
               <a:endParaRPr lang="en-SG" sz="1050" b="1" dirty="0">
                 <a:solidFill>
@@ -5246,88 +6136,24 @@
             </a:p>
           </p:txBody>
         </p:sp>
-        <p:sp>
-          <p:nvSpPr>
-            <p:cNvPr id="55" name="Rectangle 8">
+        <p:cxnSp>
+          <p:nvCxnSpPr>
+            <p:cNvPr id="130" name="Elbow Connector 122">
               <a:extLst>
                 <a:ext uri="{FF2B5EF4-FFF2-40B4-BE49-F238E27FC236}">
-                  <a16:creationId xmlns:a16="http://schemas.microsoft.com/office/drawing/2014/main" id="{46D0CB68-F420-458B-BED9-15DB056FEBC7}"/>
-                </a:ext>
-              </a:extLst>
-            </p:cNvPr>
-            <p:cNvSpPr/>
-            <p:nvPr/>
-          </p:nvSpPr>
-          <p:spPr>
-            <a:xfrm>
-              <a:off x="6054909" y="4862873"/>
-              <a:ext cx="1331656" cy="346760"/>
-            </a:xfrm>
-            <a:prstGeom prst="rect">
-              <a:avLst/>
-            </a:prstGeom>
-            <a:ln w="19050"/>
-            <a:effectLst/>
-          </p:spPr>
-          <p:style>
-            <a:lnRef idx="1">
-              <a:schemeClr val="accent6"/>
-            </a:lnRef>
-            <a:fillRef idx="2">
-              <a:schemeClr val="accent6"/>
-            </a:fillRef>
-            <a:effectRef idx="1">
-              <a:schemeClr val="accent6"/>
-            </a:effectRef>
-            <a:fontRef idx="minor">
-              <a:schemeClr val="dk1"/>
-            </a:fontRef>
-          </p:style>
-          <p:txBody>
-            <a:bodyPr rtlCol="0" anchor="ctr"/>
-            <a:lstStyle/>
-            <a:p>
-              <a:pPr algn="ctr"/>
-              <a:r>
-                <a:rPr lang="en-US" sz="1030" b="1" dirty="0" err="1">
-                  <a:solidFill>
-                    <a:schemeClr val="accent6">
-                      <a:lumMod val="75000"/>
-                    </a:schemeClr>
-                  </a:solidFill>
-                </a:rPr>
-                <a:t>JsonAdaptedModule</a:t>
-              </a:r>
-              <a:endParaRPr lang="en-SG" sz="1030" b="1" dirty="0">
-                <a:solidFill>
-                  <a:schemeClr val="accent6">
-                    <a:lumMod val="75000"/>
-                  </a:schemeClr>
-                </a:solidFill>
-              </a:endParaRPr>
-            </a:p>
-          </p:txBody>
-        </p:sp>
-        <p:cxnSp>
-          <p:nvCxnSpPr>
-            <p:cNvPr id="57" name="Elbow Connector 122">
-              <a:extLst>
-                <a:ext uri="{FF2B5EF4-FFF2-40B4-BE49-F238E27FC236}">
-                  <a16:creationId xmlns:a16="http://schemas.microsoft.com/office/drawing/2014/main" id="{819F60E2-ADB0-4159-92FC-FC45338654CE}"/>
+                  <a16:creationId xmlns:a16="http://schemas.microsoft.com/office/drawing/2014/main" id="{15137D78-BA2F-497A-913A-8881B6F10AAC}"/>
                 </a:ext>
               </a:extLst>
             </p:cNvPr>
             <p:cNvCxnSpPr>
               <a:cxnSpLocks/>
-              <a:stCxn id="39" idx="2"/>
-              <a:endCxn id="55" idx="0"/>
             </p:cNvCxnSpPr>
             <p:nvPr/>
           </p:nvCxnSpPr>
           <p:spPr>
             <a:xfrm rot="5400000">
-              <a:off x="6641836" y="4778884"/>
-              <a:ext cx="162891" cy="5087"/>
+              <a:off x="4867455" y="3569983"/>
+              <a:ext cx="309038" cy="12700"/>
             </a:xfrm>
             <a:prstGeom prst="bentConnector3">
               <a:avLst>
@@ -5363,28 +6189,28 @@
         </p:cxnSp>
         <p:cxnSp>
           <p:nvCxnSpPr>
-            <p:cNvPr id="59" name="Elbow Connector 122">
+            <p:cNvPr id="132" name="Elbow Connector 122">
               <a:extLst>
                 <a:ext uri="{FF2B5EF4-FFF2-40B4-BE49-F238E27FC236}">
-                  <a16:creationId xmlns:a16="http://schemas.microsoft.com/office/drawing/2014/main" id="{497685BC-3EB0-488D-8BF4-255CC76E950F}"/>
+                  <a16:creationId xmlns:a16="http://schemas.microsoft.com/office/drawing/2014/main" id="{101D1EAA-616E-4567-9C68-2E7FE4DE6DDA}"/>
                 </a:ext>
               </a:extLst>
             </p:cNvPr>
             <p:cNvCxnSpPr>
               <a:cxnSpLocks/>
-              <a:stCxn id="38" idx="2"/>
-              <a:endCxn id="51" idx="0"/>
+              <a:stCxn id="51" idx="1"/>
             </p:cNvCxnSpPr>
             <p:nvPr/>
           </p:nvCxnSpPr>
           <p:spPr>
-            <a:xfrm rot="16200000" flipH="1">
-              <a:off x="4989921" y="4784021"/>
-              <a:ext cx="170838" cy="2762"/>
+            <a:xfrm rot="10800000" flipH="1" flipV="1">
+              <a:off x="4414530" y="3236088"/>
+              <a:ext cx="3868" cy="1198320"/>
             </a:xfrm>
-            <a:prstGeom prst="bentConnector3">
+            <a:prstGeom prst="bentConnector4">
               <a:avLst>
-                <a:gd name="adj1" fmla="val 50000"/>
+                <a:gd name="adj1" fmla="val -5602223"/>
+                <a:gd name="adj2" fmla="val 100157"/>
               </a:avLst>
             </a:prstGeom>
             <a:ln w="19050">
@@ -5416,143 +6242,28 @@
         </p:cxnSp>
         <p:cxnSp>
           <p:nvCxnSpPr>
-            <p:cNvPr id="62" name="Elbow Connector 122">
+            <p:cNvPr id="136" name="Elbow Connector 122">
               <a:extLst>
                 <a:ext uri="{FF2B5EF4-FFF2-40B4-BE49-F238E27FC236}">
-                  <a16:creationId xmlns:a16="http://schemas.microsoft.com/office/drawing/2014/main" id="{05E1C576-4CF8-4F2D-9E18-E6F7C31A0421}"/>
+                  <a16:creationId xmlns:a16="http://schemas.microsoft.com/office/drawing/2014/main" id="{063C2CF8-CEC5-40EE-AEE5-78195E1307A2}"/>
                 </a:ext>
               </a:extLst>
             </p:cNvPr>
             <p:cNvCxnSpPr>
               <a:cxnSpLocks/>
-              <a:stCxn id="40" idx="2"/>
-              <a:endCxn id="49" idx="0"/>
+              <a:stCxn id="55" idx="1"/>
+              <a:endCxn id="44" idx="3"/>
             </p:cNvCxnSpPr>
             <p:nvPr/>
           </p:nvCxnSpPr>
           <p:spPr>
-            <a:xfrm rot="16200000" flipH="1">
-              <a:off x="3337941" y="4780915"/>
-              <a:ext cx="174059" cy="5751"/>
+            <a:xfrm rot="10800000" flipV="1">
+              <a:off x="5652249" y="3232110"/>
+              <a:ext cx="822080" cy="653516"/>
             </a:xfrm>
             <a:prstGeom prst="bentConnector3">
               <a:avLst>
-                <a:gd name="adj1" fmla="val 50000"/>
-              </a:avLst>
-            </a:prstGeom>
-            <a:ln w="19050">
-              <a:solidFill>
-                <a:schemeClr val="accent6">
-                  <a:lumMod val="75000"/>
-                </a:schemeClr>
-              </a:solidFill>
-              <a:prstDash val="sysDot"/>
-              <a:headEnd type="none" w="med" len="med"/>
-              <a:tailEnd type="arrow" w="med" len="med"/>
-            </a:ln>
-            <a:effectLst/>
-          </p:spPr>
-          <p:style>
-            <a:lnRef idx="1">
-              <a:schemeClr val="accent2"/>
-            </a:lnRef>
-            <a:fillRef idx="2">
-              <a:schemeClr val="accent2"/>
-            </a:fillRef>
-            <a:effectRef idx="1">
-              <a:schemeClr val="accent2"/>
-            </a:effectRef>
-            <a:fontRef idx="minor">
-              <a:schemeClr val="dk1"/>
-            </a:fontRef>
-          </p:style>
-        </p:cxnSp>
-        <p:sp>
-          <p:nvSpPr>
-            <p:cNvPr id="84" name="Rectangle 8">
-              <a:extLst>
-                <a:ext uri="{FF2B5EF4-FFF2-40B4-BE49-F238E27FC236}">
-                  <a16:creationId xmlns:a16="http://schemas.microsoft.com/office/drawing/2014/main" id="{E37B3C1D-5BD0-47F7-89C9-1E681F13184E}"/>
-                </a:ext>
-              </a:extLst>
-            </p:cNvPr>
-            <p:cNvSpPr/>
-            <p:nvPr/>
-          </p:nvSpPr>
-          <p:spPr>
-            <a:xfrm>
-              <a:off x="4413002" y="5511067"/>
-              <a:ext cx="1331655" cy="346760"/>
-            </a:xfrm>
-            <a:prstGeom prst="rect">
-              <a:avLst/>
-            </a:prstGeom>
-            <a:ln w="19050"/>
-            <a:effectLst/>
-          </p:spPr>
-          <p:style>
-            <a:lnRef idx="1">
-              <a:schemeClr val="accent6"/>
-            </a:lnRef>
-            <a:fillRef idx="2">
-              <a:schemeClr val="accent6"/>
-            </a:fillRef>
-            <a:effectRef idx="1">
-              <a:schemeClr val="accent6"/>
-            </a:effectRef>
-            <a:fontRef idx="minor">
-              <a:schemeClr val="dk1"/>
-            </a:fontRef>
-          </p:style>
-          <p:txBody>
-            <a:bodyPr rtlCol="0" anchor="ctr"/>
-            <a:lstStyle/>
-            <a:p>
-              <a:pPr algn="ctr"/>
-              <a:r>
-                <a:rPr lang="en-US" sz="1050" b="1" dirty="0" err="1">
-                  <a:solidFill>
-                    <a:schemeClr val="accent6">
-                      <a:lumMod val="75000"/>
-                    </a:schemeClr>
-                  </a:solidFill>
-                </a:rPr>
-                <a:t>JsonAdaptedCode</a:t>
-              </a:r>
-              <a:endParaRPr lang="en-SG" sz="1050" b="1" dirty="0">
-                <a:solidFill>
-                  <a:schemeClr val="accent6">
-                    <a:lumMod val="75000"/>
-                  </a:schemeClr>
-                </a:solidFill>
-              </a:endParaRPr>
-            </a:p>
-          </p:txBody>
-        </p:sp>
-        <p:cxnSp>
-          <p:nvCxnSpPr>
-            <p:cNvPr id="85" name="Elbow Connector 122">
-              <a:extLst>
-                <a:ext uri="{FF2B5EF4-FFF2-40B4-BE49-F238E27FC236}">
-                  <a16:creationId xmlns:a16="http://schemas.microsoft.com/office/drawing/2014/main" id="{9991B445-9091-456C-83A5-57D816B77127}"/>
-                </a:ext>
-              </a:extLst>
-            </p:cNvPr>
-            <p:cNvCxnSpPr>
-              <a:cxnSpLocks/>
-              <a:stCxn id="51" idx="2"/>
-              <a:endCxn id="84" idx="0"/>
-            </p:cNvCxnSpPr>
-            <p:nvPr/>
-          </p:nvCxnSpPr>
-          <p:spPr>
-            <a:xfrm rot="16200000" flipH="1">
-              <a:off x="4931032" y="5363269"/>
-              <a:ext cx="293486" cy="2109"/>
-            </a:xfrm>
-            <a:prstGeom prst="bentConnector3">
-              <a:avLst>
-                <a:gd name="adj1" fmla="val 50000"/>
+                <a:gd name="adj1" fmla="val 49903"/>
               </a:avLst>
             </a:prstGeom>
             <a:ln w="19050">
@@ -5584,79 +6295,28 @@
         </p:cxnSp>
         <p:cxnSp>
           <p:nvCxnSpPr>
-            <p:cNvPr id="88" name="Elbow Connector 122">
+            <p:cNvPr id="141" name="Elbow Connector 122">
               <a:extLst>
                 <a:ext uri="{FF2B5EF4-FFF2-40B4-BE49-F238E27FC236}">
-                  <a16:creationId xmlns:a16="http://schemas.microsoft.com/office/drawing/2014/main" id="{C6373681-9F7C-40C9-A415-CF7E05083F3F}"/>
-                </a:ext>
-              </a:extLst>
-            </p:cNvPr>
-            <p:cNvCxnSpPr>
-              <a:cxnSpLocks/>
-              <a:stCxn id="49" idx="2"/>
-              <a:endCxn id="84" idx="1"/>
-            </p:cNvCxnSpPr>
-            <p:nvPr/>
-          </p:nvCxnSpPr>
-          <p:spPr>
-            <a:xfrm rot="16200000" flipH="1">
-              <a:off x="3686991" y="4958436"/>
-              <a:ext cx="466866" cy="985156"/>
-            </a:xfrm>
-            <a:prstGeom prst="bentConnector2">
-              <a:avLst/>
-            </a:prstGeom>
-            <a:ln w="19050">
-              <a:solidFill>
-                <a:schemeClr val="accent6">
-                  <a:lumMod val="75000"/>
-                </a:schemeClr>
-              </a:solidFill>
-              <a:prstDash val="sysDot"/>
-              <a:headEnd type="none" w="med" len="med"/>
-              <a:tailEnd type="arrow" w="med" len="med"/>
-            </a:ln>
-            <a:effectLst/>
-          </p:spPr>
-          <p:style>
-            <a:lnRef idx="1">
-              <a:schemeClr val="accent2"/>
-            </a:lnRef>
-            <a:fillRef idx="2">
-              <a:schemeClr val="accent2"/>
-            </a:fillRef>
-            <a:effectRef idx="1">
-              <a:schemeClr val="accent2"/>
-            </a:effectRef>
-            <a:fontRef idx="minor">
-              <a:schemeClr val="dk1"/>
-            </a:fontRef>
-          </p:style>
-        </p:cxnSp>
-        <p:cxnSp>
-          <p:nvCxnSpPr>
-            <p:cNvPr id="91" name="Elbow Connector 122">
-              <a:extLst>
-                <a:ext uri="{FF2B5EF4-FFF2-40B4-BE49-F238E27FC236}">
-                  <a16:creationId xmlns:a16="http://schemas.microsoft.com/office/drawing/2014/main" id="{7C266A05-812F-49C9-B251-38C1B1C0751D}"/>
+                  <a16:creationId xmlns:a16="http://schemas.microsoft.com/office/drawing/2014/main" id="{ABFCD2D8-68B5-4137-A0D8-6EADC677BBFB}"/>
                 </a:ext>
               </a:extLst>
             </p:cNvPr>
             <p:cNvCxnSpPr>
               <a:cxnSpLocks/>
               <a:stCxn id="55" idx="1"/>
-              <a:endCxn id="84" idx="3"/>
+              <a:endCxn id="104" idx="3"/>
             </p:cNvCxnSpPr>
             <p:nvPr/>
           </p:nvCxnSpPr>
           <p:spPr>
             <a:xfrm rot="10800000" flipV="1">
-              <a:off x="5744657" y="5036253"/>
-              <a:ext cx="310252" cy="648194"/>
+              <a:off x="5671851" y="3232110"/>
+              <a:ext cx="802478" cy="1210958"/>
             </a:xfrm>
             <a:prstGeom prst="bentConnector3">
               <a:avLst>
-                <a:gd name="adj1" fmla="val 50000"/>
+                <a:gd name="adj1" fmla="val 50890"/>
               </a:avLst>
             </a:prstGeom>
             <a:ln w="19050">
@@ -5688,28 +6348,29 @@
         </p:cxnSp>
         <p:cxnSp>
           <p:nvCxnSpPr>
-            <p:cNvPr id="94" name="Elbow Connector 122">
+            <p:cNvPr id="195" name="Elbow Connector 122">
               <a:extLst>
                 <a:ext uri="{FF2B5EF4-FFF2-40B4-BE49-F238E27FC236}">
-                  <a16:creationId xmlns:a16="http://schemas.microsoft.com/office/drawing/2014/main" id="{E9CF500D-0F3F-419C-A880-F8CAC840BE7F}"/>
+                  <a16:creationId xmlns:a16="http://schemas.microsoft.com/office/drawing/2014/main" id="{92139FD5-CECE-4C76-BC7D-3CABF7CF00BF}"/>
                 </a:ext>
               </a:extLst>
             </p:cNvPr>
             <p:cNvCxnSpPr>
               <a:cxnSpLocks/>
-              <a:stCxn id="55" idx="2"/>
-              <a:endCxn id="73" idx="0"/>
+              <a:stCxn id="55" idx="1"/>
+              <a:endCxn id="63" idx="2"/>
             </p:cNvCxnSpPr>
             <p:nvPr/>
           </p:nvCxnSpPr>
           <p:spPr>
-            <a:xfrm rot="16200000" flipH="1">
-              <a:off x="6572895" y="5357474"/>
-              <a:ext cx="301434" cy="5751"/>
+            <a:xfrm rot="10800000" flipV="1">
+              <a:off x="2995081" y="3232109"/>
+              <a:ext cx="3479248" cy="1377679"/>
             </a:xfrm>
-            <a:prstGeom prst="bentConnector3">
+            <a:prstGeom prst="bentConnector4">
               <a:avLst>
-                <a:gd name="adj1" fmla="val 50000"/>
+                <a:gd name="adj1" fmla="val 11740"/>
+                <a:gd name="adj2" fmla="val 159182"/>
               </a:avLst>
             </a:prstGeom>
             <a:ln w="19050">

</xml_diff>